<commit_message>
Updated presentation (who does what)
</commit_message>
<xml_diff>
--- a/doc/FinalPresentation.pptx
+++ b/doc/FinalPresentation.pptx
@@ -8,16 +8,19 @@
     <p:sldId id="256" r:id="rId2"/>
     <p:sldId id="266" r:id="rId3"/>
     <p:sldId id="260" r:id="rId4"/>
-    <p:sldId id="261" r:id="rId5"/>
+    <p:sldId id="274" r:id="rId5"/>
     <p:sldId id="269" r:id="rId6"/>
     <p:sldId id="270" r:id="rId7"/>
     <p:sldId id="271" r:id="rId8"/>
     <p:sldId id="272" r:id="rId9"/>
     <p:sldId id="273" r:id="rId10"/>
     <p:sldId id="263" r:id="rId11"/>
-    <p:sldId id="264" r:id="rId12"/>
-    <p:sldId id="257" r:id="rId13"/>
-    <p:sldId id="267" r:id="rId14"/>
+    <p:sldId id="261" r:id="rId12"/>
+    <p:sldId id="276" r:id="rId13"/>
+    <p:sldId id="277" r:id="rId14"/>
+    <p:sldId id="275" r:id="rId15"/>
+    <p:sldId id="278" r:id="rId16"/>
+    <p:sldId id="267" r:id="rId17"/>
   </p:sldIdLst>
   <p:sldSz cx="12192000" cy="6858000"/>
   <p:notesSz cx="6858000" cy="9144000"/>
@@ -118,7 +121,7 @@
   </p:defaultTextStyle>
   <p:extLst>
     <p:ext uri="{EFAFB233-063F-42B5-8137-9DF3F51BA10A}">
-      <p15:sldGuideLst xmlns:p15="http://schemas.microsoft.com/office/powerpoint/2012/main">
+      <p15:sldGuideLst xmlns:p15="http://schemas.microsoft.com/office/powerpoint/2012/main" xmlns="">
         <p15:guide id="1" orient="horz" pos="2160">
           <p15:clr>
             <a:srgbClr val="A4A3A4"/>
@@ -361,7 +364,7 @@
           <a:p>
             <a:fld id="{7D245CBA-5440-4E3A-93BD-41E2FFACF6C3}" type="datetimeFigureOut">
               <a:rPr lang="de-DE" smtClean="0"/>
-              <a:t>05.07.2014</a:t>
+              <a:t>03.07.14</a:t>
             </a:fld>
             <a:endParaRPr lang="de-DE"/>
           </a:p>
@@ -569,7 +572,7 @@
           <a:p>
             <a:fld id="{7D245CBA-5440-4E3A-93BD-41E2FFACF6C3}" type="datetimeFigureOut">
               <a:rPr lang="de-DE" smtClean="0"/>
-              <a:t>05.07.2014</a:t>
+              <a:t>03.07.14</a:t>
             </a:fld>
             <a:endParaRPr lang="de-DE"/>
           </a:p>
@@ -825,7 +828,7 @@
           <a:p>
             <a:fld id="{7D245CBA-5440-4E3A-93BD-41E2FFACF6C3}" type="datetimeFigureOut">
               <a:rPr lang="de-DE" smtClean="0"/>
-              <a:t>05.07.2014</a:t>
+              <a:t>03.07.14</a:t>
             </a:fld>
             <a:endParaRPr lang="de-DE"/>
           </a:p>
@@ -999,7 +1002,7 @@
           <a:p>
             <a:fld id="{7D245CBA-5440-4E3A-93BD-41E2FFACF6C3}" type="datetimeFigureOut">
               <a:rPr lang="de-DE" smtClean="0"/>
-              <a:t>05.07.2014</a:t>
+              <a:t>03.07.14</a:t>
             </a:fld>
             <a:endParaRPr lang="de-DE"/>
           </a:p>
@@ -1342,7 +1345,7 @@
           <a:p>
             <a:fld id="{7D245CBA-5440-4E3A-93BD-41E2FFACF6C3}" type="datetimeFigureOut">
               <a:rPr lang="de-DE" smtClean="0"/>
-              <a:t>05.07.2014</a:t>
+              <a:t>03.07.14</a:t>
             </a:fld>
             <a:endParaRPr lang="de-DE"/>
           </a:p>
@@ -1617,7 +1620,7 @@
           <a:p>
             <a:fld id="{7D245CBA-5440-4E3A-93BD-41E2FFACF6C3}" type="datetimeFigureOut">
               <a:rPr lang="de-DE" smtClean="0"/>
-              <a:t>05.07.2014</a:t>
+              <a:t>03.07.14</a:t>
             </a:fld>
             <a:endParaRPr lang="de-DE"/>
           </a:p>
@@ -1996,7 +1999,7 @@
           <a:p>
             <a:fld id="{7D245CBA-5440-4E3A-93BD-41E2FFACF6C3}" type="datetimeFigureOut">
               <a:rPr lang="de-DE" smtClean="0"/>
-              <a:t>05.07.2014</a:t>
+              <a:t>03.07.14</a:t>
             </a:fld>
             <a:endParaRPr lang="de-DE"/>
           </a:p>
@@ -2114,7 +2117,7 @@
           <a:p>
             <a:fld id="{7D245CBA-5440-4E3A-93BD-41E2FFACF6C3}" type="datetimeFigureOut">
               <a:rPr lang="de-DE" smtClean="0"/>
-              <a:t>05.07.2014</a:t>
+              <a:t>03.07.14</a:t>
             </a:fld>
             <a:endParaRPr lang="de-DE"/>
           </a:p>
@@ -2285,7 +2288,7 @@
           <a:p>
             <a:fld id="{7D245CBA-5440-4E3A-93BD-41E2FFACF6C3}" type="datetimeFigureOut">
               <a:rPr lang="de-DE" smtClean="0"/>
-              <a:t>05.07.2014</a:t>
+              <a:t>03.07.14</a:t>
             </a:fld>
             <a:endParaRPr lang="de-DE"/>
           </a:p>
@@ -2639,7 +2642,7 @@
           <a:p>
             <a:fld id="{7D245CBA-5440-4E3A-93BD-41E2FFACF6C3}" type="datetimeFigureOut">
               <a:rPr lang="de-DE" smtClean="0"/>
-              <a:t>05.07.2014</a:t>
+              <a:t>03.07.14</a:t>
             </a:fld>
             <a:endParaRPr lang="de-DE"/>
           </a:p>
@@ -3021,7 +3024,7 @@
           <a:p>
             <a:fld id="{7D245CBA-5440-4E3A-93BD-41E2FFACF6C3}" type="datetimeFigureOut">
               <a:rPr lang="de-DE" smtClean="0"/>
-              <a:t>05.07.2014</a:t>
+              <a:t>03.07.14</a:t>
             </a:fld>
             <a:endParaRPr lang="de-DE"/>
           </a:p>
@@ -3308,7 +3311,7 @@
           <a:p>
             <a:fld id="{7D245CBA-5440-4E3A-93BD-41E2FFACF6C3}" type="datetimeFigureOut">
               <a:rPr lang="de-DE" smtClean="0"/>
-              <a:t>05.07.2014</a:t>
+              <a:t>03.07.14</a:t>
             </a:fld>
             <a:endParaRPr lang="de-DE"/>
           </a:p>
@@ -3936,7 +3939,7 @@
   <p:timing>
     <p:tnLst>
       <p:par>
-        <p:cTn id="1" dur="indefinite" restart="never" nodeType="tmRoot"/>
+        <p:cTn xmlns:p14="http://schemas.microsoft.com/office/powerpoint/2010/main" id="1" dur="indefinite" restart="never" nodeType="tmRoot"/>
       </p:par>
     </p:tnLst>
   </p:timing>
@@ -3983,40 +3986,18 @@
               <a:rPr lang="de-DE" dirty="0" smtClean="0"/>
               <a:t> </a:t>
             </a:r>
+            <a:r>
+              <a:rPr lang="de-DE" dirty="0" err="1" smtClean="0"/>
+              <a:t>configuration</a:t>
+            </a:r>
+            <a:r>
+              <a:rPr lang="de-DE" dirty="0" smtClean="0"/>
+              <a:t> (PAUL)</a:t>
+            </a:r>
             <a:endParaRPr lang="de-DE" dirty="0"/>
           </a:p>
         </p:txBody>
       </p:sp>
-      <p:pic>
-        <p:nvPicPr>
-          <p:cNvPr id="7" name="Bild 6" descr="wiport2.jpg"/>
-          <p:cNvPicPr>
-            <a:picLocks noChangeAspect="1"/>
-          </p:cNvPicPr>
-          <p:nvPr/>
-        </p:nvPicPr>
-        <p:blipFill>
-          <a:blip r:embed="rId2">
-            <a:extLst>
-              <a:ext uri="{28A0092B-C50C-407E-A947-70E740481C1C}">
-                <a14:useLocalDpi xmlns:a14="http://schemas.microsoft.com/office/drawing/2010/main" val="0"/>
-              </a:ext>
-            </a:extLst>
-          </a:blip>
-          <a:stretch>
-            <a:fillRect/>
-          </a:stretch>
-        </p:blipFill>
-        <p:spPr>
-          <a:xfrm>
-            <a:off x="124232" y="2222724"/>
-            <a:ext cx="6835263" cy="3389667"/>
-          </a:xfrm>
-          <a:prstGeom prst="rect">
-            <a:avLst/>
-          </a:prstGeom>
-        </p:spPr>
-      </p:pic>
       <p:sp>
         <p:nvSpPr>
           <p:cNvPr id="10" name="Inhaltsplatzhalter 9"/>
@@ -4030,7 +4011,7 @@
         <p:spPr>
           <a:xfrm>
             <a:off x="6777911" y="2835275"/>
-            <a:ext cx="4805363" cy="3137269"/>
+            <a:ext cx="4805363" cy="2478627"/>
           </a:xfrm>
           <a:prstGeom prst="rect">
             <a:avLst/>
@@ -4049,19 +4030,7 @@
             </a:pPr>
             <a:r>
               <a:rPr lang="de-DE" sz="2400" dirty="0" smtClean="0"/>
-              <a:t>Wireless </a:t>
-            </a:r>
-            <a:r>
-              <a:rPr lang="de-DE" sz="2400" dirty="0" err="1" smtClean="0"/>
-              <a:t>networking</a:t>
-            </a:r>
-            <a:r>
-              <a:rPr lang="de-DE" sz="2400" dirty="0" smtClean="0"/>
-              <a:t> </a:t>
-            </a:r>
-            <a:r>
-              <a:rPr lang="de-DE" sz="2400" dirty="0" err="1" smtClean="0"/>
-              <a:t>server</a:t>
+              <a:t>XYZ</a:t>
             </a:r>
             <a:endParaRPr lang="de-DE" sz="2400" dirty="0" smtClean="0"/>
           </a:p>
@@ -4078,40 +4047,8 @@
               <a:buChar char="•"/>
             </a:pPr>
             <a:r>
-              <a:rPr lang="de-DE" sz="2400" dirty="0" err="1" smtClean="0"/>
-              <a:t>WiFi</a:t>
-            </a:r>
-            <a:r>
               <a:rPr lang="de-DE" sz="2400" dirty="0" smtClean="0"/>
-              <a:t> </a:t>
-            </a:r>
-            <a:r>
-              <a:rPr lang="de-DE" sz="2400" dirty="0" err="1" smtClean="0"/>
-              <a:t>antenna</a:t>
-            </a:r>
-            <a:r>
-              <a:rPr lang="de-DE" sz="2400" dirty="0" smtClean="0"/>
-              <a:t>, </a:t>
-            </a:r>
-            <a:r>
-              <a:rPr lang="de-DE" sz="2400" dirty="0" err="1" smtClean="0"/>
-              <a:t>serial</a:t>
-            </a:r>
-            <a:r>
-              <a:rPr lang="de-DE" sz="2400" dirty="0" smtClean="0"/>
-              <a:t> </a:t>
-            </a:r>
-            <a:r>
-              <a:rPr lang="de-DE" sz="2400" dirty="0" err="1" smtClean="0"/>
-              <a:t>and</a:t>
-            </a:r>
-            <a:r>
-              <a:rPr lang="de-DE" sz="2400" dirty="0" smtClean="0"/>
-              <a:t> LAN </a:t>
-            </a:r>
-            <a:r>
-              <a:rPr lang="de-DE" sz="2400" dirty="0" err="1" smtClean="0"/>
-              <a:t>port</a:t>
+              <a:t>ABC</a:t>
             </a:r>
             <a:endParaRPr lang="de-DE" sz="2400" dirty="0" smtClean="0"/>
           </a:p>
@@ -4125,65 +4062,87 @@
             </a:pPr>
             <a:r>
               <a:rPr lang="de-DE" sz="2400" dirty="0" smtClean="0"/>
-              <a:t>TCP/IP </a:t>
-            </a:r>
-            <a:r>
-              <a:rPr lang="de-DE" sz="2400" dirty="0" err="1" smtClean="0"/>
-              <a:t>communication</a:t>
-            </a:r>
-            <a:r>
-              <a:rPr lang="de-DE" sz="2400" dirty="0" smtClean="0"/>
+              <a:t>132</a:t>
+            </a:r>
+            <a:endParaRPr lang="de-DE" sz="2400" dirty="0"/>
+          </a:p>
+        </p:txBody>
+      </p:sp>
+      <p:sp>
+        <p:nvSpPr>
+          <p:cNvPr id="3" name="Textfeld 2"/>
+          <p:cNvSpPr txBox="1"/>
+          <p:nvPr/>
+        </p:nvSpPr>
+        <p:spPr>
+          <a:xfrm>
+            <a:off x="542551" y="3711026"/>
+            <a:ext cx="5125697" cy="369332"/>
+          </a:xfrm>
+          <a:prstGeom prst="rect">
+            <a:avLst/>
+          </a:prstGeom>
+          <a:noFill/>
+        </p:spPr>
+        <p:txBody>
+          <a:bodyPr wrap="none" rtlCol="0">
+            <a:spAutoFit/>
+          </a:bodyPr>
+          <a:lstStyle/>
+          <a:p>
+            <a:r>
+              <a:rPr lang="de-DE" dirty="0" smtClean="0"/>
+              <a:t>New </a:t>
+            </a:r>
+            <a:r>
+              <a:rPr lang="de-DE" dirty="0" err="1" smtClean="0"/>
+              <a:t>image</a:t>
+            </a:r>
+            <a:r>
+              <a:rPr lang="de-DE" dirty="0" smtClean="0"/>
+              <a:t>: </a:t>
+            </a:r>
+            <a:r>
+              <a:rPr lang="de-DE" dirty="0" err="1" smtClean="0"/>
+              <a:t>shows</a:t>
+            </a:r>
+            <a:r>
+              <a:rPr lang="de-DE" dirty="0" smtClean="0"/>
               <a:t> </a:t>
             </a:r>
             <a:r>
-              <a:rPr lang="de-DE" sz="2400" dirty="0" err="1" smtClean="0"/>
-              <a:t>with</a:t>
-            </a:r>
-            <a:r>
-              <a:rPr lang="de-DE" sz="2400" dirty="0" smtClean="0"/>
+              <a:rPr lang="de-DE" dirty="0" err="1" smtClean="0"/>
+              <a:t>wiport</a:t>
+            </a:r>
+            <a:r>
+              <a:rPr lang="de-DE" dirty="0" smtClean="0"/>
+              <a:t> – </a:t>
+            </a:r>
+            <a:r>
+              <a:rPr lang="de-DE" dirty="0" err="1" smtClean="0"/>
+              <a:t>board</a:t>
+            </a:r>
+            <a:r>
+              <a:rPr lang="de-DE" dirty="0" smtClean="0"/>
+              <a:t>- </a:t>
+            </a:r>
+            <a:r>
+              <a:rPr lang="de-DE" dirty="0" err="1" smtClean="0"/>
+              <a:t>computer</a:t>
+            </a:r>
+            <a:r>
+              <a:rPr lang="de-DE" dirty="0" smtClean="0"/>
               <a:t> </a:t>
             </a:r>
             <a:r>
-              <a:rPr lang="de-DE" sz="2400" dirty="0" err="1" smtClean="0"/>
-              <a:t>external</a:t>
-            </a:r>
-            <a:r>
-              <a:rPr lang="de-DE" sz="2400" dirty="0"/>
-              <a:t> </a:t>
-            </a:r>
-            <a:r>
-              <a:rPr lang="de-DE" sz="2400" dirty="0" err="1" smtClean="0"/>
-              <a:t>systems</a:t>
-            </a:r>
-            <a:r>
-              <a:rPr lang="de-DE" sz="2400" dirty="0" smtClean="0"/>
-              <a:t> (</a:t>
-            </a:r>
-            <a:r>
-              <a:rPr lang="de-DE" sz="2400" dirty="0" err="1" smtClean="0"/>
-              <a:t>other</a:t>
-            </a:r>
-            <a:r>
-              <a:rPr lang="de-DE" sz="2400" dirty="0" smtClean="0"/>
-              <a:t> </a:t>
-            </a:r>
-            <a:r>
-              <a:rPr lang="de-DE" sz="2400" dirty="0" err="1" smtClean="0"/>
-              <a:t>cars</a:t>
-            </a:r>
-            <a:r>
-              <a:rPr lang="de-DE" sz="2400" dirty="0" smtClean="0"/>
-              <a:t>, </a:t>
-            </a:r>
-            <a:r>
-              <a:rPr lang="de-DE" sz="2400" dirty="0" err="1" smtClean="0"/>
-              <a:t>basestation</a:t>
-            </a:r>
-            <a:r>
-              <a:rPr lang="de-DE" sz="2400" dirty="0" smtClean="0"/>
-              <a:t>, etc.) </a:t>
-            </a:r>
-            <a:endParaRPr lang="de-DE" sz="2400" dirty="0"/>
+              <a:rPr lang="de-DE" dirty="0" err="1" smtClean="0"/>
+              <a:t>comm</a:t>
+            </a:r>
+            <a:r>
+              <a:rPr lang="de-DE" dirty="0" smtClean="0"/>
+              <a:t>.</a:t>
+            </a:r>
+            <a:endParaRPr lang="de-DE" dirty="0"/>
           </a:p>
         </p:txBody>
       </p:sp>
@@ -4200,7 +4159,7 @@
   <p:timing>
     <p:tnLst>
       <p:par>
-        <p:cTn id="1" dur="indefinite" restart="never" nodeType="tmRoot"/>
+        <p:cTn xmlns:p14="http://schemas.microsoft.com/office/powerpoint/2010/main" id="1" dur="indefinite" restart="never" nodeType="tmRoot"/>
       </p:par>
     </p:tnLst>
   </p:timing>
@@ -4234,1415 +4193,18 @@
             <p:ph type="title"/>
           </p:nvPr>
         </p:nvSpPr>
-        <p:spPr>
-          <a:xfrm>
-            <a:off x="1193533" y="334729"/>
-            <a:ext cx="10058400" cy="1450757"/>
-          </a:xfrm>
-        </p:spPr>
+        <p:spPr/>
         <p:txBody>
           <a:bodyPr/>
           <a:lstStyle/>
           <a:p>
             <a:r>
               <a:rPr lang="de-DE" dirty="0" smtClean="0"/>
-              <a:t>Car2x Protocol-</a:t>
-            </a:r>
-            <a:r>
-              <a:rPr lang="de-DE" dirty="0" err="1" smtClean="0"/>
-              <a:t>Structure</a:t>
-            </a:r>
-            <a:endParaRPr lang="de-DE" dirty="0"/>
-          </a:p>
-        </p:txBody>
-      </p:sp>
-      <p:graphicFrame>
-        <p:nvGraphicFramePr>
-          <p:cNvPr id="4" name="Inhaltsplatzhalter 3"/>
-          <p:cNvGraphicFramePr>
-            <a:graphicFrameLocks noGrp="1"/>
-          </p:cNvGraphicFramePr>
-          <p:nvPr>
-            <p:ph idx="1"/>
-            <p:extLst>
-              <p:ext uri="{D42A27DB-BD31-4B8C-83A1-F6EECF244321}">
-                <p14:modId xmlns:p14="http://schemas.microsoft.com/office/powerpoint/2010/main" val="2748549640"/>
-              </p:ext>
-            </p:extLst>
-          </p:nvPr>
-        </p:nvGraphicFramePr>
-        <p:xfrm>
-          <a:off x="1193533" y="3108078"/>
-          <a:ext cx="10058400" cy="1267452"/>
-        </p:xfrm>
-        <a:graphic>
-          <a:graphicData uri="http://schemas.openxmlformats.org/drawingml/2006/table">
-            <a:tbl>
-              <a:tblPr firstRow="1" bandRow="1">
-                <a:tableStyleId>{5C22544A-7EE6-4342-B048-85BDC9FD1C3A}</a:tableStyleId>
-              </a:tblPr>
-              <a:tblGrid>
-                <a:gridCol w="1117600"/>
-                <a:gridCol w="1117600"/>
-                <a:gridCol w="1117600"/>
-                <a:gridCol w="3352800"/>
-                <a:gridCol w="3352800"/>
-              </a:tblGrid>
-              <a:tr h="422484">
-                <a:tc gridSpan="3">
-                  <a:txBody>
-                    <a:bodyPr/>
-                    <a:lstStyle/>
-                    <a:p>
-                      <a:pPr lvl="0"/>
-                      <a:r>
-                        <a:rPr lang="en-GB" sz="1800" b="1" kern="1200" dirty="0" smtClean="0">
-                          <a:solidFill>
-                            <a:schemeClr val="lt1"/>
-                          </a:solidFill>
-                          <a:effectLst/>
-                          <a:latin typeface="+mn-lt"/>
-                          <a:ea typeface="+mn-ea"/>
-                          <a:cs typeface="+mn-cs"/>
-                        </a:rPr>
-                        <a:t>Message ID (</a:t>
-                      </a:r>
-                      <a:r>
-                        <a:rPr lang="de-DE" sz="1800" b="1" kern="1200" dirty="0" smtClean="0">
-                          <a:solidFill>
-                            <a:schemeClr val="lt1"/>
-                          </a:solidFill>
-                          <a:effectLst/>
-                          <a:latin typeface="+mn-lt"/>
-                          <a:ea typeface="+mn-ea"/>
-                          <a:cs typeface="+mn-cs"/>
-                        </a:rPr>
-                        <a:t>2Bytes)</a:t>
-                      </a:r>
-                      <a:endParaRPr lang="de-DE" dirty="0"/>
-                    </a:p>
-                  </a:txBody>
-                  <a:tcPr/>
-                </a:tc>
-                <a:tc hMerge="1">
-                  <a:txBody>
-                    <a:bodyPr/>
-                    <a:lstStyle/>
-                    <a:p>
-                      <a:endParaRPr lang="en-US"/>
-                    </a:p>
-                  </a:txBody>
-                  <a:tcPr/>
-                </a:tc>
-                <a:tc hMerge="1">
-                  <a:txBody>
-                    <a:bodyPr/>
-                    <a:lstStyle/>
-                    <a:p>
-                      <a:endParaRPr lang="en-US"/>
-                    </a:p>
-                  </a:txBody>
-                  <a:tcPr/>
-                </a:tc>
-                <a:tc>
-                  <a:txBody>
-                    <a:bodyPr/>
-                    <a:lstStyle/>
-                    <a:p>
-                      <a:r>
-                        <a:rPr lang="en-GB" sz="1800" b="1" kern="1200" dirty="0" smtClean="0">
-                          <a:solidFill>
-                            <a:schemeClr val="lt1"/>
-                          </a:solidFill>
-                          <a:effectLst/>
-                          <a:latin typeface="+mn-lt"/>
-                          <a:ea typeface="+mn-ea"/>
-                          <a:cs typeface="+mn-cs"/>
-                        </a:rPr>
-                        <a:t>Payload length (1Byte)</a:t>
-                      </a:r>
-                      <a:endParaRPr lang="de-DE" dirty="0"/>
-                    </a:p>
-                  </a:txBody>
-                  <a:tcPr>
-                    <a:solidFill>
-                      <a:schemeClr val="tx2">
-                        <a:lumMod val="60000"/>
-                        <a:lumOff val="40000"/>
-                      </a:schemeClr>
-                    </a:solidFill>
-                  </a:tcPr>
-                </a:tc>
-                <a:tc>
-                  <a:txBody>
-                    <a:bodyPr/>
-                    <a:lstStyle/>
-                    <a:p>
-                      <a:pPr marL="0" marR="0" lvl="0" indent="0" algn="l" defTabSz="914400" rtl="0" eaLnBrk="1" fontAlgn="auto" latinLnBrk="0" hangingPunct="1">
-                        <a:lnSpc>
-                          <a:spcPct val="100000"/>
-                        </a:lnSpc>
-                        <a:spcBef>
-                          <a:spcPts val="0"/>
-                        </a:spcBef>
-                        <a:spcAft>
-                          <a:spcPts val="0"/>
-                        </a:spcAft>
-                        <a:buClrTx/>
-                        <a:buSzTx/>
-                        <a:buFontTx/>
-                        <a:buNone/>
-                        <a:tabLst/>
-                        <a:defRPr/>
-                      </a:pPr>
-                      <a:r>
-                        <a:rPr lang="en-GB" sz="1800" b="1" kern="1200" dirty="0" smtClean="0">
-                          <a:solidFill>
-                            <a:schemeClr val="lt1"/>
-                          </a:solidFill>
-                          <a:effectLst/>
-                          <a:latin typeface="+mn-lt"/>
-                          <a:ea typeface="+mn-ea"/>
-                          <a:cs typeface="+mn-cs"/>
-                        </a:rPr>
-                        <a:t>Payload</a:t>
-                      </a:r>
-                    </a:p>
-                  </a:txBody>
-                  <a:tcPr>
-                    <a:solidFill>
-                      <a:schemeClr val="bg2">
-                        <a:lumMod val="75000"/>
-                      </a:schemeClr>
-                    </a:solidFill>
-                  </a:tcPr>
-                </a:tc>
-              </a:tr>
-              <a:tr h="422484">
-                <a:tc>
-                  <a:txBody>
-                    <a:bodyPr/>
-                    <a:lstStyle/>
-                    <a:p>
-                      <a:pPr lvl="0"/>
-                      <a:r>
-                        <a:rPr lang="de-DE" dirty="0" smtClean="0">
-                          <a:solidFill>
-                            <a:schemeClr val="bg1"/>
-                          </a:solidFill>
-                        </a:rPr>
-                        <a:t>0-2</a:t>
-                      </a:r>
-                      <a:endParaRPr lang="de-DE" dirty="0">
-                        <a:solidFill>
-                          <a:schemeClr val="bg1"/>
-                        </a:solidFill>
-                      </a:endParaRPr>
-                    </a:p>
-                  </a:txBody>
-                  <a:tcPr>
-                    <a:solidFill>
-                      <a:schemeClr val="accent1"/>
-                    </a:solidFill>
-                  </a:tcPr>
-                </a:tc>
-                <a:tc>
-                  <a:txBody>
-                    <a:bodyPr/>
-                    <a:lstStyle/>
-                    <a:p>
-                      <a:pPr marL="0" marR="0" lvl="0" indent="0" algn="l" defTabSz="914400" rtl="0" eaLnBrk="1" fontAlgn="auto" latinLnBrk="0" hangingPunct="1">
-                        <a:lnSpc>
-                          <a:spcPct val="100000"/>
-                        </a:lnSpc>
-                        <a:spcBef>
-                          <a:spcPts val="0"/>
-                        </a:spcBef>
-                        <a:spcAft>
-                          <a:spcPts val="0"/>
-                        </a:spcAft>
-                        <a:buClrTx/>
-                        <a:buSzTx/>
-                        <a:buFontTx/>
-                        <a:buNone/>
-                        <a:tabLst/>
-                        <a:defRPr/>
-                      </a:pPr>
-                      <a:r>
-                        <a:rPr lang="de-DE" dirty="0" smtClean="0">
-                          <a:solidFill>
-                            <a:schemeClr val="bg1"/>
-                          </a:solidFill>
-                        </a:rPr>
-                        <a:t>3-7</a:t>
-                      </a:r>
-                      <a:endParaRPr lang="de-DE" dirty="0">
-                        <a:solidFill>
-                          <a:schemeClr val="bg1"/>
-                        </a:solidFill>
-                      </a:endParaRPr>
-                    </a:p>
-                  </a:txBody>
-                  <a:tcPr>
-                    <a:solidFill>
-                      <a:schemeClr val="accent1"/>
-                    </a:solidFill>
-                  </a:tcPr>
-                </a:tc>
-                <a:tc>
-                  <a:txBody>
-                    <a:bodyPr/>
-                    <a:lstStyle/>
-                    <a:p>
-                      <a:pPr marL="0" marR="0" lvl="0" indent="0" algn="l" defTabSz="914400" rtl="0" eaLnBrk="1" fontAlgn="auto" latinLnBrk="0" hangingPunct="1">
-                        <a:lnSpc>
-                          <a:spcPct val="100000"/>
-                        </a:lnSpc>
-                        <a:spcBef>
-                          <a:spcPts val="0"/>
-                        </a:spcBef>
-                        <a:spcAft>
-                          <a:spcPts val="0"/>
-                        </a:spcAft>
-                        <a:buClrTx/>
-                        <a:buSzTx/>
-                        <a:buFontTx/>
-                        <a:buNone/>
-                        <a:tabLst/>
-                        <a:defRPr/>
-                      </a:pPr>
-                      <a:r>
-                        <a:rPr lang="de-DE" baseline="0" dirty="0" smtClean="0">
-                          <a:solidFill>
-                            <a:schemeClr val="bg1"/>
-                          </a:solidFill>
-                        </a:rPr>
-                        <a:t>8-15</a:t>
-                      </a:r>
-                      <a:endParaRPr lang="de-DE" dirty="0" smtClean="0">
-                        <a:solidFill>
-                          <a:schemeClr val="bg1"/>
-                        </a:solidFill>
-                      </a:endParaRPr>
-                    </a:p>
-                  </a:txBody>
-                  <a:tcPr>
-                    <a:solidFill>
-                      <a:schemeClr val="accent1"/>
-                    </a:solidFill>
-                  </a:tcPr>
-                </a:tc>
-                <a:tc>
-                  <a:txBody>
-                    <a:bodyPr/>
-                    <a:lstStyle/>
-                    <a:p>
-                      <a:r>
-                        <a:rPr lang="de-DE" dirty="0" smtClean="0">
-                          <a:solidFill>
-                            <a:schemeClr val="bg1"/>
-                          </a:solidFill>
-                        </a:rPr>
-                        <a:t>16-23</a:t>
-                      </a:r>
-                      <a:endParaRPr lang="de-DE" dirty="0">
-                        <a:solidFill>
-                          <a:schemeClr val="bg1"/>
-                        </a:solidFill>
-                      </a:endParaRPr>
-                    </a:p>
-                  </a:txBody>
-                  <a:tcPr>
-                    <a:solidFill>
-                      <a:schemeClr val="tx2">
-                        <a:lumMod val="60000"/>
-                        <a:lumOff val="40000"/>
-                      </a:schemeClr>
-                    </a:solidFill>
-                  </a:tcPr>
-                </a:tc>
-                <a:tc>
-                  <a:txBody>
-                    <a:bodyPr/>
-                    <a:lstStyle/>
-                    <a:p>
-                      <a:pPr marL="0" marR="0" lvl="0" indent="0" algn="l" defTabSz="914400" rtl="0" eaLnBrk="1" fontAlgn="auto" latinLnBrk="0" hangingPunct="1">
-                        <a:lnSpc>
-                          <a:spcPct val="100000"/>
-                        </a:lnSpc>
-                        <a:spcBef>
-                          <a:spcPts val="0"/>
-                        </a:spcBef>
-                        <a:spcAft>
-                          <a:spcPts val="0"/>
-                        </a:spcAft>
-                        <a:buClrTx/>
-                        <a:buSzTx/>
-                        <a:buFontTx/>
-                        <a:buNone/>
-                        <a:tabLst/>
-                        <a:defRPr/>
-                      </a:pPr>
-                      <a:r>
-                        <a:rPr lang="en-GB" sz="1800" b="0" kern="1200" dirty="0" smtClean="0">
-                          <a:solidFill>
-                            <a:schemeClr val="lt1"/>
-                          </a:solidFill>
-                          <a:effectLst/>
-                          <a:latin typeface="+mn-lt"/>
-                          <a:ea typeface="+mn-ea"/>
-                          <a:cs typeface="+mn-cs"/>
-                        </a:rPr>
-                        <a:t>24-x</a:t>
-                      </a:r>
-                    </a:p>
-                  </a:txBody>
-                  <a:tcPr>
-                    <a:solidFill>
-                      <a:schemeClr val="bg2">
-                        <a:lumMod val="75000"/>
-                      </a:schemeClr>
-                    </a:solidFill>
-                  </a:tcPr>
-                </a:tc>
-              </a:tr>
-              <a:tr h="422484">
-                <a:tc>
-                  <a:txBody>
-                    <a:bodyPr/>
-                    <a:lstStyle/>
-                    <a:p>
-                      <a:pPr lvl="0"/>
-                      <a:r>
-                        <a:rPr lang="de-DE" dirty="0" smtClean="0">
-                          <a:solidFill>
-                            <a:schemeClr val="bg1"/>
-                          </a:solidFill>
-                        </a:rPr>
-                        <a:t>Type</a:t>
-                      </a:r>
-                      <a:endParaRPr lang="de-DE" dirty="0">
-                        <a:solidFill>
-                          <a:schemeClr val="bg1"/>
-                        </a:solidFill>
-                      </a:endParaRPr>
-                    </a:p>
-                  </a:txBody>
-                  <a:tcPr>
-                    <a:solidFill>
-                      <a:schemeClr val="accent1"/>
-                    </a:solidFill>
-                  </a:tcPr>
-                </a:tc>
-                <a:tc>
-                  <a:txBody>
-                    <a:bodyPr/>
-                    <a:lstStyle/>
-                    <a:p>
-                      <a:pPr lvl="0"/>
-                      <a:r>
-                        <a:rPr lang="de-DE" dirty="0" smtClean="0">
-                          <a:solidFill>
-                            <a:schemeClr val="bg1"/>
-                          </a:solidFill>
-                        </a:rPr>
-                        <a:t>Subtype</a:t>
-                      </a:r>
-                      <a:endParaRPr lang="de-DE" dirty="0">
-                        <a:solidFill>
-                          <a:schemeClr val="bg1"/>
-                        </a:solidFill>
-                      </a:endParaRPr>
-                    </a:p>
-                  </a:txBody>
-                  <a:tcPr>
-                    <a:solidFill>
-                      <a:schemeClr val="accent1"/>
-                    </a:solidFill>
-                  </a:tcPr>
-                </a:tc>
-                <a:tc>
-                  <a:txBody>
-                    <a:bodyPr/>
-                    <a:lstStyle/>
-                    <a:p>
-                      <a:pPr lvl="0"/>
-                      <a:r>
-                        <a:rPr lang="de-DE" dirty="0" smtClean="0">
-                          <a:solidFill>
-                            <a:schemeClr val="bg1"/>
-                          </a:solidFill>
-                        </a:rPr>
-                        <a:t>Reserved</a:t>
-                      </a:r>
-                      <a:endParaRPr lang="de-DE" dirty="0">
-                        <a:solidFill>
-                          <a:schemeClr val="bg1"/>
-                        </a:solidFill>
-                      </a:endParaRPr>
-                    </a:p>
-                  </a:txBody>
-                  <a:tcPr>
-                    <a:solidFill>
-                      <a:schemeClr val="accent1"/>
-                    </a:solidFill>
-                  </a:tcPr>
-                </a:tc>
-                <a:tc>
-                  <a:txBody>
-                    <a:bodyPr/>
-                    <a:lstStyle/>
-                    <a:p>
-                      <a:r>
-                        <a:rPr lang="de-DE" dirty="0" smtClean="0">
-                          <a:solidFill>
-                            <a:schemeClr val="bg1"/>
-                          </a:solidFill>
-                        </a:rPr>
-                        <a:t>Length of payload in Bytes</a:t>
-                      </a:r>
-                      <a:endParaRPr lang="de-DE" dirty="0">
-                        <a:solidFill>
-                          <a:schemeClr val="bg1"/>
-                        </a:solidFill>
-                      </a:endParaRPr>
-                    </a:p>
-                  </a:txBody>
-                  <a:tcPr>
-                    <a:solidFill>
-                      <a:schemeClr val="tx2">
-                        <a:lumMod val="60000"/>
-                        <a:lumOff val="40000"/>
-                      </a:schemeClr>
-                    </a:solidFill>
-                  </a:tcPr>
-                </a:tc>
-                <a:tc>
-                  <a:txBody>
-                    <a:bodyPr/>
-                    <a:lstStyle/>
-                    <a:p>
-                      <a:pPr marL="0" marR="0" lvl="0" indent="0" algn="l" defTabSz="914400" rtl="0" eaLnBrk="1" fontAlgn="auto" latinLnBrk="0" hangingPunct="1">
-                        <a:lnSpc>
-                          <a:spcPct val="100000"/>
-                        </a:lnSpc>
-                        <a:spcBef>
-                          <a:spcPts val="0"/>
-                        </a:spcBef>
-                        <a:spcAft>
-                          <a:spcPts val="0"/>
-                        </a:spcAft>
-                        <a:buClrTx/>
-                        <a:buSzTx/>
-                        <a:buFontTx/>
-                        <a:buNone/>
-                        <a:tabLst/>
-                        <a:defRPr/>
-                      </a:pPr>
-                      <a:r>
-                        <a:rPr lang="en-GB" sz="1800" b="0" kern="1200" dirty="0" smtClean="0">
-                          <a:solidFill>
-                            <a:schemeClr val="lt1"/>
-                          </a:solidFill>
-                          <a:effectLst/>
-                          <a:latin typeface="+mn-lt"/>
-                          <a:ea typeface="+mn-ea"/>
-                          <a:cs typeface="+mn-cs"/>
-                        </a:rPr>
-                        <a:t>Message payload</a:t>
-                      </a:r>
-                    </a:p>
-                  </a:txBody>
-                  <a:tcPr>
-                    <a:solidFill>
-                      <a:schemeClr val="bg2">
-                        <a:lumMod val="75000"/>
-                      </a:schemeClr>
-                    </a:solidFill>
-                  </a:tcPr>
-                </a:tc>
-              </a:tr>
-            </a:tbl>
-          </a:graphicData>
-        </a:graphic>
-      </p:graphicFrame>
-    </p:spTree>
-    <p:extLst>
-      <p:ext uri="{BB962C8B-B14F-4D97-AF65-F5344CB8AC3E}">
-        <p14:creationId xmlns:p14="http://schemas.microsoft.com/office/powerpoint/2010/main" val="1979948962"/>
-      </p:ext>
-    </p:extLst>
-  </p:cSld>
-  <p:clrMapOvr>
-    <a:masterClrMapping/>
-  </p:clrMapOvr>
-  <p:timing>
-    <p:tnLst>
-      <p:par>
-        <p:cTn id="1" dur="indefinite" restart="never" nodeType="tmRoot"/>
-      </p:par>
-    </p:tnLst>
-  </p:timing>
-</p:sld>
-</file>
-
-<file path=ppt/slides/slide12.xml><?xml version="1.0" encoding="utf-8"?>
-<p:sld xmlns:a="http://schemas.openxmlformats.org/drawingml/2006/main" xmlns:r="http://schemas.openxmlformats.org/officeDocument/2006/relationships" xmlns:p="http://schemas.openxmlformats.org/presentationml/2006/main">
-  <p:cSld>
-    <p:spTree>
-      <p:nvGrpSpPr>
-        <p:cNvPr id="1" name=""/>
-        <p:cNvGrpSpPr/>
-        <p:nvPr/>
-      </p:nvGrpSpPr>
-      <p:grpSpPr>
-        <a:xfrm>
-          <a:off x="0" y="0"/>
-          <a:ext cx="0" cy="0"/>
-          <a:chOff x="0" y="0"/>
-          <a:chExt cx="0" cy="0"/>
-        </a:xfrm>
-      </p:grpSpPr>
-      <p:sp>
-        <p:nvSpPr>
-          <p:cNvPr id="2" name="Titel 1"/>
-          <p:cNvSpPr>
-            <a:spLocks noGrp="1"/>
-          </p:cNvSpPr>
-          <p:nvPr>
-            <p:ph type="title"/>
-          </p:nvPr>
-        </p:nvSpPr>
-        <p:spPr/>
-        <p:txBody>
-          <a:bodyPr/>
-          <a:lstStyle/>
-          <a:p>
-            <a:r>
-              <a:rPr lang="en-US" dirty="0" smtClean="0"/>
-              <a:t>Car2x Protocol-Message Types</a:t>
-            </a:r>
-            <a:endParaRPr lang="en-US" dirty="0"/>
-          </a:p>
-        </p:txBody>
-      </p:sp>
-      <p:sp>
-        <p:nvSpPr>
-          <p:cNvPr id="3" name="Inhaltsplatzhalter 2"/>
-          <p:cNvSpPr>
-            <a:spLocks noGrp="1"/>
-          </p:cNvSpPr>
-          <p:nvPr>
-            <p:ph idx="1"/>
-          </p:nvPr>
-        </p:nvSpPr>
-        <p:spPr>
-          <a:xfrm>
-            <a:off x="1211136" y="1845734"/>
-            <a:ext cx="4364779" cy="4023360"/>
-          </a:xfrm>
-        </p:spPr>
-        <p:txBody>
-          <a:bodyPr>
-            <a:normAutofit/>
-          </a:bodyPr>
-          <a:lstStyle/>
-          <a:p>
-            <a:pPr lvl="0"/>
-            <a:r>
-              <a:rPr lang="en-GB" sz="2400" dirty="0" smtClean="0"/>
-              <a:t>“</a:t>
-            </a:r>
-            <a:r>
-              <a:rPr lang="en-GB" sz="2400" dirty="0"/>
-              <a:t>00” </a:t>
-            </a:r>
-            <a:r>
-              <a:rPr lang="en-GB" sz="2400" dirty="0" err="1"/>
-              <a:t>InfoMessage</a:t>
-            </a:r>
-            <a:r>
-              <a:rPr lang="en-GB" sz="2400" dirty="0"/>
-              <a:t> (from station or other car)</a:t>
-            </a:r>
-            <a:endParaRPr lang="de-DE" sz="2400" dirty="0"/>
-          </a:p>
-          <a:p>
-            <a:pPr lvl="1"/>
-            <a:r>
-              <a:rPr lang="en-GB" sz="2000" dirty="0" smtClean="0"/>
-              <a:t>“00” </a:t>
-            </a:r>
-            <a:r>
-              <a:rPr lang="en-GB" sz="2000" dirty="0" err="1" smtClean="0"/>
-              <a:t>currentSpeed</a:t>
-            </a:r>
-            <a:endParaRPr lang="de-DE" sz="2000" dirty="0"/>
-          </a:p>
-          <a:p>
-            <a:pPr lvl="1"/>
-            <a:r>
-              <a:rPr lang="en-GB" sz="2000" dirty="0" smtClean="0"/>
-              <a:t>“01” </a:t>
-            </a:r>
-            <a:r>
-              <a:rPr lang="en-GB" sz="2000" dirty="0" err="1" smtClean="0"/>
-              <a:t>steeringInformation</a:t>
-            </a:r>
-            <a:endParaRPr lang="de-DE" sz="2000" dirty="0"/>
-          </a:p>
-          <a:p>
-            <a:r>
-              <a:rPr lang="en-GB" sz="2400" dirty="0"/>
-              <a:t> </a:t>
-            </a:r>
-            <a:endParaRPr lang="de-DE" sz="2400" dirty="0"/>
-          </a:p>
-          <a:p>
-            <a:pPr lvl="0"/>
-            <a:r>
-              <a:rPr lang="en-GB" sz="2400" dirty="0"/>
-              <a:t>“01” </a:t>
-            </a:r>
-            <a:r>
-              <a:rPr lang="en-GB" sz="2400" dirty="0" err="1"/>
-              <a:t>EmergencyInfoMessage</a:t>
-            </a:r>
-            <a:endParaRPr lang="de-DE" sz="2400" dirty="0"/>
-          </a:p>
-          <a:p>
-            <a:pPr lvl="1"/>
-            <a:r>
-              <a:rPr lang="en-GB" sz="2000" dirty="0"/>
-              <a:t>“00” </a:t>
-            </a:r>
-            <a:r>
-              <a:rPr lang="en-GB" sz="2000" dirty="0" err="1" smtClean="0"/>
-              <a:t>emerencyBreaking</a:t>
-            </a:r>
-            <a:endParaRPr lang="de-DE" sz="2000" dirty="0"/>
-          </a:p>
-          <a:p>
-            <a:r>
-              <a:rPr lang="en-GB" sz="2400" dirty="0"/>
-              <a:t> </a:t>
-            </a:r>
-            <a:endParaRPr lang="de-DE" sz="2400" dirty="0"/>
-          </a:p>
-          <a:p>
-            <a:pPr lvl="1"/>
-            <a:endParaRPr lang="en-GB" sz="2000" dirty="0"/>
-          </a:p>
-          <a:p>
-            <a:pPr marL="201168" lvl="1" indent="0">
-              <a:buNone/>
-            </a:pPr>
-            <a:endParaRPr lang="de-DE" sz="2000" dirty="0"/>
-          </a:p>
-        </p:txBody>
-      </p:sp>
-      <p:sp>
-        <p:nvSpPr>
-          <p:cNvPr id="4" name="Textfeld 3"/>
-          <p:cNvSpPr txBox="1"/>
-          <p:nvPr/>
-        </p:nvSpPr>
-        <p:spPr>
-          <a:xfrm>
-            <a:off x="5575915" y="1845734"/>
-            <a:ext cx="6427195" cy="4093428"/>
-          </a:xfrm>
-          <a:prstGeom prst="rect">
-            <a:avLst/>
-          </a:prstGeom>
-          <a:noFill/>
-        </p:spPr>
-        <p:txBody>
-          <a:bodyPr wrap="square" rtlCol="0">
-            <a:spAutoFit/>
-          </a:bodyPr>
-          <a:lstStyle/>
-          <a:p>
-            <a:pPr lvl="0"/>
-            <a:endParaRPr lang="en-GB" sz="1400" dirty="0" smtClean="0"/>
-          </a:p>
-          <a:p>
-            <a:pPr lvl="0"/>
-            <a:endParaRPr lang="en-GB" sz="1400" dirty="0"/>
-          </a:p>
-          <a:p>
-            <a:pPr lvl="0"/>
-            <a:endParaRPr lang="en-GB" sz="2000" dirty="0" smtClean="0"/>
-          </a:p>
-          <a:p>
-            <a:pPr lvl="0"/>
-            <a:r>
-              <a:rPr lang="en-GB" sz="2400" dirty="0" smtClean="0"/>
-              <a:t>“</a:t>
-            </a:r>
-            <a:r>
-              <a:rPr lang="en-GB" sz="2400" dirty="0"/>
-              <a:t>10” </a:t>
-            </a:r>
-            <a:r>
-              <a:rPr lang="en-GB" sz="2400" dirty="0" err="1"/>
-              <a:t>PollingMessage</a:t>
-            </a:r>
-            <a:r>
-              <a:rPr lang="en-GB" sz="2400" dirty="0"/>
-              <a:t> (from Image Processing Unit)</a:t>
-            </a:r>
-            <a:endParaRPr lang="de-DE" sz="2400" dirty="0"/>
-          </a:p>
-          <a:p>
-            <a:pPr lvl="1"/>
-            <a:r>
-              <a:rPr lang="en-GB" sz="2000" dirty="0"/>
-              <a:t>“00” </a:t>
-            </a:r>
-            <a:r>
-              <a:rPr lang="en-GB" sz="2000" dirty="0" err="1"/>
-              <a:t>pollInfoMessages</a:t>
-            </a:r>
-            <a:endParaRPr lang="de-DE" sz="2000" dirty="0"/>
-          </a:p>
-          <a:p>
-            <a:pPr lvl="1"/>
-            <a:r>
-              <a:rPr lang="en-GB" sz="2000" dirty="0"/>
-              <a:t>“01” </a:t>
-            </a:r>
-            <a:r>
-              <a:rPr lang="en-GB" sz="2000" dirty="0" err="1"/>
-              <a:t>pollOwnSpeedSensorData</a:t>
-            </a:r>
-            <a:endParaRPr lang="de-DE" sz="2000" dirty="0"/>
-          </a:p>
-          <a:p>
-            <a:pPr lvl="1"/>
-            <a:r>
-              <a:rPr lang="en-GB" sz="2000" dirty="0"/>
-              <a:t>“10” </a:t>
-            </a:r>
-            <a:r>
-              <a:rPr lang="en-GB" sz="2000" dirty="0" err="1"/>
-              <a:t>pollIRSensorData</a:t>
-            </a:r>
-            <a:endParaRPr lang="de-DE" sz="2000" dirty="0"/>
-          </a:p>
-          <a:p>
-            <a:r>
-              <a:rPr lang="en-GB" sz="2000" dirty="0"/>
-              <a:t> </a:t>
-            </a:r>
-            <a:endParaRPr lang="en-GB" sz="2000" dirty="0" smtClean="0"/>
-          </a:p>
-          <a:p>
-            <a:endParaRPr lang="de-DE" sz="2000" dirty="0"/>
-          </a:p>
-          <a:p>
-            <a:pPr lvl="0"/>
-            <a:r>
-              <a:rPr lang="en-GB" sz="2400" dirty="0"/>
-              <a:t>“11” </a:t>
-            </a:r>
-            <a:r>
-              <a:rPr lang="en-GB" sz="2400" dirty="0" err="1"/>
-              <a:t>ControlMessage</a:t>
-            </a:r>
-            <a:r>
-              <a:rPr lang="en-GB" sz="2400" dirty="0"/>
-              <a:t> (station or Image Processing Unit to Remote-Control the Car)</a:t>
-            </a:r>
-          </a:p>
-          <a:p>
-            <a:pPr lvl="1"/>
-            <a:r>
-              <a:rPr lang="en-GB" sz="2000" dirty="0"/>
-              <a:t>“00” </a:t>
-            </a:r>
-            <a:r>
-              <a:rPr lang="en-GB" sz="2000" dirty="0" err="1"/>
-              <a:t>setMotorControlMessage</a:t>
-            </a:r>
-            <a:r>
-              <a:rPr lang="en-GB" sz="2000" dirty="0"/>
-              <a:t> </a:t>
-            </a:r>
-          </a:p>
-          <a:p>
-            <a:endParaRPr lang="de-DE" sz="2000" dirty="0"/>
-          </a:p>
-        </p:txBody>
-      </p:sp>
-    </p:spTree>
-    <p:extLst>
-      <p:ext uri="{BB962C8B-B14F-4D97-AF65-F5344CB8AC3E}">
-        <p14:creationId xmlns:p14="http://schemas.microsoft.com/office/powerpoint/2010/main" val="3252517158"/>
-      </p:ext>
-    </p:extLst>
-  </p:cSld>
-  <p:clrMapOvr>
-    <a:masterClrMapping/>
-  </p:clrMapOvr>
-  <p:timing>
-    <p:tnLst>
-      <p:par>
-        <p:cTn id="1" dur="indefinite" restart="never" nodeType="tmRoot"/>
-      </p:par>
-    </p:tnLst>
-  </p:timing>
-</p:sld>
-</file>
-
-<file path=ppt/slides/slide13.xml><?xml version="1.0" encoding="utf-8"?>
-<p:sld xmlns:a="http://schemas.openxmlformats.org/drawingml/2006/main" xmlns:r="http://schemas.openxmlformats.org/officeDocument/2006/relationships" xmlns:p="http://schemas.openxmlformats.org/presentationml/2006/main">
-  <p:cSld>
-    <p:spTree>
-      <p:nvGrpSpPr>
-        <p:cNvPr id="1" name=""/>
-        <p:cNvGrpSpPr/>
-        <p:nvPr/>
-      </p:nvGrpSpPr>
-      <p:grpSpPr>
-        <a:xfrm>
-          <a:off x="0" y="0"/>
-          <a:ext cx="0" cy="0"/>
-          <a:chOff x="0" y="0"/>
-          <a:chExt cx="0" cy="0"/>
-        </a:xfrm>
-      </p:grpSpPr>
-      <p:sp>
-        <p:nvSpPr>
-          <p:cNvPr id="2" name="Titel 1"/>
-          <p:cNvSpPr>
-            <a:spLocks noGrp="1"/>
-          </p:cNvSpPr>
-          <p:nvPr>
-            <p:ph type="title"/>
-          </p:nvPr>
-        </p:nvSpPr>
-        <p:spPr/>
-        <p:txBody>
-          <a:bodyPr/>
-          <a:lstStyle/>
-          <a:p>
+              <a:t>Communication </a:t>
+            </a:r>
             <a:r>
               <a:rPr lang="de-DE" dirty="0" smtClean="0"/>
-              <a:t>Further </a:t>
-            </a:r>
-            <a:r>
-              <a:rPr lang="de-DE" dirty="0" err="1" smtClean="0"/>
-              <a:t>Steps</a:t>
-            </a:r>
-            <a:endParaRPr lang="de-DE" dirty="0"/>
-          </a:p>
-        </p:txBody>
-      </p:sp>
-      <p:sp>
-        <p:nvSpPr>
-          <p:cNvPr id="3" name="Inhaltsplatzhalter 2"/>
-          <p:cNvSpPr>
-            <a:spLocks noGrp="1"/>
-          </p:cNvSpPr>
-          <p:nvPr>
-            <p:ph idx="1"/>
-          </p:nvPr>
-        </p:nvSpPr>
-        <p:spPr/>
-        <p:txBody>
-          <a:bodyPr/>
-          <a:lstStyle/>
-          <a:p>
-            <a:endParaRPr lang="de-DE" dirty="0"/>
-          </a:p>
-          <a:p>
-            <a:pPr>
-              <a:buFont typeface="Arial"/>
-              <a:buChar char="•"/>
-            </a:pPr>
-            <a:r>
-              <a:rPr lang="de-DE" dirty="0"/>
-              <a:t> </a:t>
-            </a:r>
-            <a:r>
-              <a:rPr lang="de-DE" sz="2400" dirty="0" err="1" smtClean="0"/>
-              <a:t>Migrate</a:t>
-            </a:r>
-            <a:r>
-              <a:rPr lang="de-DE" sz="2400" dirty="0" smtClean="0"/>
-              <a:t> last </a:t>
-            </a:r>
-            <a:r>
-              <a:rPr lang="de-DE" sz="2400" dirty="0" err="1" smtClean="0"/>
-              <a:t>years</a:t>
-            </a:r>
-            <a:r>
-              <a:rPr lang="de-DE" sz="2400" dirty="0" smtClean="0"/>
-              <a:t> </a:t>
-            </a:r>
-            <a:r>
-              <a:rPr lang="de-DE" sz="2400" dirty="0" err="1" smtClean="0"/>
-              <a:t>code</a:t>
-            </a:r>
-            <a:r>
-              <a:rPr lang="de-DE" sz="2400" dirty="0" smtClean="0"/>
-              <a:t> </a:t>
-            </a:r>
-            <a:r>
-              <a:rPr lang="de-DE" sz="2400" dirty="0" err="1" smtClean="0"/>
-              <a:t>to</a:t>
-            </a:r>
-            <a:r>
-              <a:rPr lang="de-DE" sz="2400" dirty="0" smtClean="0"/>
-              <a:t> </a:t>
-            </a:r>
-            <a:r>
-              <a:rPr lang="de-DE" sz="2400" dirty="0" err="1" smtClean="0"/>
-              <a:t>the</a:t>
-            </a:r>
-            <a:r>
-              <a:rPr lang="de-DE" sz="2400" dirty="0" smtClean="0"/>
-              <a:t> </a:t>
-            </a:r>
-            <a:r>
-              <a:rPr lang="de-DE" sz="2400" dirty="0" err="1" smtClean="0"/>
-              <a:t>new</a:t>
-            </a:r>
-            <a:r>
-              <a:rPr lang="de-DE" sz="2400" dirty="0" smtClean="0"/>
-              <a:t> FPGA design</a:t>
-            </a:r>
-          </a:p>
-          <a:p>
-            <a:pPr>
-              <a:buFont typeface="Arial"/>
-              <a:buChar char="•"/>
-            </a:pPr>
-            <a:endParaRPr lang="de-DE" sz="2400" dirty="0" smtClean="0"/>
-          </a:p>
-          <a:p>
-            <a:pPr>
-              <a:buFont typeface="Arial"/>
-              <a:buChar char="•"/>
-            </a:pPr>
-            <a:r>
-              <a:rPr lang="de-DE" sz="2400" dirty="0" smtClean="0"/>
-              <a:t> </a:t>
-            </a:r>
-            <a:r>
-              <a:rPr lang="de-DE" sz="2400" dirty="0" err="1" smtClean="0"/>
-              <a:t>Implement</a:t>
-            </a:r>
-            <a:r>
-              <a:rPr lang="de-DE" sz="2400" dirty="0" smtClean="0"/>
-              <a:t> Car2X </a:t>
-            </a:r>
-            <a:r>
-              <a:rPr lang="de-DE" sz="2400" dirty="0" err="1" smtClean="0"/>
-              <a:t>protocol</a:t>
-            </a:r>
-            <a:endParaRPr lang="de-DE" sz="2400" dirty="0" smtClean="0"/>
-          </a:p>
-          <a:p>
-            <a:pPr>
-              <a:buFont typeface="Arial"/>
-              <a:buChar char="•"/>
-            </a:pPr>
-            <a:endParaRPr lang="de-DE" sz="2400" dirty="0"/>
-          </a:p>
-          <a:p>
-            <a:pPr>
-              <a:buFont typeface="Arial"/>
-              <a:buChar char="•"/>
-            </a:pPr>
-            <a:r>
-              <a:rPr lang="de-DE" sz="2400" dirty="0" smtClean="0"/>
-              <a:t> Add </a:t>
-            </a:r>
-            <a:r>
-              <a:rPr lang="de-DE" sz="2400" dirty="0" err="1" smtClean="0"/>
-              <a:t>WiPort</a:t>
-            </a:r>
-            <a:r>
-              <a:rPr lang="de-DE" sz="2400" dirty="0" smtClean="0"/>
-              <a:t> </a:t>
-            </a:r>
-            <a:r>
-              <a:rPr lang="de-DE" sz="2400" dirty="0" err="1" smtClean="0"/>
-              <a:t>communication</a:t>
-            </a:r>
-            <a:r>
-              <a:rPr lang="de-DE" sz="2400" dirty="0" smtClean="0"/>
-              <a:t> </a:t>
-            </a:r>
-            <a:endParaRPr lang="de-DE" sz="2400" dirty="0"/>
-          </a:p>
-          <a:p>
-            <a:pPr marL="0" indent="0">
-              <a:buNone/>
-            </a:pPr>
-            <a:r>
-              <a:rPr lang="de-DE" dirty="0" smtClean="0"/>
-              <a:t>  </a:t>
-            </a:r>
-            <a:endParaRPr lang="de-DE" dirty="0"/>
-          </a:p>
-        </p:txBody>
-      </p:sp>
-    </p:spTree>
-    <p:extLst>
-      <p:ext uri="{BB962C8B-B14F-4D97-AF65-F5344CB8AC3E}">
-        <p14:creationId xmlns:p14="http://schemas.microsoft.com/office/powerpoint/2010/main" val="3236479569"/>
-      </p:ext>
-    </p:extLst>
-  </p:cSld>
-  <p:clrMapOvr>
-    <a:masterClrMapping/>
-  </p:clrMapOvr>
-  <p:timing>
-    <p:tnLst>
-      <p:par>
-        <p:cTn id="1" dur="indefinite" restart="never" nodeType="tmRoot"/>
-      </p:par>
-    </p:tnLst>
-  </p:timing>
-</p:sld>
-</file>
-
-<file path=ppt/slides/slide2.xml><?xml version="1.0" encoding="utf-8"?>
-<p:sld xmlns:a="http://schemas.openxmlformats.org/drawingml/2006/main" xmlns:r="http://schemas.openxmlformats.org/officeDocument/2006/relationships" xmlns:p="http://schemas.openxmlformats.org/presentationml/2006/main">
-  <p:cSld>
-    <p:spTree>
-      <p:nvGrpSpPr>
-        <p:cNvPr id="1" name=""/>
-        <p:cNvGrpSpPr/>
-        <p:nvPr/>
-      </p:nvGrpSpPr>
-      <p:grpSpPr>
-        <a:xfrm>
-          <a:off x="0" y="0"/>
-          <a:ext cx="0" cy="0"/>
-          <a:chOff x="0" y="0"/>
-          <a:chExt cx="0" cy="0"/>
-        </a:xfrm>
-      </p:grpSpPr>
-      <p:sp>
-        <p:nvSpPr>
-          <p:cNvPr id="2" name="Titel 1"/>
-          <p:cNvSpPr>
-            <a:spLocks noGrp="1"/>
-          </p:cNvSpPr>
-          <p:nvPr>
-            <p:ph type="title"/>
-          </p:nvPr>
-        </p:nvSpPr>
-        <p:spPr/>
-        <p:txBody>
-          <a:bodyPr/>
-          <a:lstStyle/>
-          <a:p>
-            <a:r>
-              <a:rPr lang="de-DE" dirty="0" smtClean="0"/>
-              <a:t>Project Goal</a:t>
-            </a:r>
-            <a:endParaRPr lang="de-DE" dirty="0"/>
-          </a:p>
-        </p:txBody>
-      </p:sp>
-      <p:sp>
-        <p:nvSpPr>
-          <p:cNvPr id="3" name="Inhaltsplatzhalter 2"/>
-          <p:cNvSpPr>
-            <a:spLocks noGrp="1"/>
-          </p:cNvSpPr>
-          <p:nvPr>
-            <p:ph idx="1"/>
-          </p:nvPr>
-        </p:nvSpPr>
-        <p:spPr/>
-        <p:txBody>
-          <a:bodyPr>
-            <a:normAutofit/>
-          </a:bodyPr>
-          <a:lstStyle/>
-          <a:p>
-            <a:pPr>
-              <a:buFont typeface="Wingdings" panose="05000000000000000000" pitchFamily="2" charset="2"/>
-              <a:buChar char="§"/>
-            </a:pPr>
-            <a:r>
-              <a:rPr lang="de-DE" sz="2400" dirty="0" smtClean="0"/>
-              <a:t> allow cars to communicate with each other and with control stations</a:t>
-            </a:r>
-          </a:p>
-          <a:p>
-            <a:pPr>
-              <a:buFont typeface="Wingdings" panose="05000000000000000000" pitchFamily="2" charset="2"/>
-              <a:buChar char="§"/>
-            </a:pPr>
-            <a:r>
-              <a:rPr lang="de-DE" sz="2400" dirty="0" smtClean="0"/>
-              <a:t> exchange diagnostics</a:t>
-            </a:r>
-          </a:p>
-          <a:p>
-            <a:pPr>
-              <a:buFont typeface="Wingdings" panose="05000000000000000000" pitchFamily="2" charset="2"/>
-              <a:buChar char="§"/>
-            </a:pPr>
-            <a:r>
-              <a:rPr lang="de-DE" sz="2400" dirty="0" smtClean="0"/>
-              <a:t> receive situational information and emergency broadcasts</a:t>
-            </a:r>
-          </a:p>
-          <a:p>
-            <a:endParaRPr lang="de-DE" sz="2400" dirty="0"/>
-          </a:p>
-          <a:p>
-            <a:pPr>
-              <a:buFont typeface="Wingdings" panose="05000000000000000000" pitchFamily="2" charset="2"/>
-              <a:buChar char="Ø"/>
-            </a:pPr>
-            <a:r>
-              <a:rPr lang="de-DE" sz="2400" dirty="0" smtClean="0"/>
-              <a:t>information gain leads to improved path planning and car control</a:t>
-            </a:r>
-            <a:endParaRPr lang="de-DE" sz="2400" dirty="0"/>
-          </a:p>
-        </p:txBody>
-      </p:sp>
-    </p:spTree>
-    <p:extLst>
-      <p:ext uri="{BB962C8B-B14F-4D97-AF65-F5344CB8AC3E}">
-        <p14:creationId xmlns:p14="http://schemas.microsoft.com/office/powerpoint/2010/main" val="1043546931"/>
-      </p:ext>
-    </p:extLst>
-  </p:cSld>
-  <p:clrMapOvr>
-    <a:masterClrMapping/>
-  </p:clrMapOvr>
-  <p:timing>
-    <p:tnLst>
-      <p:par>
-        <p:cTn id="1" dur="indefinite" restart="never" nodeType="tmRoot"/>
-      </p:par>
-    </p:tnLst>
-  </p:timing>
-</p:sld>
-</file>
-
-<file path=ppt/slides/slide3.xml><?xml version="1.0" encoding="utf-8"?>
-<p:sld xmlns:a="http://schemas.openxmlformats.org/drawingml/2006/main" xmlns:r="http://schemas.openxmlformats.org/officeDocument/2006/relationships" xmlns:p="http://schemas.openxmlformats.org/presentationml/2006/main">
-  <p:cSld>
-    <p:spTree>
-      <p:nvGrpSpPr>
-        <p:cNvPr id="1" name=""/>
-        <p:cNvGrpSpPr/>
-        <p:nvPr/>
-      </p:nvGrpSpPr>
-      <p:grpSpPr>
-        <a:xfrm>
-          <a:off x="0" y="0"/>
-          <a:ext cx="0" cy="0"/>
-          <a:chOff x="0" y="0"/>
-          <a:chExt cx="0" cy="0"/>
-        </a:xfrm>
-      </p:grpSpPr>
-      <p:sp>
-        <p:nvSpPr>
-          <p:cNvPr id="2" name="Titel 1"/>
-          <p:cNvSpPr>
-            <a:spLocks noGrp="1"/>
-          </p:cNvSpPr>
-          <p:nvPr>
-            <p:ph type="title"/>
-          </p:nvPr>
-        </p:nvSpPr>
-        <p:spPr/>
-        <p:txBody>
-          <a:bodyPr/>
-          <a:lstStyle/>
-          <a:p>
-            <a:r>
-              <a:rPr lang="en-US" dirty="0" smtClean="0"/>
-              <a:t>Main Working Steps so far</a:t>
-            </a:r>
-            <a:endParaRPr lang="en-US" dirty="0"/>
-          </a:p>
-        </p:txBody>
-      </p:sp>
-      <p:sp>
-        <p:nvSpPr>
-          <p:cNvPr id="3" name="Inhaltsplatzhalter 2"/>
-          <p:cNvSpPr>
-            <a:spLocks noGrp="1"/>
-          </p:cNvSpPr>
-          <p:nvPr>
-            <p:ph idx="1"/>
-          </p:nvPr>
-        </p:nvSpPr>
-        <p:spPr/>
-        <p:txBody>
-          <a:bodyPr>
-            <a:noAutofit/>
-          </a:bodyPr>
-          <a:lstStyle/>
-          <a:p>
-            <a:pPr marL="457200" indent="-457200">
-              <a:buFont typeface="+mj-lt"/>
-              <a:buAutoNum type="arabicPeriod"/>
-            </a:pPr>
-            <a:r>
-              <a:rPr lang="en-US" sz="2400" dirty="0" smtClean="0"/>
-              <a:t>Reading the documentation and getting into the previous group‘s code</a:t>
-            </a:r>
-          </a:p>
-          <a:p>
-            <a:pPr marL="457200" indent="-457200">
-              <a:buFont typeface="+mj-lt"/>
-              <a:buAutoNum type="arabicPeriod"/>
-            </a:pPr>
-            <a:r>
-              <a:rPr lang="en-US" sz="2400" dirty="0" smtClean="0"/>
-              <a:t>Installation and tutorials for the Altera </a:t>
-            </a:r>
-            <a:r>
-              <a:rPr lang="en-US" sz="2400" dirty="0" err="1" smtClean="0"/>
-              <a:t>Quartus</a:t>
-            </a:r>
-            <a:r>
-              <a:rPr lang="en-US" sz="2400" dirty="0" smtClean="0"/>
-              <a:t> software (FPGA)</a:t>
-            </a:r>
-          </a:p>
-          <a:p>
-            <a:pPr marL="457200" indent="-457200">
-              <a:buFont typeface="+mj-lt"/>
-              <a:buAutoNum type="arabicPeriod"/>
-            </a:pPr>
-            <a:r>
-              <a:rPr lang="en-US" sz="2400" dirty="0" smtClean="0"/>
-              <a:t>Learn about the </a:t>
-            </a:r>
-            <a:r>
-              <a:rPr lang="en-US" sz="2400" dirty="0" err="1" smtClean="0"/>
-              <a:t>Nios</a:t>
-            </a:r>
-            <a:r>
-              <a:rPr lang="en-US" sz="2400" dirty="0" smtClean="0"/>
-              <a:t> II and multicore implementations on FPGA</a:t>
-            </a:r>
-          </a:p>
-          <a:p>
-            <a:pPr marL="457200" indent="-457200">
-              <a:buFont typeface="+mj-lt"/>
-              <a:buAutoNum type="arabicPeriod"/>
-            </a:pPr>
-            <a:r>
-              <a:rPr lang="en-US" sz="2400" dirty="0" smtClean="0"/>
-              <a:t>Planning the Car2X Protocol and the general hardware setup</a:t>
-            </a:r>
-          </a:p>
-          <a:p>
-            <a:pPr marL="0" indent="0">
-              <a:buNone/>
-            </a:pPr>
-            <a:endParaRPr lang="en-US" sz="1000" dirty="0"/>
-          </a:p>
-          <a:p>
-            <a:pPr marL="0" indent="0">
-              <a:buNone/>
-            </a:pPr>
-            <a:r>
-              <a:rPr lang="en-US" sz="2400" b="1" dirty="0" smtClean="0"/>
-              <a:t>Current WIP:</a:t>
-            </a:r>
-          </a:p>
-          <a:p>
-            <a:r>
-              <a:rPr lang="en-US" sz="2400" dirty="0" smtClean="0"/>
-              <a:t>Basic </a:t>
-            </a:r>
-            <a:r>
-              <a:rPr lang="en-US" sz="2400" dirty="0" err="1" smtClean="0"/>
-              <a:t>Quartus</a:t>
-            </a:r>
-            <a:r>
-              <a:rPr lang="en-US" sz="2400" dirty="0" smtClean="0"/>
-              <a:t> hardware implementation</a:t>
-            </a:r>
-          </a:p>
-          <a:p>
-            <a:r>
-              <a:rPr lang="en-US" sz="2400" dirty="0" smtClean="0"/>
-              <a:t>Experiments with the wireless converter hardware</a:t>
-            </a:r>
-          </a:p>
-          <a:p>
-            <a:r>
-              <a:rPr lang="en-US" sz="2400" dirty="0" smtClean="0"/>
-              <a:t>Setting up PC as car2x station</a:t>
-            </a:r>
-            <a:endParaRPr lang="en-US" sz="2400" dirty="0"/>
-          </a:p>
-        </p:txBody>
-      </p:sp>
-    </p:spTree>
-    <p:extLst>
-      <p:ext uri="{BB962C8B-B14F-4D97-AF65-F5344CB8AC3E}">
-        <p14:creationId xmlns:p14="http://schemas.microsoft.com/office/powerpoint/2010/main" val="2887035778"/>
-      </p:ext>
-    </p:extLst>
-  </p:cSld>
-  <p:clrMapOvr>
-    <a:masterClrMapping/>
-  </p:clrMapOvr>
-  <p:timing>
-    <p:tnLst>
-      <p:par>
-        <p:cTn id="1" dur="indefinite" restart="never" nodeType="tmRoot"/>
-      </p:par>
-    </p:tnLst>
-  </p:timing>
-</p:sld>
-</file>
-
-<file path=ppt/slides/slide4.xml><?xml version="1.0" encoding="utf-8"?>
-<p:sld xmlns:a="http://schemas.openxmlformats.org/drawingml/2006/main" xmlns:r="http://schemas.openxmlformats.org/officeDocument/2006/relationships" xmlns:p="http://schemas.openxmlformats.org/presentationml/2006/main">
-  <p:cSld>
-    <p:spTree>
-      <p:nvGrpSpPr>
-        <p:cNvPr id="1" name=""/>
-        <p:cNvGrpSpPr/>
-        <p:nvPr/>
-      </p:nvGrpSpPr>
-      <p:grpSpPr>
-        <a:xfrm>
-          <a:off x="0" y="0"/>
-          <a:ext cx="0" cy="0"/>
-          <a:chOff x="0" y="0"/>
-          <a:chExt cx="0" cy="0"/>
-        </a:xfrm>
-      </p:grpSpPr>
-      <p:sp>
-        <p:nvSpPr>
-          <p:cNvPr id="2" name="Titel 1"/>
-          <p:cNvSpPr>
-            <a:spLocks noGrp="1"/>
-          </p:cNvSpPr>
-          <p:nvPr>
-            <p:ph type="title"/>
-          </p:nvPr>
-        </p:nvSpPr>
-        <p:spPr/>
-        <p:txBody>
-          <a:bodyPr/>
-          <a:lstStyle/>
-          <a:p>
-            <a:r>
-              <a:rPr lang="de-DE" dirty="0" smtClean="0"/>
-              <a:t>Communication Flow</a:t>
+              <a:t>Flow (PAUL)</a:t>
             </a:r>
             <a:endParaRPr lang="de-DE" dirty="0"/>
           </a:p>
@@ -5656,10 +4218,10 @@
         </p:nvGrpSpPr>
         <p:grpSpPr>
           <a:xfrm>
-            <a:off x="1922398" y="2179133"/>
-            <a:ext cx="8874256" cy="3400967"/>
-            <a:chOff x="1920869" y="2179133"/>
-            <a:chExt cx="8874256" cy="3400967"/>
+            <a:off x="1589468" y="2179133"/>
+            <a:ext cx="9145532" cy="3400967"/>
+            <a:chOff x="1649593" y="2179133"/>
+            <a:chExt cx="9145532" cy="3400967"/>
           </a:xfrm>
         </p:grpSpPr>
         <p:sp>
@@ -5965,606 +4527,22 @@
           </p:nvGrpSpPr>
           <p:grpSpPr>
             <a:xfrm>
-              <a:off x="1920869" y="2424409"/>
-              <a:ext cx="3899203" cy="2633365"/>
-              <a:chOff x="190706" y="2814358"/>
-              <a:chExt cx="3899203" cy="2633365"/>
+              <a:off x="1649593" y="2412080"/>
+              <a:ext cx="4170479" cy="2633365"/>
+              <a:chOff x="-80570" y="2802029"/>
+              <a:chExt cx="4170479" cy="2633365"/>
             </a:xfrm>
           </p:grpSpPr>
-          <p:grpSp>
-            <p:nvGrpSpPr>
-              <p:cNvPr id="54" name="Group 53"/>
-              <p:cNvGrpSpPr/>
-              <p:nvPr/>
-            </p:nvGrpSpPr>
-            <p:grpSpPr>
-              <a:xfrm>
-                <a:off x="190706" y="2814358"/>
-                <a:ext cx="3889677" cy="2633365"/>
-                <a:chOff x="1291426" y="2922309"/>
-                <a:chExt cx="2781993" cy="2318636"/>
-              </a:xfrm>
-            </p:grpSpPr>
-            <p:sp>
-              <p:nvSpPr>
-                <p:cNvPr id="15" name="Freeform 14"/>
-                <p:cNvSpPr/>
-                <p:nvPr/>
-              </p:nvSpPr>
-              <p:spPr>
-                <a:xfrm>
-                  <a:off x="1291426" y="2922309"/>
-                  <a:ext cx="2781993" cy="2318636"/>
-                </a:xfrm>
-                <a:custGeom>
-                  <a:avLst/>
-                  <a:gdLst>
-                    <a:gd name="connsiteX0" fmla="*/ 0 w 3094136"/>
-                    <a:gd name="connsiteY0" fmla="*/ 0 h 1856482"/>
-                    <a:gd name="connsiteX1" fmla="*/ 3094136 w 3094136"/>
-                    <a:gd name="connsiteY1" fmla="*/ 0 h 1856482"/>
-                    <a:gd name="connsiteX2" fmla="*/ 3094136 w 3094136"/>
-                    <a:gd name="connsiteY2" fmla="*/ 1856482 h 1856482"/>
-                    <a:gd name="connsiteX3" fmla="*/ 0 w 3094136"/>
-                    <a:gd name="connsiteY3" fmla="*/ 1856482 h 1856482"/>
-                    <a:gd name="connsiteX4" fmla="*/ 0 w 3094136"/>
-                    <a:gd name="connsiteY4" fmla="*/ 0 h 1856482"/>
-                  </a:gdLst>
-                  <a:ahLst/>
-                  <a:cxnLst>
-                    <a:cxn ang="0">
-                      <a:pos x="connsiteX0" y="connsiteY0"/>
-                    </a:cxn>
-                    <a:cxn ang="0">
-                      <a:pos x="connsiteX1" y="connsiteY1"/>
-                    </a:cxn>
-                    <a:cxn ang="0">
-                      <a:pos x="connsiteX2" y="connsiteY2"/>
-                    </a:cxn>
-                    <a:cxn ang="0">
-                      <a:pos x="connsiteX3" y="connsiteY3"/>
-                    </a:cxn>
-                    <a:cxn ang="0">
-                      <a:pos x="connsiteX4" y="connsiteY4"/>
-                    </a:cxn>
-                  </a:cxnLst>
-                  <a:rect l="l" t="t" r="r" b="b"/>
-                  <a:pathLst>
-                    <a:path w="3094136" h="1856482">
-                      <a:moveTo>
-                        <a:pt x="0" y="0"/>
-                      </a:moveTo>
-                      <a:lnTo>
-                        <a:pt x="3094136" y="0"/>
-                      </a:lnTo>
-                      <a:lnTo>
-                        <a:pt x="3094136" y="1856482"/>
-                      </a:lnTo>
-                      <a:lnTo>
-                        <a:pt x="0" y="1856482"/>
-                      </a:lnTo>
-                      <a:lnTo>
-                        <a:pt x="0" y="0"/>
-                      </a:lnTo>
-                      <a:close/>
-                    </a:path>
-                  </a:pathLst>
-                </a:custGeom>
-                <a:solidFill>
-                  <a:schemeClr val="accent1">
-                    <a:lumMod val="40000"/>
-                    <a:lumOff val="60000"/>
-                  </a:schemeClr>
-                </a:solidFill>
-                <a:ln w="57150">
-                  <a:solidFill>
-                    <a:schemeClr val="accent1"/>
-                  </a:solidFill>
-                </a:ln>
-              </p:spPr>
-              <p:style>
-                <a:lnRef idx="2">
-                  <a:schemeClr val="lt1">
-                    <a:hueOff val="0"/>
-                    <a:satOff val="0"/>
-                    <a:lumOff val="0"/>
-                    <a:alphaOff val="0"/>
-                  </a:schemeClr>
-                </a:lnRef>
-                <a:fillRef idx="1">
-                  <a:schemeClr val="accent1">
-                    <a:hueOff val="0"/>
-                    <a:satOff val="0"/>
-                    <a:lumOff val="0"/>
-                    <a:alphaOff val="0"/>
-                  </a:schemeClr>
-                </a:fillRef>
-                <a:effectRef idx="0">
-                  <a:schemeClr val="accent1">
-                    <a:hueOff val="0"/>
-                    <a:satOff val="0"/>
-                    <a:lumOff val="0"/>
-                    <a:alphaOff val="0"/>
-                  </a:schemeClr>
-                </a:effectRef>
-                <a:fontRef idx="minor">
-                  <a:schemeClr val="lt1"/>
-                </a:fontRef>
-              </p:style>
-              <p:txBody>
-                <a:bodyPr spcFirstLastPara="0" vert="horz" wrap="square" lIns="247650" tIns="247650" rIns="247650" bIns="247650" numCol="1" spcCol="1270" anchor="t" anchorCtr="0">
-                  <a:noAutofit/>
-                </a:bodyPr>
-                <a:lstStyle/>
-                <a:p>
-                  <a:pPr lvl="0" algn="ctr" defTabSz="2889250">
-                    <a:lnSpc>
-                      <a:spcPct val="90000"/>
-                    </a:lnSpc>
-                    <a:spcBef>
-                      <a:spcPct val="0"/>
-                    </a:spcBef>
-                    <a:spcAft>
-                      <a:spcPct val="35000"/>
-                    </a:spcAft>
-                  </a:pPr>
-                  <a:r>
-                    <a:rPr lang="en-US" sz="3200" kern="1200" dirty="0" smtClean="0">
-                      <a:solidFill>
-                        <a:schemeClr val="tx1"/>
-                      </a:solidFill>
-                    </a:rPr>
-                    <a:t>Altera FPGA</a:t>
-                  </a:r>
-                  <a:endParaRPr lang="en-US" sz="3200" kern="1200" dirty="0">
-                    <a:solidFill>
-                      <a:schemeClr val="tx1"/>
-                    </a:solidFill>
-                  </a:endParaRPr>
-                </a:p>
-              </p:txBody>
-            </p:sp>
-            <p:sp>
-              <p:nvSpPr>
-                <p:cNvPr id="19" name="Freeform 18"/>
-                <p:cNvSpPr/>
-                <p:nvPr/>
-              </p:nvSpPr>
-              <p:spPr>
-                <a:xfrm>
-                  <a:off x="1931960" y="4009663"/>
-                  <a:ext cx="841870" cy="396876"/>
-                </a:xfrm>
-                <a:custGeom>
-                  <a:avLst/>
-                  <a:gdLst>
-                    <a:gd name="connsiteX0" fmla="*/ 0 w 3094136"/>
-                    <a:gd name="connsiteY0" fmla="*/ 0 h 1856482"/>
-                    <a:gd name="connsiteX1" fmla="*/ 3094136 w 3094136"/>
-                    <a:gd name="connsiteY1" fmla="*/ 0 h 1856482"/>
-                    <a:gd name="connsiteX2" fmla="*/ 3094136 w 3094136"/>
-                    <a:gd name="connsiteY2" fmla="*/ 1856482 h 1856482"/>
-                    <a:gd name="connsiteX3" fmla="*/ 0 w 3094136"/>
-                    <a:gd name="connsiteY3" fmla="*/ 1856482 h 1856482"/>
-                    <a:gd name="connsiteX4" fmla="*/ 0 w 3094136"/>
-                    <a:gd name="connsiteY4" fmla="*/ 0 h 1856482"/>
-                  </a:gdLst>
-                  <a:ahLst/>
-                  <a:cxnLst>
-                    <a:cxn ang="0">
-                      <a:pos x="connsiteX0" y="connsiteY0"/>
-                    </a:cxn>
-                    <a:cxn ang="0">
-                      <a:pos x="connsiteX1" y="connsiteY1"/>
-                    </a:cxn>
-                    <a:cxn ang="0">
-                      <a:pos x="connsiteX2" y="connsiteY2"/>
-                    </a:cxn>
-                    <a:cxn ang="0">
-                      <a:pos x="connsiteX3" y="connsiteY3"/>
-                    </a:cxn>
-                    <a:cxn ang="0">
-                      <a:pos x="connsiteX4" y="connsiteY4"/>
-                    </a:cxn>
-                  </a:cxnLst>
-                  <a:rect l="l" t="t" r="r" b="b"/>
-                  <a:pathLst>
-                    <a:path w="3094136" h="1856482">
-                      <a:moveTo>
-                        <a:pt x="0" y="0"/>
-                      </a:moveTo>
-                      <a:lnTo>
-                        <a:pt x="3094136" y="0"/>
-                      </a:lnTo>
-                      <a:lnTo>
-                        <a:pt x="3094136" y="1856482"/>
-                      </a:lnTo>
-                      <a:lnTo>
-                        <a:pt x="0" y="1856482"/>
-                      </a:lnTo>
-                      <a:lnTo>
-                        <a:pt x="0" y="0"/>
-                      </a:lnTo>
-                      <a:close/>
-                    </a:path>
-                  </a:pathLst>
-                </a:custGeom>
-              </p:spPr>
-              <p:style>
-                <a:lnRef idx="2">
-                  <a:schemeClr val="lt1">
-                    <a:hueOff val="0"/>
-                    <a:satOff val="0"/>
-                    <a:lumOff val="0"/>
-                    <a:alphaOff val="0"/>
-                  </a:schemeClr>
-                </a:lnRef>
-                <a:fillRef idx="1">
-                  <a:schemeClr val="accent1">
-                    <a:hueOff val="0"/>
-                    <a:satOff val="0"/>
-                    <a:lumOff val="0"/>
-                    <a:alphaOff val="0"/>
-                  </a:schemeClr>
-                </a:fillRef>
-                <a:effectRef idx="0">
-                  <a:schemeClr val="accent1">
-                    <a:hueOff val="0"/>
-                    <a:satOff val="0"/>
-                    <a:lumOff val="0"/>
-                    <a:alphaOff val="0"/>
-                  </a:schemeClr>
-                </a:effectRef>
-                <a:fontRef idx="minor">
-                  <a:schemeClr val="lt1"/>
-                </a:fontRef>
-              </p:style>
-              <p:txBody>
-                <a:bodyPr spcFirstLastPara="0" vert="horz" wrap="square" lIns="247650" tIns="247650" rIns="247650" bIns="247650" numCol="1" spcCol="1270" anchor="ctr" anchorCtr="0">
-                  <a:noAutofit/>
-                </a:bodyPr>
-                <a:lstStyle/>
-                <a:p>
-                  <a:pPr lvl="0" algn="ctr" defTabSz="2889250">
-                    <a:lnSpc>
-                      <a:spcPct val="90000"/>
-                    </a:lnSpc>
-                    <a:spcBef>
-                      <a:spcPct val="0"/>
-                    </a:spcBef>
-                    <a:spcAft>
-                      <a:spcPct val="35000"/>
-                    </a:spcAft>
-                  </a:pPr>
-                  <a:r>
-                    <a:rPr lang="en-US" sz="1600" dirty="0" smtClean="0"/>
-                    <a:t>Com-Core</a:t>
-                  </a:r>
-                  <a:endParaRPr lang="en-US" sz="1600" kern="1200" dirty="0"/>
-                </a:p>
-              </p:txBody>
-            </p:sp>
-            <p:sp>
-              <p:nvSpPr>
-                <p:cNvPr id="20" name="Freeform 19"/>
-                <p:cNvSpPr/>
-                <p:nvPr/>
-              </p:nvSpPr>
-              <p:spPr>
-                <a:xfrm>
-                  <a:off x="1939830" y="4742763"/>
-                  <a:ext cx="837906" cy="396875"/>
-                </a:xfrm>
-                <a:custGeom>
-                  <a:avLst/>
-                  <a:gdLst>
-                    <a:gd name="connsiteX0" fmla="*/ 0 w 3094136"/>
-                    <a:gd name="connsiteY0" fmla="*/ 0 h 1856482"/>
-                    <a:gd name="connsiteX1" fmla="*/ 3094136 w 3094136"/>
-                    <a:gd name="connsiteY1" fmla="*/ 0 h 1856482"/>
-                    <a:gd name="connsiteX2" fmla="*/ 3094136 w 3094136"/>
-                    <a:gd name="connsiteY2" fmla="*/ 1856482 h 1856482"/>
-                    <a:gd name="connsiteX3" fmla="*/ 0 w 3094136"/>
-                    <a:gd name="connsiteY3" fmla="*/ 1856482 h 1856482"/>
-                    <a:gd name="connsiteX4" fmla="*/ 0 w 3094136"/>
-                    <a:gd name="connsiteY4" fmla="*/ 0 h 1856482"/>
-                  </a:gdLst>
-                  <a:ahLst/>
-                  <a:cxnLst>
-                    <a:cxn ang="0">
-                      <a:pos x="connsiteX0" y="connsiteY0"/>
-                    </a:cxn>
-                    <a:cxn ang="0">
-                      <a:pos x="connsiteX1" y="connsiteY1"/>
-                    </a:cxn>
-                    <a:cxn ang="0">
-                      <a:pos x="connsiteX2" y="connsiteY2"/>
-                    </a:cxn>
-                    <a:cxn ang="0">
-                      <a:pos x="connsiteX3" y="connsiteY3"/>
-                    </a:cxn>
-                    <a:cxn ang="0">
-                      <a:pos x="connsiteX4" y="connsiteY4"/>
-                    </a:cxn>
-                  </a:cxnLst>
-                  <a:rect l="l" t="t" r="r" b="b"/>
-                  <a:pathLst>
-                    <a:path w="3094136" h="1856482">
-                      <a:moveTo>
-                        <a:pt x="0" y="0"/>
-                      </a:moveTo>
-                      <a:lnTo>
-                        <a:pt x="3094136" y="0"/>
-                      </a:lnTo>
-                      <a:lnTo>
-                        <a:pt x="3094136" y="1856482"/>
-                      </a:lnTo>
-                      <a:lnTo>
-                        <a:pt x="0" y="1856482"/>
-                      </a:lnTo>
-                      <a:lnTo>
-                        <a:pt x="0" y="0"/>
-                      </a:lnTo>
-                      <a:close/>
-                    </a:path>
-                  </a:pathLst>
-                </a:custGeom>
-              </p:spPr>
-              <p:style>
-                <a:lnRef idx="2">
-                  <a:schemeClr val="lt1">
-                    <a:hueOff val="0"/>
-                    <a:satOff val="0"/>
-                    <a:lumOff val="0"/>
-                    <a:alphaOff val="0"/>
-                  </a:schemeClr>
-                </a:lnRef>
-                <a:fillRef idx="1">
-                  <a:schemeClr val="accent1">
-                    <a:hueOff val="0"/>
-                    <a:satOff val="0"/>
-                    <a:lumOff val="0"/>
-                    <a:alphaOff val="0"/>
-                  </a:schemeClr>
-                </a:fillRef>
-                <a:effectRef idx="0">
-                  <a:schemeClr val="accent1">
-                    <a:hueOff val="0"/>
-                    <a:satOff val="0"/>
-                    <a:lumOff val="0"/>
-                    <a:alphaOff val="0"/>
-                  </a:schemeClr>
-                </a:effectRef>
-                <a:fontRef idx="minor">
-                  <a:schemeClr val="lt1"/>
-                </a:fontRef>
-              </p:style>
-              <p:txBody>
-                <a:bodyPr spcFirstLastPara="0" vert="horz" wrap="square" lIns="247650" tIns="247650" rIns="247650" bIns="247650" numCol="1" spcCol="1270" anchor="ctr" anchorCtr="0">
-                  <a:noAutofit/>
-                </a:bodyPr>
-                <a:lstStyle/>
-                <a:p>
-                  <a:pPr lvl="0" algn="ctr" defTabSz="2889250">
-                    <a:lnSpc>
-                      <a:spcPct val="90000"/>
-                    </a:lnSpc>
-                    <a:spcBef>
-                      <a:spcPct val="0"/>
-                    </a:spcBef>
-                    <a:spcAft>
-                      <a:spcPct val="35000"/>
-                    </a:spcAft>
-                  </a:pPr>
-                  <a:r>
-                    <a:rPr lang="en-US" sz="1600" dirty="0" smtClean="0"/>
-                    <a:t>Control-Core</a:t>
-                  </a:r>
-                  <a:endParaRPr lang="en-US" sz="1600" kern="1200" dirty="0"/>
-                </a:p>
-              </p:txBody>
-            </p:sp>
-            <p:sp>
-              <p:nvSpPr>
-                <p:cNvPr id="21" name="Freeform 20"/>
-                <p:cNvSpPr/>
-                <p:nvPr/>
-              </p:nvSpPr>
-              <p:spPr>
-                <a:xfrm>
-                  <a:off x="3021833" y="4010010"/>
-                  <a:ext cx="880510" cy="396875"/>
-                </a:xfrm>
-                <a:custGeom>
-                  <a:avLst/>
-                  <a:gdLst>
-                    <a:gd name="connsiteX0" fmla="*/ 0 w 3094136"/>
-                    <a:gd name="connsiteY0" fmla="*/ 0 h 1856482"/>
-                    <a:gd name="connsiteX1" fmla="*/ 3094136 w 3094136"/>
-                    <a:gd name="connsiteY1" fmla="*/ 0 h 1856482"/>
-                    <a:gd name="connsiteX2" fmla="*/ 3094136 w 3094136"/>
-                    <a:gd name="connsiteY2" fmla="*/ 1856482 h 1856482"/>
-                    <a:gd name="connsiteX3" fmla="*/ 0 w 3094136"/>
-                    <a:gd name="connsiteY3" fmla="*/ 1856482 h 1856482"/>
-                    <a:gd name="connsiteX4" fmla="*/ 0 w 3094136"/>
-                    <a:gd name="connsiteY4" fmla="*/ 0 h 1856482"/>
-                  </a:gdLst>
-                  <a:ahLst/>
-                  <a:cxnLst>
-                    <a:cxn ang="0">
-                      <a:pos x="connsiteX0" y="connsiteY0"/>
-                    </a:cxn>
-                    <a:cxn ang="0">
-                      <a:pos x="connsiteX1" y="connsiteY1"/>
-                    </a:cxn>
-                    <a:cxn ang="0">
-                      <a:pos x="connsiteX2" y="connsiteY2"/>
-                    </a:cxn>
-                    <a:cxn ang="0">
-                      <a:pos x="connsiteX3" y="connsiteY3"/>
-                    </a:cxn>
-                    <a:cxn ang="0">
-                      <a:pos x="connsiteX4" y="connsiteY4"/>
-                    </a:cxn>
-                  </a:cxnLst>
-                  <a:rect l="l" t="t" r="r" b="b"/>
-                  <a:pathLst>
-                    <a:path w="3094136" h="1856482">
-                      <a:moveTo>
-                        <a:pt x="0" y="0"/>
-                      </a:moveTo>
-                      <a:lnTo>
-                        <a:pt x="3094136" y="0"/>
-                      </a:lnTo>
-                      <a:lnTo>
-                        <a:pt x="3094136" y="1856482"/>
-                      </a:lnTo>
-                      <a:lnTo>
-                        <a:pt x="0" y="1856482"/>
-                      </a:lnTo>
-                      <a:lnTo>
-                        <a:pt x="0" y="0"/>
-                      </a:lnTo>
-                      <a:close/>
-                    </a:path>
-                  </a:pathLst>
-                </a:custGeom>
-              </p:spPr>
-              <p:style>
-                <a:lnRef idx="2">
-                  <a:schemeClr val="lt1">
-                    <a:hueOff val="0"/>
-                    <a:satOff val="0"/>
-                    <a:lumOff val="0"/>
-                    <a:alphaOff val="0"/>
-                  </a:schemeClr>
-                </a:lnRef>
-                <a:fillRef idx="1">
-                  <a:schemeClr val="accent1">
-                    <a:hueOff val="0"/>
-                    <a:satOff val="0"/>
-                    <a:lumOff val="0"/>
-                    <a:alphaOff val="0"/>
-                  </a:schemeClr>
-                </a:fillRef>
-                <a:effectRef idx="0">
-                  <a:schemeClr val="accent1">
-                    <a:hueOff val="0"/>
-                    <a:satOff val="0"/>
-                    <a:lumOff val="0"/>
-                    <a:alphaOff val="0"/>
-                  </a:schemeClr>
-                </a:effectRef>
-                <a:fontRef idx="minor">
-                  <a:schemeClr val="lt1"/>
-                </a:fontRef>
-              </p:style>
-              <p:txBody>
-                <a:bodyPr spcFirstLastPara="0" vert="horz" wrap="square" lIns="247650" tIns="247650" rIns="247650" bIns="247650" numCol="1" spcCol="1270" anchor="ctr" anchorCtr="0">
-                  <a:noAutofit/>
-                </a:bodyPr>
-                <a:lstStyle/>
-                <a:p>
-                  <a:pPr lvl="0" algn="ctr" defTabSz="2889250">
-                    <a:lnSpc>
-                      <a:spcPct val="90000"/>
-                    </a:lnSpc>
-                    <a:spcBef>
-                      <a:spcPct val="0"/>
-                    </a:spcBef>
-                    <a:spcAft>
-                      <a:spcPct val="35000"/>
-                    </a:spcAft>
-                  </a:pPr>
-                  <a:r>
-                    <a:rPr lang="en-US" sz="1600" dirty="0" err="1" smtClean="0"/>
-                    <a:t>ethernet</a:t>
-                  </a:r>
-                  <a:endParaRPr lang="en-US" sz="1600" kern="1200" dirty="0"/>
-                </a:p>
-              </p:txBody>
-            </p:sp>
-          </p:grpSp>
-          <p:cxnSp>
-            <p:nvCxnSpPr>
-              <p:cNvPr id="63" name="Straight Connector 62"/>
-              <p:cNvCxnSpPr/>
-              <p:nvPr/>
-            </p:nvCxnSpPr>
-            <p:spPr>
-              <a:xfrm flipH="1">
-                <a:off x="3831665" y="4271867"/>
-                <a:ext cx="258244" cy="3208"/>
-              </a:xfrm>
-              <a:prstGeom prst="line">
-                <a:avLst/>
-              </a:prstGeom>
-              <a:ln cap="rnd">
-                <a:prstDash val="sysDash"/>
-                <a:headEnd type="none"/>
-                <a:tailEnd type="triangle"/>
-              </a:ln>
-            </p:spPr>
-            <p:style>
-              <a:lnRef idx="2">
-                <a:schemeClr val="dk1"/>
-              </a:lnRef>
-              <a:fillRef idx="0">
-                <a:schemeClr val="dk1"/>
-              </a:fillRef>
-              <a:effectRef idx="1">
-                <a:schemeClr val="dk1"/>
-              </a:effectRef>
-              <a:fontRef idx="minor">
-                <a:schemeClr val="tx1"/>
-              </a:fontRef>
-            </p:style>
-          </p:cxnSp>
-          <p:cxnSp>
-            <p:nvCxnSpPr>
-              <p:cNvPr id="66" name="Straight Arrow Connector 65"/>
-              <p:cNvCxnSpPr/>
-              <p:nvPr/>
-            </p:nvCxnSpPr>
-            <p:spPr>
-              <a:xfrm flipH="1" flipV="1">
-                <a:off x="2263347" y="4271867"/>
-                <a:ext cx="347429" cy="3208"/>
-              </a:xfrm>
-              <a:prstGeom prst="straightConnector1">
-                <a:avLst/>
-              </a:prstGeom>
-              <a:ln>
-                <a:prstDash val="sysDash"/>
-                <a:headEnd type="triangle"/>
-                <a:tailEnd type="triangle"/>
-              </a:ln>
-            </p:spPr>
-            <p:style>
-              <a:lnRef idx="2">
-                <a:schemeClr val="dk1"/>
-              </a:lnRef>
-              <a:fillRef idx="0">
-                <a:schemeClr val="dk1"/>
-              </a:fillRef>
-              <a:effectRef idx="1">
-                <a:schemeClr val="dk1"/>
-              </a:effectRef>
-              <a:fontRef idx="minor">
-                <a:schemeClr val="tx1"/>
-              </a:fontRef>
-            </p:style>
-          </p:cxnSp>
           <p:sp>
             <p:nvSpPr>
-              <p:cNvPr id="67" name="Freeform 66"/>
+              <p:cNvPr id="15" name="Freeform 14"/>
               <p:cNvSpPr/>
               <p:nvPr/>
             </p:nvSpPr>
             <p:spPr>
               <a:xfrm>
-                <a:off x="276294" y="4049308"/>
-                <a:ext cx="499444" cy="1283356"/>
+                <a:off x="-80570" y="2802029"/>
+                <a:ext cx="3889677" cy="2633365"/>
               </a:xfrm>
               <a:custGeom>
                 <a:avLst/>
@@ -6620,6 +4598,17 @@
                   </a:path>
                 </a:pathLst>
               </a:custGeom>
+              <a:solidFill>
+                <a:schemeClr val="accent1">
+                  <a:lumMod val="40000"/>
+                  <a:lumOff val="60000"/>
+                </a:schemeClr>
+              </a:solidFill>
+              <a:ln w="57150">
+                <a:solidFill>
+                  <a:schemeClr val="accent1"/>
+                </a:solidFill>
+              </a:ln>
             </p:spPr>
             <p:style>
               <a:lnRef idx="2">
@@ -6651,7 +4640,7 @@
               </a:fontRef>
             </p:style>
             <p:txBody>
-              <a:bodyPr spcFirstLastPara="0" vert="vert270" wrap="square" lIns="247650" tIns="247650" rIns="247650" bIns="247650" numCol="1" spcCol="1270" anchor="ctr" anchorCtr="0">
+              <a:bodyPr spcFirstLastPara="0" vert="horz" wrap="square" lIns="247650" tIns="247650" rIns="247650" bIns="247650" numCol="1" spcCol="1270" anchor="t" anchorCtr="0">
                 <a:noAutofit/>
               </a:bodyPr>
               <a:lstStyle/>
@@ -6668,65 +4657,38 @@
                   </a:spcAft>
                 </a:pPr>
                 <a:r>
-                  <a:rPr lang="en-US" sz="1600" dirty="0" smtClean="0"/>
-                  <a:t>memory</a:t>
+                  <a:rPr lang="en-US" sz="3200" kern="1200" dirty="0" smtClean="0">
+                    <a:solidFill>
+                      <a:schemeClr val="tx1"/>
+                    </a:solidFill>
+                  </a:rPr>
+                  <a:t>Altera FPGA</a:t>
                 </a:r>
-                <a:endParaRPr lang="en-US" sz="1600" kern="1200" dirty="0"/>
+                <a:endParaRPr lang="en-US" sz="3200" kern="1200" dirty="0">
+                  <a:solidFill>
+                    <a:schemeClr val="tx1"/>
+                  </a:solidFill>
+                </a:endParaRPr>
               </a:p>
             </p:txBody>
           </p:sp>
           <p:cxnSp>
             <p:nvCxnSpPr>
-              <p:cNvPr id="68" name="Straight Arrow Connector 67"/>
+              <p:cNvPr id="63" name="Straight Connector 62"/>
               <p:cNvCxnSpPr/>
               <p:nvPr/>
             </p:nvCxnSpPr>
             <p:spPr>
               <a:xfrm flipH="1">
-                <a:off x="774008" y="5107291"/>
-                <a:ext cx="323272" cy="0"/>
+                <a:off x="3831665" y="4271867"/>
+                <a:ext cx="258244" cy="3208"/>
               </a:xfrm>
-              <a:prstGeom prst="straightConnector1">
+              <a:prstGeom prst="line">
                 <a:avLst/>
               </a:prstGeom>
-              <a:ln>
+              <a:ln cap="rnd">
                 <a:prstDash val="sysDash"/>
-                <a:headEnd type="triangle"/>
-                <a:tailEnd type="triangle"/>
-              </a:ln>
-            </p:spPr>
-            <p:style>
-              <a:lnRef idx="2">
-                <a:schemeClr val="dk1"/>
-              </a:lnRef>
-              <a:fillRef idx="0">
-                <a:schemeClr val="dk1"/>
-              </a:fillRef>
-              <a:effectRef idx="1">
-                <a:schemeClr val="dk1"/>
-              </a:effectRef>
-              <a:fontRef idx="minor">
-                <a:schemeClr val="tx1"/>
-              </a:fontRef>
-            </p:style>
-          </p:cxnSp>
-          <p:cxnSp>
-            <p:nvCxnSpPr>
-              <p:cNvPr id="70" name="Straight Arrow Connector 69"/>
-              <p:cNvCxnSpPr/>
-              <p:nvPr/>
-            </p:nvCxnSpPr>
-            <p:spPr>
-              <a:xfrm flipH="1">
-                <a:off x="774008" y="4261236"/>
-                <a:ext cx="323272" cy="0"/>
-              </a:xfrm>
-              <a:prstGeom prst="straightConnector1">
-                <a:avLst/>
-              </a:prstGeom>
-              <a:ln>
-                <a:prstDash val="sysDash"/>
-                <a:headEnd type="triangle"/>
+                <a:headEnd type="none"/>
                 <a:tailEnd type="triangle"/>
               </a:ln>
             </p:spPr>
@@ -7064,7 +5026,7 @@
         </p:nvCxnSpPr>
         <p:spPr>
           <a:xfrm>
-            <a:off x="7997451" y="3884010"/>
+            <a:off x="7935797" y="3884010"/>
             <a:ext cx="982165" cy="440515"/>
           </a:xfrm>
           <a:prstGeom prst="bentConnector3">
@@ -7103,10 +5065,984 @@
   <p:timing>
     <p:tnLst>
       <p:par>
-        <p:cTn id="1" dur="indefinite" restart="never" nodeType="tmRoot"/>
+        <p:cTn xmlns:p14="http://schemas.microsoft.com/office/powerpoint/2010/main" id="1" dur="indefinite" restart="never" nodeType="tmRoot"/>
       </p:par>
     </p:tnLst>
   </p:timing>
+</p:sld>
+</file>
+
+<file path=ppt/slides/slide12.xml><?xml version="1.0" encoding="utf-8"?>
+<p:sld xmlns:a="http://schemas.openxmlformats.org/drawingml/2006/main" xmlns:r="http://schemas.openxmlformats.org/officeDocument/2006/relationships" xmlns:p="http://schemas.openxmlformats.org/presentationml/2006/main">
+  <p:cSld>
+    <p:spTree>
+      <p:nvGrpSpPr>
+        <p:cNvPr id="1" name=""/>
+        <p:cNvGrpSpPr/>
+        <p:nvPr/>
+      </p:nvGrpSpPr>
+      <p:grpSpPr>
+        <a:xfrm>
+          <a:off x="0" y="0"/>
+          <a:ext cx="0" cy="0"/>
+          <a:chOff x="0" y="0"/>
+          <a:chExt cx="0" cy="0"/>
+        </a:xfrm>
+      </p:grpSpPr>
+      <p:sp>
+        <p:nvSpPr>
+          <p:cNvPr id="2" name="Titel 1"/>
+          <p:cNvSpPr>
+            <a:spLocks noGrp="1"/>
+          </p:cNvSpPr>
+          <p:nvPr>
+            <p:ph type="title"/>
+          </p:nvPr>
+        </p:nvSpPr>
+        <p:spPr/>
+        <p:txBody>
+          <a:bodyPr/>
+          <a:lstStyle/>
+          <a:p>
+            <a:r>
+              <a:rPr lang="de-DE" dirty="0" smtClean="0"/>
+              <a:t>Communication Core (PAUL)</a:t>
+            </a:r>
+            <a:endParaRPr lang="de-DE" dirty="0"/>
+          </a:p>
+        </p:txBody>
+      </p:sp>
+      <p:sp>
+        <p:nvSpPr>
+          <p:cNvPr id="3" name="Inhaltsplatzhalter 2"/>
+          <p:cNvSpPr>
+            <a:spLocks noGrp="1"/>
+          </p:cNvSpPr>
+          <p:nvPr>
+            <p:ph idx="1"/>
+          </p:nvPr>
+        </p:nvSpPr>
+        <p:spPr/>
+        <p:txBody>
+          <a:bodyPr/>
+          <a:lstStyle/>
+          <a:p>
+            <a:endParaRPr lang="de-DE"/>
+          </a:p>
+        </p:txBody>
+      </p:sp>
+    </p:spTree>
+    <p:extLst>
+      <p:ext uri="{BB962C8B-B14F-4D97-AF65-F5344CB8AC3E}">
+        <p14:creationId xmlns:p14="http://schemas.microsoft.com/office/powerpoint/2010/main" val="1665394185"/>
+      </p:ext>
+    </p:extLst>
+  </p:cSld>
+  <p:clrMapOvr>
+    <a:masterClrMapping/>
+  </p:clrMapOvr>
+</p:sld>
+</file>
+
+<file path=ppt/slides/slide13.xml><?xml version="1.0" encoding="utf-8"?>
+<p:sld xmlns:a="http://schemas.openxmlformats.org/drawingml/2006/main" xmlns:r="http://schemas.openxmlformats.org/officeDocument/2006/relationships" xmlns:p="http://schemas.openxmlformats.org/presentationml/2006/main">
+  <p:cSld>
+    <p:spTree>
+      <p:nvGrpSpPr>
+        <p:cNvPr id="1" name=""/>
+        <p:cNvGrpSpPr/>
+        <p:nvPr/>
+      </p:nvGrpSpPr>
+      <p:grpSpPr>
+        <a:xfrm>
+          <a:off x="0" y="0"/>
+          <a:ext cx="0" cy="0"/>
+          <a:chOff x="0" y="0"/>
+          <a:chExt cx="0" cy="0"/>
+        </a:xfrm>
+      </p:grpSpPr>
+      <p:sp>
+        <p:nvSpPr>
+          <p:cNvPr id="2" name="Titel 1"/>
+          <p:cNvSpPr>
+            <a:spLocks noGrp="1"/>
+          </p:cNvSpPr>
+          <p:nvPr>
+            <p:ph type="title"/>
+          </p:nvPr>
+        </p:nvSpPr>
+        <p:spPr/>
+        <p:txBody>
+          <a:bodyPr/>
+          <a:lstStyle/>
+          <a:p>
+            <a:r>
+              <a:rPr lang="de-DE" dirty="0" smtClean="0"/>
+              <a:t>Car </a:t>
+            </a:r>
+            <a:r>
+              <a:rPr lang="de-DE" dirty="0" err="1" smtClean="0"/>
+              <a:t>Control</a:t>
+            </a:r>
+            <a:r>
+              <a:rPr lang="de-DE" dirty="0" smtClean="0"/>
+              <a:t> Core (JO)</a:t>
+            </a:r>
+            <a:endParaRPr lang="de-DE" dirty="0"/>
+          </a:p>
+        </p:txBody>
+      </p:sp>
+      <p:sp>
+        <p:nvSpPr>
+          <p:cNvPr id="3" name="Inhaltsplatzhalter 2"/>
+          <p:cNvSpPr>
+            <a:spLocks noGrp="1"/>
+          </p:cNvSpPr>
+          <p:nvPr>
+            <p:ph idx="1"/>
+          </p:nvPr>
+        </p:nvSpPr>
+        <p:spPr/>
+        <p:txBody>
+          <a:bodyPr/>
+          <a:lstStyle/>
+          <a:p>
+            <a:endParaRPr lang="de-DE"/>
+          </a:p>
+        </p:txBody>
+      </p:sp>
+    </p:spTree>
+    <p:extLst>
+      <p:ext uri="{BB962C8B-B14F-4D97-AF65-F5344CB8AC3E}">
+        <p14:creationId xmlns:p14="http://schemas.microsoft.com/office/powerpoint/2010/main" val="3934891510"/>
+      </p:ext>
+    </p:extLst>
+  </p:cSld>
+  <p:clrMapOvr>
+    <a:masterClrMapping/>
+  </p:clrMapOvr>
+</p:sld>
+</file>
+
+<file path=ppt/slides/slide14.xml><?xml version="1.0" encoding="utf-8"?>
+<p:sld xmlns:a="http://schemas.openxmlformats.org/drawingml/2006/main" xmlns:r="http://schemas.openxmlformats.org/officeDocument/2006/relationships" xmlns:p="http://schemas.openxmlformats.org/presentationml/2006/main">
+  <p:cSld>
+    <p:spTree>
+      <p:nvGrpSpPr>
+        <p:cNvPr id="1" name=""/>
+        <p:cNvGrpSpPr/>
+        <p:nvPr/>
+      </p:nvGrpSpPr>
+      <p:grpSpPr>
+        <a:xfrm>
+          <a:off x="0" y="0"/>
+          <a:ext cx="0" cy="0"/>
+          <a:chOff x="0" y="0"/>
+          <a:chExt cx="0" cy="0"/>
+        </a:xfrm>
+      </p:grpSpPr>
+      <p:sp>
+        <p:nvSpPr>
+          <p:cNvPr id="2" name="Titel 1"/>
+          <p:cNvSpPr>
+            <a:spLocks noGrp="1"/>
+          </p:cNvSpPr>
+          <p:nvPr>
+            <p:ph type="title"/>
+          </p:nvPr>
+        </p:nvSpPr>
+        <p:spPr/>
+        <p:txBody>
+          <a:bodyPr/>
+          <a:lstStyle/>
+          <a:p>
+            <a:r>
+              <a:rPr lang="de-DE" dirty="0" smtClean="0"/>
+              <a:t>C2X </a:t>
+            </a:r>
+            <a:r>
+              <a:rPr lang="de-DE" dirty="0" err="1" smtClean="0"/>
+              <a:t>protocol</a:t>
+            </a:r>
+            <a:r>
+              <a:rPr lang="de-DE" dirty="0" smtClean="0"/>
+              <a:t> (</a:t>
+            </a:r>
+            <a:r>
+              <a:rPr lang="de-DE" dirty="0" err="1" smtClean="0"/>
+              <a:t>jo</a:t>
+            </a:r>
+            <a:r>
+              <a:rPr lang="de-DE" dirty="0" smtClean="0"/>
+              <a:t>)</a:t>
+            </a:r>
+            <a:endParaRPr lang="de-DE" dirty="0"/>
+          </a:p>
+        </p:txBody>
+      </p:sp>
+      <p:sp>
+        <p:nvSpPr>
+          <p:cNvPr id="3" name="Inhaltsplatzhalter 2"/>
+          <p:cNvSpPr>
+            <a:spLocks noGrp="1"/>
+          </p:cNvSpPr>
+          <p:nvPr>
+            <p:ph idx="1"/>
+          </p:nvPr>
+        </p:nvSpPr>
+        <p:spPr/>
+        <p:txBody>
+          <a:bodyPr/>
+          <a:lstStyle/>
+          <a:p>
+            <a:r>
+              <a:rPr lang="de-DE" dirty="0" smtClean="0"/>
+              <a:t>Table </a:t>
+            </a:r>
+            <a:r>
+              <a:rPr lang="de-DE" dirty="0" err="1" smtClean="0"/>
+              <a:t>with</a:t>
+            </a:r>
+            <a:r>
+              <a:rPr lang="de-DE" dirty="0" smtClean="0"/>
+              <a:t> </a:t>
+            </a:r>
+            <a:r>
+              <a:rPr lang="de-DE" dirty="0" err="1" smtClean="0"/>
+              <a:t>current</a:t>
+            </a:r>
+            <a:r>
+              <a:rPr lang="de-DE" dirty="0" smtClean="0"/>
+              <a:t> </a:t>
+            </a:r>
+            <a:r>
+              <a:rPr lang="de-DE" dirty="0" err="1" smtClean="0"/>
+              <a:t>message</a:t>
+            </a:r>
+            <a:r>
+              <a:rPr lang="de-DE" dirty="0" smtClean="0"/>
+              <a:t> </a:t>
+            </a:r>
+            <a:r>
+              <a:rPr lang="de-DE" dirty="0" err="1" smtClean="0"/>
+              <a:t>types</a:t>
+            </a:r>
+            <a:r>
+              <a:rPr lang="de-DE" dirty="0" smtClean="0"/>
+              <a:t>, </a:t>
+            </a:r>
+            <a:r>
+              <a:rPr lang="de-DE" dirty="0" err="1" smtClean="0"/>
+              <a:t>headers</a:t>
+            </a:r>
+            <a:r>
+              <a:rPr lang="de-DE" dirty="0" smtClean="0"/>
+              <a:t> ... </a:t>
+            </a:r>
+            <a:endParaRPr lang="de-DE" dirty="0"/>
+          </a:p>
+        </p:txBody>
+      </p:sp>
+    </p:spTree>
+    <p:extLst>
+      <p:ext uri="{BB962C8B-B14F-4D97-AF65-F5344CB8AC3E}">
+        <p14:creationId xmlns:p14="http://schemas.microsoft.com/office/powerpoint/2010/main" val="4282823026"/>
+      </p:ext>
+    </p:extLst>
+  </p:cSld>
+  <p:clrMapOvr>
+    <a:masterClrMapping/>
+  </p:clrMapOvr>
+</p:sld>
+</file>
+
+<file path=ppt/slides/slide15.xml><?xml version="1.0" encoding="utf-8"?>
+<p:sld xmlns:a="http://schemas.openxmlformats.org/drawingml/2006/main" xmlns:r="http://schemas.openxmlformats.org/officeDocument/2006/relationships" xmlns:p="http://schemas.openxmlformats.org/presentationml/2006/main">
+  <p:cSld>
+    <p:spTree>
+      <p:nvGrpSpPr>
+        <p:cNvPr id="1" name=""/>
+        <p:cNvGrpSpPr/>
+        <p:nvPr/>
+      </p:nvGrpSpPr>
+      <p:grpSpPr>
+        <a:xfrm>
+          <a:off x="0" y="0"/>
+          <a:ext cx="0" cy="0"/>
+          <a:chOff x="0" y="0"/>
+          <a:chExt cx="0" cy="0"/>
+        </a:xfrm>
+      </p:grpSpPr>
+      <p:sp>
+        <p:nvSpPr>
+          <p:cNvPr id="2" name="Titel 1"/>
+          <p:cNvSpPr>
+            <a:spLocks noGrp="1"/>
+          </p:cNvSpPr>
+          <p:nvPr>
+            <p:ph type="title"/>
+          </p:nvPr>
+        </p:nvSpPr>
+        <p:spPr/>
+        <p:txBody>
+          <a:bodyPr/>
+          <a:lstStyle/>
+          <a:p>
+            <a:r>
+              <a:rPr lang="de-DE" dirty="0" smtClean="0"/>
+              <a:t>GUI (HAGEN)</a:t>
+            </a:r>
+            <a:endParaRPr lang="de-DE" dirty="0"/>
+          </a:p>
+        </p:txBody>
+      </p:sp>
+      <p:sp>
+        <p:nvSpPr>
+          <p:cNvPr id="3" name="Inhaltsplatzhalter 2"/>
+          <p:cNvSpPr>
+            <a:spLocks noGrp="1"/>
+          </p:cNvSpPr>
+          <p:nvPr>
+            <p:ph idx="1"/>
+          </p:nvPr>
+        </p:nvSpPr>
+        <p:spPr/>
+        <p:txBody>
+          <a:bodyPr/>
+          <a:lstStyle/>
+          <a:p>
+            <a:endParaRPr lang="de-DE"/>
+          </a:p>
+        </p:txBody>
+      </p:sp>
+    </p:spTree>
+    <p:extLst>
+      <p:ext uri="{BB962C8B-B14F-4D97-AF65-F5344CB8AC3E}">
+        <p14:creationId xmlns:p14="http://schemas.microsoft.com/office/powerpoint/2010/main" val="118974954"/>
+      </p:ext>
+    </p:extLst>
+  </p:cSld>
+  <p:clrMapOvr>
+    <a:masterClrMapping/>
+  </p:clrMapOvr>
+</p:sld>
+</file>
+
+<file path=ppt/slides/slide16.xml><?xml version="1.0" encoding="utf-8"?>
+<p:sld xmlns:a="http://schemas.openxmlformats.org/drawingml/2006/main" xmlns:r="http://schemas.openxmlformats.org/officeDocument/2006/relationships" xmlns:p="http://schemas.openxmlformats.org/presentationml/2006/main">
+  <p:cSld>
+    <p:spTree>
+      <p:nvGrpSpPr>
+        <p:cNvPr id="1" name=""/>
+        <p:cNvGrpSpPr/>
+        <p:nvPr/>
+      </p:nvGrpSpPr>
+      <p:grpSpPr>
+        <a:xfrm>
+          <a:off x="0" y="0"/>
+          <a:ext cx="0" cy="0"/>
+          <a:chOff x="0" y="0"/>
+          <a:chExt cx="0" cy="0"/>
+        </a:xfrm>
+      </p:grpSpPr>
+      <p:sp>
+        <p:nvSpPr>
+          <p:cNvPr id="2" name="Titel 1"/>
+          <p:cNvSpPr>
+            <a:spLocks noGrp="1"/>
+          </p:cNvSpPr>
+          <p:nvPr>
+            <p:ph type="title"/>
+          </p:nvPr>
+        </p:nvSpPr>
+        <p:spPr/>
+        <p:txBody>
+          <a:bodyPr/>
+          <a:lstStyle/>
+          <a:p>
+            <a:r>
+              <a:rPr lang="de-DE" dirty="0" smtClean="0"/>
+              <a:t>Further </a:t>
+            </a:r>
+            <a:r>
+              <a:rPr lang="de-DE" dirty="0" err="1" smtClean="0"/>
+              <a:t>Steps</a:t>
+            </a:r>
+            <a:r>
+              <a:rPr lang="de-DE" dirty="0" smtClean="0"/>
+              <a:t> (HAGEN)</a:t>
+            </a:r>
+            <a:endParaRPr lang="de-DE" dirty="0"/>
+          </a:p>
+        </p:txBody>
+      </p:sp>
+      <p:sp>
+        <p:nvSpPr>
+          <p:cNvPr id="3" name="Inhaltsplatzhalter 2"/>
+          <p:cNvSpPr>
+            <a:spLocks noGrp="1"/>
+          </p:cNvSpPr>
+          <p:nvPr>
+            <p:ph idx="1"/>
+          </p:nvPr>
+        </p:nvSpPr>
+        <p:spPr/>
+        <p:txBody>
+          <a:bodyPr/>
+          <a:lstStyle/>
+          <a:p>
+            <a:endParaRPr lang="de-DE" dirty="0"/>
+          </a:p>
+          <a:p>
+            <a:pPr>
+              <a:buFont typeface="Arial"/>
+              <a:buChar char="•"/>
+            </a:pPr>
+            <a:r>
+              <a:rPr lang="de-DE" dirty="0"/>
+              <a:t> </a:t>
+            </a:r>
+            <a:r>
+              <a:rPr lang="de-DE" sz="2400" dirty="0" err="1" smtClean="0"/>
+              <a:t>Documentation</a:t>
+            </a:r>
+            <a:endParaRPr lang="de-DE" sz="2400" dirty="0" smtClean="0"/>
+          </a:p>
+          <a:p>
+            <a:pPr>
+              <a:buFont typeface="Arial"/>
+              <a:buChar char="•"/>
+            </a:pPr>
+            <a:endParaRPr lang="de-DE" sz="2400" dirty="0"/>
+          </a:p>
+          <a:p>
+            <a:pPr>
+              <a:buFont typeface="Arial"/>
+              <a:buChar char="•"/>
+            </a:pPr>
+            <a:r>
+              <a:rPr lang="de-DE" sz="2400" dirty="0" err="1" smtClean="0"/>
+              <a:t>Get</a:t>
+            </a:r>
+            <a:r>
+              <a:rPr lang="de-DE" sz="2400" dirty="0" smtClean="0"/>
+              <a:t> </a:t>
+            </a:r>
+            <a:r>
+              <a:rPr lang="de-DE" sz="2400" dirty="0" err="1" smtClean="0"/>
+              <a:t>the</a:t>
+            </a:r>
+            <a:r>
+              <a:rPr lang="de-DE" sz="2400" dirty="0" smtClean="0"/>
+              <a:t> </a:t>
+            </a:r>
+            <a:r>
+              <a:rPr lang="de-DE" sz="2400" dirty="0" err="1" smtClean="0"/>
+              <a:t>system</a:t>
+            </a:r>
+            <a:r>
+              <a:rPr lang="de-DE" sz="2400" dirty="0" smtClean="0"/>
+              <a:t> </a:t>
+            </a:r>
+            <a:r>
+              <a:rPr lang="de-DE" sz="2400" dirty="0" err="1" smtClean="0"/>
+              <a:t>running</a:t>
+            </a:r>
+            <a:r>
+              <a:rPr lang="de-DE" sz="2400" dirty="0" smtClean="0"/>
+              <a:t> ... </a:t>
+            </a:r>
+            <a:r>
+              <a:rPr lang="de-DE" sz="2400" dirty="0" err="1" smtClean="0"/>
+              <a:t>Usw</a:t>
+            </a:r>
+            <a:endParaRPr lang="de-DE" sz="2400" dirty="0" smtClean="0"/>
+          </a:p>
+          <a:p>
+            <a:pPr>
+              <a:buFont typeface="Arial"/>
+              <a:buChar char="•"/>
+            </a:pPr>
+            <a:endParaRPr lang="de-DE" dirty="0"/>
+          </a:p>
+        </p:txBody>
+      </p:sp>
+    </p:spTree>
+    <p:extLst>
+      <p:ext uri="{BB962C8B-B14F-4D97-AF65-F5344CB8AC3E}">
+        <p14:creationId xmlns:p14="http://schemas.microsoft.com/office/powerpoint/2010/main" val="3236479569"/>
+      </p:ext>
+    </p:extLst>
+  </p:cSld>
+  <p:clrMapOvr>
+    <a:masterClrMapping/>
+  </p:clrMapOvr>
+  <p:timing>
+    <p:tnLst>
+      <p:par>
+        <p:cTn xmlns:p14="http://schemas.microsoft.com/office/powerpoint/2010/main" id="1" dur="indefinite" restart="never" nodeType="tmRoot"/>
+      </p:par>
+    </p:tnLst>
+  </p:timing>
+</p:sld>
+</file>
+
+<file path=ppt/slides/slide2.xml><?xml version="1.0" encoding="utf-8"?>
+<p:sld xmlns:a="http://schemas.openxmlformats.org/drawingml/2006/main" xmlns:r="http://schemas.openxmlformats.org/officeDocument/2006/relationships" xmlns:p="http://schemas.openxmlformats.org/presentationml/2006/main">
+  <p:cSld>
+    <p:spTree>
+      <p:nvGrpSpPr>
+        <p:cNvPr id="1" name=""/>
+        <p:cNvGrpSpPr/>
+        <p:nvPr/>
+      </p:nvGrpSpPr>
+      <p:grpSpPr>
+        <a:xfrm>
+          <a:off x="0" y="0"/>
+          <a:ext cx="0" cy="0"/>
+          <a:chOff x="0" y="0"/>
+          <a:chExt cx="0" cy="0"/>
+        </a:xfrm>
+      </p:grpSpPr>
+      <p:sp>
+        <p:nvSpPr>
+          <p:cNvPr id="2" name="Titel 1"/>
+          <p:cNvSpPr>
+            <a:spLocks noGrp="1"/>
+          </p:cNvSpPr>
+          <p:nvPr>
+            <p:ph type="title"/>
+          </p:nvPr>
+        </p:nvSpPr>
+        <p:spPr/>
+        <p:txBody>
+          <a:bodyPr/>
+          <a:lstStyle/>
+          <a:p>
+            <a:r>
+              <a:rPr lang="de-DE" dirty="0" smtClean="0"/>
+              <a:t>Project </a:t>
+            </a:r>
+            <a:r>
+              <a:rPr lang="de-DE" dirty="0" smtClean="0"/>
+              <a:t>Goal (</a:t>
+            </a:r>
+            <a:r>
+              <a:rPr lang="de-DE" dirty="0" err="1" smtClean="0"/>
+              <a:t>hagen</a:t>
+            </a:r>
+            <a:r>
+              <a:rPr lang="de-DE" dirty="0" smtClean="0"/>
+              <a:t>)</a:t>
+            </a:r>
+            <a:endParaRPr lang="de-DE" dirty="0"/>
+          </a:p>
+        </p:txBody>
+      </p:sp>
+      <p:sp>
+        <p:nvSpPr>
+          <p:cNvPr id="3" name="Inhaltsplatzhalter 2"/>
+          <p:cNvSpPr>
+            <a:spLocks noGrp="1"/>
+          </p:cNvSpPr>
+          <p:nvPr>
+            <p:ph idx="1"/>
+          </p:nvPr>
+        </p:nvSpPr>
+        <p:spPr/>
+        <p:txBody>
+          <a:bodyPr>
+            <a:normAutofit/>
+          </a:bodyPr>
+          <a:lstStyle/>
+          <a:p>
+            <a:pPr>
+              <a:buFont typeface="Wingdings" panose="05000000000000000000" pitchFamily="2" charset="2"/>
+              <a:buChar char="§"/>
+            </a:pPr>
+            <a:r>
+              <a:rPr lang="de-DE" sz="2400" dirty="0" smtClean="0"/>
+              <a:t> </a:t>
+            </a:r>
+            <a:r>
+              <a:rPr lang="de-DE" sz="2400" dirty="0" err="1" smtClean="0"/>
+              <a:t>Allow</a:t>
+            </a:r>
+            <a:r>
+              <a:rPr lang="de-DE" sz="2400" dirty="0" smtClean="0"/>
+              <a:t> </a:t>
+            </a:r>
+            <a:r>
+              <a:rPr lang="de-DE" sz="2400" dirty="0" smtClean="0"/>
+              <a:t>cars to communicate with each other and with control stations</a:t>
+            </a:r>
+          </a:p>
+          <a:p>
+            <a:pPr>
+              <a:buFont typeface="Wingdings" panose="05000000000000000000" pitchFamily="2" charset="2"/>
+              <a:buChar char="§"/>
+            </a:pPr>
+            <a:r>
+              <a:rPr lang="de-DE" sz="2400" dirty="0" smtClean="0"/>
+              <a:t> </a:t>
+            </a:r>
+            <a:r>
+              <a:rPr lang="de-DE" sz="2400" dirty="0" smtClean="0"/>
+              <a:t>Exchange </a:t>
+            </a:r>
+            <a:r>
+              <a:rPr lang="de-DE" sz="2400" dirty="0" smtClean="0"/>
+              <a:t>diagnostics</a:t>
+            </a:r>
+          </a:p>
+          <a:p>
+            <a:pPr>
+              <a:buFont typeface="Wingdings" panose="05000000000000000000" pitchFamily="2" charset="2"/>
+              <a:buChar char="§"/>
+            </a:pPr>
+            <a:r>
+              <a:rPr lang="de-DE" sz="2400" dirty="0" smtClean="0"/>
+              <a:t> </a:t>
+            </a:r>
+            <a:r>
+              <a:rPr lang="de-DE" sz="2400" dirty="0" err="1" smtClean="0"/>
+              <a:t>Receive</a:t>
+            </a:r>
+            <a:r>
+              <a:rPr lang="de-DE" sz="2400" dirty="0" smtClean="0"/>
+              <a:t> </a:t>
+            </a:r>
+            <a:r>
+              <a:rPr lang="de-DE" sz="2400" dirty="0" smtClean="0"/>
+              <a:t>situational information and emergency broadcasts</a:t>
+            </a:r>
+          </a:p>
+          <a:p>
+            <a:endParaRPr lang="de-DE" sz="2400" dirty="0"/>
+          </a:p>
+          <a:p>
+            <a:pPr>
+              <a:buFont typeface="Wingdings" panose="05000000000000000000" pitchFamily="2" charset="2"/>
+              <a:buChar char="Ø"/>
+            </a:pPr>
+            <a:r>
+              <a:rPr lang="de-DE" sz="2400" dirty="0"/>
+              <a:t>I</a:t>
+            </a:r>
+            <a:r>
+              <a:rPr lang="de-DE" sz="2400" dirty="0" smtClean="0"/>
+              <a:t>nformation </a:t>
+            </a:r>
+            <a:r>
+              <a:rPr lang="de-DE" sz="2400" dirty="0" smtClean="0"/>
+              <a:t>gain leads to improved path planning and car control</a:t>
+            </a:r>
+            <a:endParaRPr lang="de-DE" sz="2400" dirty="0"/>
+          </a:p>
+        </p:txBody>
+      </p:sp>
+    </p:spTree>
+    <p:extLst>
+      <p:ext uri="{BB962C8B-B14F-4D97-AF65-F5344CB8AC3E}">
+        <p14:creationId xmlns:p14="http://schemas.microsoft.com/office/powerpoint/2010/main" val="1043546931"/>
+      </p:ext>
+    </p:extLst>
+  </p:cSld>
+  <p:clrMapOvr>
+    <a:masterClrMapping/>
+  </p:clrMapOvr>
+  <p:timing>
+    <p:tnLst>
+      <p:par>
+        <p:cTn xmlns:p14="http://schemas.microsoft.com/office/powerpoint/2010/main" id="1" dur="indefinite" restart="never" nodeType="tmRoot"/>
+      </p:par>
+    </p:tnLst>
+  </p:timing>
+</p:sld>
+</file>
+
+<file path=ppt/slides/slide3.xml><?xml version="1.0" encoding="utf-8"?>
+<p:sld xmlns:a="http://schemas.openxmlformats.org/drawingml/2006/main" xmlns:r="http://schemas.openxmlformats.org/officeDocument/2006/relationships" xmlns:p="http://schemas.openxmlformats.org/presentationml/2006/main">
+  <p:cSld>
+    <p:spTree>
+      <p:nvGrpSpPr>
+        <p:cNvPr id="1" name=""/>
+        <p:cNvGrpSpPr/>
+        <p:nvPr/>
+      </p:nvGrpSpPr>
+      <p:grpSpPr>
+        <a:xfrm>
+          <a:off x="0" y="0"/>
+          <a:ext cx="0" cy="0"/>
+          <a:chOff x="0" y="0"/>
+          <a:chExt cx="0" cy="0"/>
+        </a:xfrm>
+      </p:grpSpPr>
+      <p:sp>
+        <p:nvSpPr>
+          <p:cNvPr id="2" name="Titel 1"/>
+          <p:cNvSpPr>
+            <a:spLocks noGrp="1"/>
+          </p:cNvSpPr>
+          <p:nvPr>
+            <p:ph type="title"/>
+          </p:nvPr>
+        </p:nvSpPr>
+        <p:spPr/>
+        <p:txBody>
+          <a:bodyPr/>
+          <a:lstStyle/>
+          <a:p>
+            <a:r>
+              <a:rPr lang="en-US" dirty="0" smtClean="0"/>
+              <a:t>Main Working Steps so </a:t>
+            </a:r>
+            <a:r>
+              <a:rPr lang="en-US" dirty="0" smtClean="0"/>
+              <a:t>far (</a:t>
+            </a:r>
+            <a:r>
+              <a:rPr lang="en-US" dirty="0" err="1" smtClean="0"/>
+              <a:t>hagen</a:t>
+            </a:r>
+            <a:r>
+              <a:rPr lang="en-US" dirty="0" smtClean="0"/>
+              <a:t>)</a:t>
+            </a:r>
+            <a:endParaRPr lang="en-US" dirty="0"/>
+          </a:p>
+        </p:txBody>
+      </p:sp>
+      <p:sp>
+        <p:nvSpPr>
+          <p:cNvPr id="3" name="Inhaltsplatzhalter 2"/>
+          <p:cNvSpPr>
+            <a:spLocks noGrp="1"/>
+          </p:cNvSpPr>
+          <p:nvPr>
+            <p:ph idx="1"/>
+          </p:nvPr>
+        </p:nvSpPr>
+        <p:spPr/>
+        <p:txBody>
+          <a:bodyPr>
+            <a:noAutofit/>
+          </a:bodyPr>
+          <a:lstStyle/>
+          <a:p>
+            <a:pPr marL="457200" indent="-457200">
+              <a:buFont typeface="+mj-lt"/>
+              <a:buAutoNum type="arabicPeriod"/>
+            </a:pPr>
+            <a:r>
+              <a:rPr lang="en-US" sz="2400" dirty="0" smtClean="0"/>
+              <a:t>Reading the documentation and getting into the previous group‘s code</a:t>
+            </a:r>
+          </a:p>
+          <a:p>
+            <a:pPr marL="457200" indent="-457200">
+              <a:buFont typeface="+mj-lt"/>
+              <a:buAutoNum type="arabicPeriod"/>
+            </a:pPr>
+            <a:r>
+              <a:rPr lang="en-US" sz="2400" dirty="0" smtClean="0"/>
+              <a:t>Installation and tutorials for the Altera </a:t>
+            </a:r>
+            <a:r>
+              <a:rPr lang="en-US" sz="2400" dirty="0" err="1" smtClean="0"/>
+              <a:t>Quartus</a:t>
+            </a:r>
+            <a:r>
+              <a:rPr lang="en-US" sz="2400" dirty="0" smtClean="0"/>
+              <a:t> software (FPGA)</a:t>
+            </a:r>
+          </a:p>
+          <a:p>
+            <a:pPr marL="457200" indent="-457200">
+              <a:buFont typeface="+mj-lt"/>
+              <a:buAutoNum type="arabicPeriod"/>
+            </a:pPr>
+            <a:r>
+              <a:rPr lang="en-US" sz="2400" dirty="0" smtClean="0"/>
+              <a:t>Learn about the </a:t>
+            </a:r>
+            <a:r>
+              <a:rPr lang="en-US" sz="2400" dirty="0" err="1" smtClean="0"/>
+              <a:t>Nios</a:t>
+            </a:r>
+            <a:r>
+              <a:rPr lang="en-US" sz="2400" dirty="0" smtClean="0"/>
+              <a:t> II and multicore implementations on FPGA</a:t>
+            </a:r>
+          </a:p>
+          <a:p>
+            <a:pPr marL="457200" indent="-457200">
+              <a:buFont typeface="+mj-lt"/>
+              <a:buAutoNum type="arabicPeriod"/>
+            </a:pPr>
+            <a:r>
+              <a:rPr lang="en-US" sz="2400" dirty="0" smtClean="0"/>
+              <a:t>Planning the Car2X Protocol and the general hardware setup</a:t>
+            </a:r>
+          </a:p>
+          <a:p>
+            <a:pPr marL="0" indent="0">
+              <a:buNone/>
+            </a:pPr>
+            <a:endParaRPr lang="en-US" sz="1000" dirty="0"/>
+          </a:p>
+          <a:p>
+            <a:pPr marL="0" indent="0">
+              <a:buNone/>
+            </a:pPr>
+            <a:r>
+              <a:rPr lang="en-US" sz="2400" b="1" dirty="0" smtClean="0"/>
+              <a:t>Current WIP:</a:t>
+            </a:r>
+            <a:endParaRPr lang="en-US" sz="2400" b="1" dirty="0" smtClean="0"/>
+          </a:p>
+          <a:p>
+            <a:r>
+              <a:rPr lang="en-US" sz="2400" dirty="0" smtClean="0"/>
+              <a:t>Basic </a:t>
+            </a:r>
+            <a:r>
+              <a:rPr lang="en-US" sz="2400" dirty="0" err="1" smtClean="0"/>
+              <a:t>Quartus</a:t>
+            </a:r>
+            <a:r>
+              <a:rPr lang="en-US" sz="2400" dirty="0" smtClean="0"/>
+              <a:t> hardware implementation</a:t>
+            </a:r>
+          </a:p>
+          <a:p>
+            <a:r>
+              <a:rPr lang="en-US" sz="2400" dirty="0" smtClean="0"/>
+              <a:t>Experiments with the wireless converter hardware</a:t>
+            </a:r>
+          </a:p>
+          <a:p>
+            <a:r>
+              <a:rPr lang="en-US" sz="2400" dirty="0" smtClean="0"/>
+              <a:t>Setting up PC as car2x station</a:t>
+            </a:r>
+            <a:endParaRPr lang="en-US" sz="2400" dirty="0"/>
+          </a:p>
+        </p:txBody>
+      </p:sp>
+    </p:spTree>
+    <p:extLst>
+      <p:ext uri="{BB962C8B-B14F-4D97-AF65-F5344CB8AC3E}">
+        <p14:creationId xmlns:p14="http://schemas.microsoft.com/office/powerpoint/2010/main" val="2887035778"/>
+      </p:ext>
+    </p:extLst>
+  </p:cSld>
+  <p:clrMapOvr>
+    <a:masterClrMapping/>
+  </p:clrMapOvr>
+  <p:timing>
+    <p:tnLst>
+      <p:par>
+        <p:cTn xmlns:p14="http://schemas.microsoft.com/office/powerpoint/2010/main" id="1" dur="indefinite" restart="never" nodeType="tmRoot"/>
+      </p:par>
+    </p:tnLst>
+  </p:timing>
+</p:sld>
+</file>
+
+<file path=ppt/slides/slide4.xml><?xml version="1.0" encoding="utf-8"?>
+<p:sld xmlns:a="http://schemas.openxmlformats.org/drawingml/2006/main" xmlns:r="http://schemas.openxmlformats.org/officeDocument/2006/relationships" xmlns:p="http://schemas.openxmlformats.org/presentationml/2006/main">
+  <p:cSld>
+    <p:spTree>
+      <p:nvGrpSpPr>
+        <p:cNvPr id="1" name=""/>
+        <p:cNvGrpSpPr/>
+        <p:nvPr/>
+      </p:nvGrpSpPr>
+      <p:grpSpPr>
+        <a:xfrm>
+          <a:off x="0" y="0"/>
+          <a:ext cx="0" cy="0"/>
+          <a:chOff x="0" y="0"/>
+          <a:chExt cx="0" cy="0"/>
+        </a:xfrm>
+      </p:grpSpPr>
+      <p:sp>
+        <p:nvSpPr>
+          <p:cNvPr id="2" name="Titel 1"/>
+          <p:cNvSpPr>
+            <a:spLocks noGrp="1"/>
+          </p:cNvSpPr>
+          <p:nvPr>
+            <p:ph type="title"/>
+          </p:nvPr>
+        </p:nvSpPr>
+        <p:spPr/>
+        <p:txBody>
+          <a:bodyPr/>
+          <a:lstStyle/>
+          <a:p>
+            <a:r>
+              <a:rPr lang="de-DE" dirty="0" smtClean="0"/>
+              <a:t>Work </a:t>
+            </a:r>
+            <a:r>
+              <a:rPr lang="de-DE" dirty="0" err="1" smtClean="0"/>
+              <a:t>since</a:t>
+            </a:r>
+            <a:r>
+              <a:rPr lang="de-DE" dirty="0" smtClean="0"/>
+              <a:t> </a:t>
+            </a:r>
+            <a:r>
+              <a:rPr lang="de-DE" dirty="0" err="1" smtClean="0"/>
+              <a:t>midterm</a:t>
+            </a:r>
+            <a:r>
+              <a:rPr lang="de-DE" dirty="0" smtClean="0"/>
+              <a:t> (</a:t>
+            </a:r>
+            <a:r>
+              <a:rPr lang="de-DE" dirty="0" err="1" smtClean="0"/>
+              <a:t>hagen</a:t>
+            </a:r>
+            <a:r>
+              <a:rPr lang="de-DE" dirty="0" smtClean="0"/>
+              <a:t>)</a:t>
+            </a:r>
+            <a:endParaRPr lang="de-DE" dirty="0"/>
+          </a:p>
+        </p:txBody>
+      </p:sp>
+      <p:sp>
+        <p:nvSpPr>
+          <p:cNvPr id="3" name="Inhaltsplatzhalter 2"/>
+          <p:cNvSpPr>
+            <a:spLocks noGrp="1"/>
+          </p:cNvSpPr>
+          <p:nvPr>
+            <p:ph idx="1"/>
+          </p:nvPr>
+        </p:nvSpPr>
+        <p:spPr/>
+        <p:txBody>
+          <a:bodyPr/>
+          <a:lstStyle/>
+          <a:p>
+            <a:endParaRPr lang="de-DE"/>
+          </a:p>
+        </p:txBody>
+      </p:sp>
+    </p:spTree>
+    <p:extLst>
+      <p:ext uri="{BB962C8B-B14F-4D97-AF65-F5344CB8AC3E}">
+        <p14:creationId xmlns:p14="http://schemas.microsoft.com/office/powerpoint/2010/main" val="1015751284"/>
+      </p:ext>
+    </p:extLst>
+  </p:cSld>
+  <p:clrMapOvr>
+    <a:masterClrMapping/>
+  </p:clrMapOvr>
 </p:sld>
 </file>
 
@@ -7190,11 +6126,7 @@
           <a:p>
             <a:r>
               <a:rPr lang="de-DE" dirty="0" smtClean="0"/>
-              <a:t>Hardware </a:t>
-            </a:r>
-            <a:r>
-              <a:rPr lang="de-DE" dirty="0" smtClean="0"/>
-              <a:t>Setup (on </a:t>
+              <a:t>Hardware Setup (on </a:t>
             </a:r>
             <a:r>
               <a:rPr lang="de-DE" dirty="0" err="1" smtClean="0"/>
@@ -7306,7 +6238,7 @@
           </a:prstGeom>
           <a:noFill/>
           <a:extLst>
-            <a:ext uri="{909E8E84-426E-40DD-AFC4-6F175D3DCCD1}">
+            <a:ext uri="{909E8E84-426E-40dd-AFC4-6F175D3DCCD1}">
               <a14:hiddenFill xmlns:a14="http://schemas.microsoft.com/office/drawing/2010/main">
                 <a:solidFill>
                   <a:srgbClr val="FFFFFF"/>
@@ -7687,7 +6619,7 @@
   <p:timing>
     <p:tnLst>
       <p:par>
-        <p:cTn id="1" dur="indefinite" restart="never" nodeType="tmRoot"/>
+        <p:cTn xmlns:p14="http://schemas.microsoft.com/office/powerpoint/2010/main" id="1" dur="indefinite" restart="never" nodeType="tmRoot"/>
       </p:par>
     </p:tnLst>
   </p:timing>
@@ -8430,6 +7362,43 @@
           </a:fontRef>
         </p:style>
       </p:cxnSp>
+      <p:cxnSp>
+        <p:nvCxnSpPr>
+          <p:cNvPr id="28" name="Gerade Verbindung mit Pfeil 27"/>
+          <p:cNvCxnSpPr/>
+          <p:nvPr/>
+        </p:nvCxnSpPr>
+        <p:spPr>
+          <a:xfrm>
+            <a:off x="10755833" y="3764894"/>
+            <a:ext cx="473676" cy="0"/>
+          </a:xfrm>
+          <a:prstGeom prst="straightConnector1">
+            <a:avLst/>
+          </a:prstGeom>
+          <a:ln w="38100">
+            <a:solidFill>
+              <a:schemeClr val="tx1"/>
+            </a:solidFill>
+            <a:headEnd type="triangle"/>
+            <a:tailEnd type="triangle"/>
+          </a:ln>
+        </p:spPr>
+        <p:style>
+          <a:lnRef idx="1">
+            <a:schemeClr val="accent1"/>
+          </a:lnRef>
+          <a:fillRef idx="0">
+            <a:schemeClr val="accent1"/>
+          </a:fillRef>
+          <a:effectRef idx="0">
+            <a:schemeClr val="accent1"/>
+          </a:effectRef>
+          <a:fontRef idx="minor">
+            <a:schemeClr val="tx1"/>
+          </a:fontRef>
+        </p:style>
+      </p:cxnSp>
     </p:spTree>
     <p:extLst>
       <p:ext uri="{BB962C8B-B14F-4D97-AF65-F5344CB8AC3E}">
@@ -8443,7 +7412,7 @@
   <p:timing>
     <p:tnLst>
       <p:par>
-        <p:cTn id="1" dur="indefinite" restart="never" nodeType="tmRoot"/>
+        <p:cTn xmlns:p14="http://schemas.microsoft.com/office/powerpoint/2010/main" id="1" dur="indefinite" restart="never" nodeType="tmRoot"/>
       </p:par>
     </p:tnLst>
   </p:timing>
@@ -8527,7 +7496,7 @@
   <p:timing>
     <p:tnLst>
       <p:par>
-        <p:cTn id="1" dur="indefinite" restart="never" nodeType="tmRoot"/>
+        <p:cTn xmlns:p14="http://schemas.microsoft.com/office/powerpoint/2010/main" id="1" dur="indefinite" restart="never" nodeType="tmRoot"/>
       </p:par>
     </p:tnLst>
   </p:timing>
@@ -8642,7 +7611,7 @@
   <p:timing>
     <p:tnLst>
       <p:par>
-        <p:cTn id="1" dur="indefinite" restart="never" nodeType="tmRoot"/>
+        <p:cTn xmlns:p14="http://schemas.microsoft.com/office/powerpoint/2010/main" id="1" dur="indefinite" restart="never" nodeType="tmRoot"/>
       </p:par>
     </p:tnLst>
   </p:timing>
@@ -9061,7 +8030,7 @@
   <p:timing>
     <p:tnLst>
       <p:par>
-        <p:cTn id="1" dur="indefinite" restart="never" nodeType="tmRoot"/>
+        <p:cTn xmlns:p14="http://schemas.microsoft.com/office/powerpoint/2010/main" id="1" dur="indefinite" restart="never" nodeType="tmRoot"/>
       </p:par>
     </p:tnLst>
   </p:timing>
@@ -9345,7 +8314,7 @@
   <a:extraClrSchemeLst/>
   <a:extLst>
     <a:ext uri="{05A4C25C-085E-4340-85A3-A5531E510DB2}">
-      <thm15:themeFamily xmlns:thm15="http://schemas.microsoft.com/office/thememl/2012/main" name="Retrospect" id="{5F128B03-DCCA-4EEB-AB3B-CF2899314A46}" vid="{3F1AAB62-24C6-49D2-8E01-B56FAC9A3DCD}"/>
+      <thm15:themeFamily xmlns:thm15="http://schemas.microsoft.com/office/thememl/2012/main" xmlns="" name="Retrospect" id="{5F128B03-DCCA-4EEB-AB3B-CF2899314A46}" vid="{3F1AAB62-24C6-49D2-8E01-B56FAC9A3DCD}"/>
     </a:ext>
   </a:extLst>
 </a:theme>

</xml_diff>

<commit_message>
changed debug output prints. Updated presentation
</commit_message>
<xml_diff>
--- a/doc/FinalPresentation.pptx
+++ b/doc/FinalPresentation.pptx
@@ -12,9 +12,9 @@
     <p:sldId id="269" r:id="rId6"/>
     <p:sldId id="270" r:id="rId7"/>
     <p:sldId id="271" r:id="rId8"/>
-    <p:sldId id="272" r:id="rId9"/>
-    <p:sldId id="280" r:id="rId10"/>
-    <p:sldId id="273" r:id="rId11"/>
+    <p:sldId id="280" r:id="rId9"/>
+    <p:sldId id="273" r:id="rId10"/>
+    <p:sldId id="290" r:id="rId11"/>
     <p:sldId id="285" r:id="rId12"/>
     <p:sldId id="286" r:id="rId13"/>
     <p:sldId id="287" r:id="rId14"/>
@@ -369,7 +369,7 @@
           <a:p>
             <a:fld id="{7D245CBA-5440-4E3A-93BD-41E2FFACF6C3}" type="datetimeFigureOut">
               <a:rPr lang="de-DE" smtClean="0"/>
-              <a:t>06.07.2014</a:t>
+              <a:t>07.07.2014</a:t>
             </a:fld>
             <a:endParaRPr lang="de-DE"/>
           </a:p>
@@ -577,7 +577,7 @@
           <a:p>
             <a:fld id="{7D245CBA-5440-4E3A-93BD-41E2FFACF6C3}" type="datetimeFigureOut">
               <a:rPr lang="de-DE" smtClean="0"/>
-              <a:t>06.07.2014</a:t>
+              <a:t>07.07.2014</a:t>
             </a:fld>
             <a:endParaRPr lang="de-DE"/>
           </a:p>
@@ -833,7 +833,7 @@
           <a:p>
             <a:fld id="{7D245CBA-5440-4E3A-93BD-41E2FFACF6C3}" type="datetimeFigureOut">
               <a:rPr lang="de-DE" smtClean="0"/>
-              <a:t>06.07.2014</a:t>
+              <a:t>07.07.2014</a:t>
             </a:fld>
             <a:endParaRPr lang="de-DE"/>
           </a:p>
@@ -1007,7 +1007,7 @@
           <a:p>
             <a:fld id="{7D245CBA-5440-4E3A-93BD-41E2FFACF6C3}" type="datetimeFigureOut">
               <a:rPr lang="de-DE" smtClean="0"/>
-              <a:t>06.07.2014</a:t>
+              <a:t>07.07.2014</a:t>
             </a:fld>
             <a:endParaRPr lang="de-DE"/>
           </a:p>
@@ -1350,7 +1350,7 @@
           <a:p>
             <a:fld id="{7D245CBA-5440-4E3A-93BD-41E2FFACF6C3}" type="datetimeFigureOut">
               <a:rPr lang="de-DE" smtClean="0"/>
-              <a:t>06.07.2014</a:t>
+              <a:t>07.07.2014</a:t>
             </a:fld>
             <a:endParaRPr lang="de-DE"/>
           </a:p>
@@ -1625,7 +1625,7 @@
           <a:p>
             <a:fld id="{7D245CBA-5440-4E3A-93BD-41E2FFACF6C3}" type="datetimeFigureOut">
               <a:rPr lang="de-DE" smtClean="0"/>
-              <a:t>06.07.2014</a:t>
+              <a:t>07.07.2014</a:t>
             </a:fld>
             <a:endParaRPr lang="de-DE"/>
           </a:p>
@@ -2004,7 +2004,7 @@
           <a:p>
             <a:fld id="{7D245CBA-5440-4E3A-93BD-41E2FFACF6C3}" type="datetimeFigureOut">
               <a:rPr lang="de-DE" smtClean="0"/>
-              <a:t>06.07.2014</a:t>
+              <a:t>07.07.2014</a:t>
             </a:fld>
             <a:endParaRPr lang="de-DE"/>
           </a:p>
@@ -2122,7 +2122,7 @@
           <a:p>
             <a:fld id="{7D245CBA-5440-4E3A-93BD-41E2FFACF6C3}" type="datetimeFigureOut">
               <a:rPr lang="de-DE" smtClean="0"/>
-              <a:t>06.07.2014</a:t>
+              <a:t>07.07.2014</a:t>
             </a:fld>
             <a:endParaRPr lang="de-DE"/>
           </a:p>
@@ -2293,7 +2293,7 @@
           <a:p>
             <a:fld id="{7D245CBA-5440-4E3A-93BD-41E2FFACF6C3}" type="datetimeFigureOut">
               <a:rPr lang="de-DE" smtClean="0"/>
-              <a:t>06.07.2014</a:t>
+              <a:t>07.07.2014</a:t>
             </a:fld>
             <a:endParaRPr lang="de-DE"/>
           </a:p>
@@ -2647,7 +2647,7 @@
           <a:p>
             <a:fld id="{7D245CBA-5440-4E3A-93BD-41E2FFACF6C3}" type="datetimeFigureOut">
               <a:rPr lang="de-DE" smtClean="0"/>
-              <a:t>06.07.2014</a:t>
+              <a:t>07.07.2014</a:t>
             </a:fld>
             <a:endParaRPr lang="de-DE"/>
           </a:p>
@@ -3029,7 +3029,7 @@
           <a:p>
             <a:fld id="{7D245CBA-5440-4E3A-93BD-41E2FFACF6C3}" type="datetimeFigureOut">
               <a:rPr lang="de-DE" smtClean="0"/>
-              <a:t>06.07.2014</a:t>
+              <a:t>07.07.2014</a:t>
             </a:fld>
             <a:endParaRPr lang="de-DE"/>
           </a:p>
@@ -3316,7 +3316,7 @@
           <a:p>
             <a:fld id="{7D245CBA-5440-4E3A-93BD-41E2FFACF6C3}" type="datetimeFigureOut">
               <a:rPr lang="de-DE" smtClean="0"/>
-              <a:t>06.07.2014</a:t>
+              <a:t>07.07.2014</a:t>
             </a:fld>
             <a:endParaRPr lang="de-DE"/>
           </a:p>
@@ -3970,7 +3970,7 @@
       </p:grpSpPr>
       <p:sp>
         <p:nvSpPr>
-          <p:cNvPr id="2" name="Titel 1"/>
+          <p:cNvPr id="2" name="Title 1"/>
           <p:cNvSpPr>
             <a:spLocks noGrp="1"/>
           </p:cNvSpPr>
@@ -3984,389 +3984,46 @@
           <a:lstStyle/>
           <a:p>
             <a:r>
-              <a:rPr lang="de-DE" dirty="0" smtClean="0"/>
+              <a:rPr lang="de-DE" dirty="0"/>
               <a:t>Hardware Setup (Problems)</a:t>
             </a:r>
-            <a:endParaRPr lang="de-DE" dirty="0"/>
+            <a:endParaRPr lang="en-US" dirty="0"/>
           </a:p>
         </p:txBody>
       </p:sp>
-      <p:sp>
-        <p:nvSpPr>
-          <p:cNvPr id="5" name="Content Placeholder 4"/>
-          <p:cNvSpPr txBox="1">
-            <a:spLocks/>
-          </p:cNvSpPr>
+      <p:pic>
+        <p:nvPicPr>
+          <p:cNvPr id="4" name="Grafik 3"/>
+          <p:cNvPicPr>
+            <a:picLocks noChangeAspect="1"/>
+          </p:cNvPicPr>
           <p:nvPr/>
-        </p:nvSpPr>
-        <p:spPr>
-          <a:xfrm>
-            <a:off x="1097280" y="1845734"/>
-            <a:ext cx="9982612" cy="4023360"/>
+        </p:nvPicPr>
+        <p:blipFill rotWithShape="1">
+          <a:blip r:embed="rId2"/>
+          <a:srcRect l="704" t="16192" r="53523" b="57658"/>
+          <a:stretch/>
+        </p:blipFill>
+        <p:spPr>
+          <a:xfrm>
+            <a:off x="1341119" y="2148840"/>
+            <a:ext cx="9674909" cy="3108960"/>
           </a:xfrm>
           <a:prstGeom prst="rect">
             <a:avLst/>
           </a:prstGeom>
         </p:spPr>
-        <p:txBody>
-          <a:bodyPr>
-            <a:noAutofit/>
-          </a:bodyPr>
-          <a:lstStyle>
-            <a:lvl1pPr marL="91440" indent="-91440" algn="l" defTabSz="914400" rtl="0" eaLnBrk="1" latinLnBrk="0" hangingPunct="1">
-              <a:lnSpc>
-                <a:spcPct val="90000"/>
-              </a:lnSpc>
-              <a:spcBef>
-                <a:spcPts val="1200"/>
-              </a:spcBef>
-              <a:spcAft>
-                <a:spcPts val="200"/>
-              </a:spcAft>
-              <a:buClr>
-                <a:schemeClr val="accent1"/>
-              </a:buClr>
-              <a:buSzPct val="100000"/>
-              <a:buFont typeface="Calibri" panose="020F0502020204030204" pitchFamily="34" charset="0"/>
-              <a:buChar char=" "/>
-              <a:defRPr sz="2000" kern="1200">
-                <a:solidFill>
-                  <a:schemeClr val="tx1">
-                    <a:lumMod val="75000"/>
-                    <a:lumOff val="25000"/>
-                  </a:schemeClr>
-                </a:solidFill>
-                <a:latin typeface="+mn-lt"/>
-                <a:ea typeface="+mn-ea"/>
-                <a:cs typeface="+mn-cs"/>
-              </a:defRPr>
-            </a:lvl1pPr>
-            <a:lvl2pPr marL="384048" indent="-182880" algn="l" defTabSz="914400" rtl="0" eaLnBrk="1" latinLnBrk="0" hangingPunct="1">
-              <a:lnSpc>
-                <a:spcPct val="90000"/>
-              </a:lnSpc>
-              <a:spcBef>
-                <a:spcPts val="200"/>
-              </a:spcBef>
-              <a:spcAft>
-                <a:spcPts val="400"/>
-              </a:spcAft>
-              <a:buClr>
-                <a:schemeClr val="accent1"/>
-              </a:buClr>
-              <a:buFont typeface="Calibri" pitchFamily="34" charset="0"/>
-              <a:buChar char="◦"/>
-              <a:defRPr sz="1800" kern="1200">
-                <a:solidFill>
-                  <a:schemeClr val="tx1">
-                    <a:lumMod val="75000"/>
-                    <a:lumOff val="25000"/>
-                  </a:schemeClr>
-                </a:solidFill>
-                <a:latin typeface="+mn-lt"/>
-                <a:ea typeface="+mn-ea"/>
-                <a:cs typeface="+mn-cs"/>
-              </a:defRPr>
-            </a:lvl2pPr>
-            <a:lvl3pPr marL="566928" indent="-182880" algn="l" defTabSz="914400" rtl="0" eaLnBrk="1" latinLnBrk="0" hangingPunct="1">
-              <a:lnSpc>
-                <a:spcPct val="90000"/>
-              </a:lnSpc>
-              <a:spcBef>
-                <a:spcPts val="200"/>
-              </a:spcBef>
-              <a:spcAft>
-                <a:spcPts val="400"/>
-              </a:spcAft>
-              <a:buClr>
-                <a:schemeClr val="accent1"/>
-              </a:buClr>
-              <a:buFont typeface="Calibri" pitchFamily="34" charset="0"/>
-              <a:buChar char="◦"/>
-              <a:defRPr sz="1400" kern="1200">
-                <a:solidFill>
-                  <a:schemeClr val="tx1">
-                    <a:lumMod val="75000"/>
-                    <a:lumOff val="25000"/>
-                  </a:schemeClr>
-                </a:solidFill>
-                <a:latin typeface="+mn-lt"/>
-                <a:ea typeface="+mn-ea"/>
-                <a:cs typeface="+mn-cs"/>
-              </a:defRPr>
-            </a:lvl3pPr>
-            <a:lvl4pPr marL="749808" indent="-182880" algn="l" defTabSz="914400" rtl="0" eaLnBrk="1" latinLnBrk="0" hangingPunct="1">
-              <a:lnSpc>
-                <a:spcPct val="90000"/>
-              </a:lnSpc>
-              <a:spcBef>
-                <a:spcPts val="200"/>
-              </a:spcBef>
-              <a:spcAft>
-                <a:spcPts val="400"/>
-              </a:spcAft>
-              <a:buClr>
-                <a:schemeClr val="accent1"/>
-              </a:buClr>
-              <a:buFont typeface="Calibri" pitchFamily="34" charset="0"/>
-              <a:buChar char="◦"/>
-              <a:defRPr sz="1400" kern="1200">
-                <a:solidFill>
-                  <a:schemeClr val="tx1">
-                    <a:lumMod val="75000"/>
-                    <a:lumOff val="25000"/>
-                  </a:schemeClr>
-                </a:solidFill>
-                <a:latin typeface="+mn-lt"/>
-                <a:ea typeface="+mn-ea"/>
-                <a:cs typeface="+mn-cs"/>
-              </a:defRPr>
-            </a:lvl4pPr>
-            <a:lvl5pPr marL="932688" indent="-182880" algn="l" defTabSz="914400" rtl="0" eaLnBrk="1" latinLnBrk="0" hangingPunct="1">
-              <a:lnSpc>
-                <a:spcPct val="90000"/>
-              </a:lnSpc>
-              <a:spcBef>
-                <a:spcPts val="200"/>
-              </a:spcBef>
-              <a:spcAft>
-                <a:spcPts val="400"/>
-              </a:spcAft>
-              <a:buClr>
-                <a:schemeClr val="accent1"/>
-              </a:buClr>
-              <a:buFont typeface="Calibri" pitchFamily="34" charset="0"/>
-              <a:buChar char="◦"/>
-              <a:defRPr sz="1400" kern="1200">
-                <a:solidFill>
-                  <a:schemeClr val="tx1">
-                    <a:lumMod val="75000"/>
-                    <a:lumOff val="25000"/>
-                  </a:schemeClr>
-                </a:solidFill>
-                <a:latin typeface="+mn-lt"/>
-                <a:ea typeface="+mn-ea"/>
-                <a:cs typeface="+mn-cs"/>
-              </a:defRPr>
-            </a:lvl5pPr>
-            <a:lvl6pPr marL="1100000" indent="-228600" algn="l" defTabSz="914400" rtl="0" eaLnBrk="1" latinLnBrk="0" hangingPunct="1">
-              <a:lnSpc>
-                <a:spcPct val="90000"/>
-              </a:lnSpc>
-              <a:spcBef>
-                <a:spcPts val="200"/>
-              </a:spcBef>
-              <a:spcAft>
-                <a:spcPts val="400"/>
-              </a:spcAft>
-              <a:buClr>
-                <a:schemeClr val="accent1"/>
-              </a:buClr>
-              <a:buFont typeface="Calibri" pitchFamily="34" charset="0"/>
-              <a:buChar char="◦"/>
-              <a:defRPr sz="1400" kern="1200">
-                <a:solidFill>
-                  <a:schemeClr val="tx1">
-                    <a:lumMod val="75000"/>
-                    <a:lumOff val="25000"/>
-                  </a:schemeClr>
-                </a:solidFill>
-                <a:latin typeface="+mn-lt"/>
-                <a:ea typeface="+mn-ea"/>
-                <a:cs typeface="+mn-cs"/>
-              </a:defRPr>
-            </a:lvl6pPr>
-            <a:lvl7pPr marL="1300000" indent="-228600" algn="l" defTabSz="914400" rtl="0" eaLnBrk="1" latinLnBrk="0" hangingPunct="1">
-              <a:lnSpc>
-                <a:spcPct val="90000"/>
-              </a:lnSpc>
-              <a:spcBef>
-                <a:spcPts val="200"/>
-              </a:spcBef>
-              <a:spcAft>
-                <a:spcPts val="400"/>
-              </a:spcAft>
-              <a:buClr>
-                <a:schemeClr val="accent1"/>
-              </a:buClr>
-              <a:buFont typeface="Calibri" pitchFamily="34" charset="0"/>
-              <a:buChar char="◦"/>
-              <a:defRPr sz="1400" kern="1200">
-                <a:solidFill>
-                  <a:schemeClr val="tx1">
-                    <a:lumMod val="75000"/>
-                    <a:lumOff val="25000"/>
-                  </a:schemeClr>
-                </a:solidFill>
-                <a:latin typeface="+mn-lt"/>
-                <a:ea typeface="+mn-ea"/>
-                <a:cs typeface="+mn-cs"/>
-              </a:defRPr>
-            </a:lvl7pPr>
-            <a:lvl8pPr marL="1500000" indent="-228600" algn="l" defTabSz="914400" rtl="0" eaLnBrk="1" latinLnBrk="0" hangingPunct="1">
-              <a:lnSpc>
-                <a:spcPct val="90000"/>
-              </a:lnSpc>
-              <a:spcBef>
-                <a:spcPts val="200"/>
-              </a:spcBef>
-              <a:spcAft>
-                <a:spcPts val="400"/>
-              </a:spcAft>
-              <a:buClr>
-                <a:schemeClr val="accent1"/>
-              </a:buClr>
-              <a:buFont typeface="Calibri" pitchFamily="34" charset="0"/>
-              <a:buChar char="◦"/>
-              <a:defRPr sz="1400" kern="1200">
-                <a:solidFill>
-                  <a:schemeClr val="tx1">
-                    <a:lumMod val="75000"/>
-                    <a:lumOff val="25000"/>
-                  </a:schemeClr>
-                </a:solidFill>
-                <a:latin typeface="+mn-lt"/>
-                <a:ea typeface="+mn-ea"/>
-                <a:cs typeface="+mn-cs"/>
-              </a:defRPr>
-            </a:lvl8pPr>
-            <a:lvl9pPr marL="1700000" indent="-228600" algn="l" defTabSz="914400" rtl="0" eaLnBrk="1" latinLnBrk="0" hangingPunct="1">
-              <a:lnSpc>
-                <a:spcPct val="90000"/>
-              </a:lnSpc>
-              <a:spcBef>
-                <a:spcPts val="200"/>
-              </a:spcBef>
-              <a:spcAft>
-                <a:spcPts val="400"/>
-              </a:spcAft>
-              <a:buClr>
-                <a:schemeClr val="accent1"/>
-              </a:buClr>
-              <a:buFont typeface="Calibri" pitchFamily="34" charset="0"/>
-              <a:buChar char="◦"/>
-              <a:defRPr sz="1400" kern="1200">
-                <a:solidFill>
-                  <a:schemeClr val="tx1">
-                    <a:lumMod val="75000"/>
-                    <a:lumOff val="25000"/>
-                  </a:schemeClr>
-                </a:solidFill>
-                <a:latin typeface="+mn-lt"/>
-                <a:ea typeface="+mn-ea"/>
-                <a:cs typeface="+mn-cs"/>
-              </a:defRPr>
-            </a:lvl9pPr>
-          </a:lstStyle>
-          <a:p>
-            <a:pPr>
-              <a:buFont typeface="Wingdings" panose="05000000000000000000" pitchFamily="2" charset="2"/>
-              <a:buChar char="§"/>
-            </a:pPr>
-            <a:r>
-              <a:rPr lang="en-US" sz="2400" dirty="0" smtClean="0"/>
-              <a:t>Partially bad tutorials (copy paste </a:t>
-            </a:r>
-            <a:r>
-              <a:rPr lang="en-US" sz="2400" dirty="0" smtClean="0">
-                <a:sym typeface="Wingdings" panose="05000000000000000000" pitchFamily="2" charset="2"/>
-              </a:rPr>
-              <a:t> “It works”)</a:t>
-            </a:r>
-          </a:p>
-          <a:p>
-            <a:pPr marL="0" indent="0">
-              <a:buNone/>
-            </a:pPr>
-            <a:r>
-              <a:rPr lang="en-US" sz="2400" dirty="0" smtClean="0"/>
-              <a:t> </a:t>
-            </a:r>
-          </a:p>
-          <a:p>
-            <a:pPr>
-              <a:buFont typeface="Wingdings" panose="05000000000000000000" pitchFamily="2" charset="2"/>
-              <a:buChar char="§"/>
-            </a:pPr>
-            <a:r>
-              <a:rPr lang="en-US" sz="2400" dirty="0" smtClean="0"/>
-              <a:t>Combine different tutorials</a:t>
-            </a:r>
-          </a:p>
-          <a:p>
-            <a:pPr>
-              <a:buFont typeface="Wingdings" panose="05000000000000000000" pitchFamily="2" charset="2"/>
-              <a:buChar char="§"/>
-            </a:pPr>
-            <a:endParaRPr lang="en-US" sz="2400" dirty="0"/>
-          </a:p>
-          <a:p>
-            <a:pPr>
-              <a:buFont typeface="Wingdings" panose="05000000000000000000" pitchFamily="2" charset="2"/>
-              <a:buChar char="§"/>
-            </a:pPr>
-            <a:r>
-              <a:rPr lang="en-US" sz="2400" dirty="0" smtClean="0"/>
-              <a:t>No/very few Verilog/VHDL skills</a:t>
-            </a:r>
-          </a:p>
-          <a:p>
-            <a:pPr marL="0" indent="0">
-              <a:buNone/>
-            </a:pPr>
-            <a:endParaRPr lang="en-US" sz="2400" dirty="0"/>
-          </a:p>
-          <a:p>
-            <a:pPr>
-              <a:buFont typeface="Wingdings" panose="05000000000000000000" pitchFamily="2" charset="2"/>
-              <a:buChar char="§"/>
-            </a:pPr>
-            <a:r>
-              <a:rPr lang="en-US" sz="2400" dirty="0"/>
-              <a:t>Broken </a:t>
-            </a:r>
-            <a:r>
-              <a:rPr lang="en-US" sz="2400" dirty="0" smtClean="0"/>
-              <a:t>Board</a:t>
-            </a:r>
-          </a:p>
-          <a:p>
-            <a:pPr>
-              <a:buFont typeface="Wingdings" panose="05000000000000000000" pitchFamily="2" charset="2"/>
-              <a:buChar char="§"/>
-            </a:pPr>
-            <a:endParaRPr lang="en-US" sz="2400" dirty="0"/>
-          </a:p>
-          <a:p>
-            <a:pPr>
-              <a:buFont typeface="Wingdings" panose="05000000000000000000" pitchFamily="2" charset="2"/>
-              <a:buChar char="§"/>
-            </a:pPr>
-            <a:r>
-              <a:rPr lang="en-US" sz="2400" dirty="0" smtClean="0"/>
-              <a:t>Never sure, where the error comes from (HW, SW, Eclipse, …)!</a:t>
-            </a:r>
-            <a:endParaRPr lang="en-US" sz="2400" dirty="0"/>
-          </a:p>
-        </p:txBody>
-      </p:sp>
+      </p:pic>
     </p:spTree>
     <p:extLst>
       <p:ext uri="{BB962C8B-B14F-4D97-AF65-F5344CB8AC3E}">
-        <p14:creationId xmlns:p14="http://schemas.microsoft.com/office/powerpoint/2010/main" val="176701147"/>
+        <p14:creationId xmlns:p14="http://schemas.microsoft.com/office/powerpoint/2010/main" val="1969277394"/>
       </p:ext>
     </p:extLst>
   </p:cSld>
   <p:clrMapOvr>
     <a:masterClrMapping/>
   </p:clrMapOvr>
-  <p:timing>
-    <p:tnLst>
-      <p:par>
-        <p:cTn id="1" dur="indefinite" restart="never" nodeType="tmRoot"/>
-      </p:par>
-    </p:tnLst>
-  </p:timing>
 </p:sld>
 </file>
 
@@ -5073,10 +4730,10 @@
         </p:nvGrpSpPr>
         <p:grpSpPr>
           <a:xfrm>
-            <a:off x="1589468" y="2179133"/>
-            <a:ext cx="9145532" cy="3400967"/>
-            <a:chOff x="1649593" y="2179133"/>
-            <a:chExt cx="9145532" cy="3400967"/>
+            <a:off x="1567280" y="2179133"/>
+            <a:ext cx="9167720" cy="3400967"/>
+            <a:chOff x="1627405" y="2179133"/>
+            <a:chExt cx="9167720" cy="3400967"/>
           </a:xfrm>
         </p:grpSpPr>
         <p:sp>
@@ -5374,195 +5031,145 @@
             </a:p>
           </p:txBody>
         </p:sp>
-        <p:grpSp>
-          <p:nvGrpSpPr>
-            <p:cNvPr id="75" name="Group 74"/>
-            <p:cNvGrpSpPr/>
+        <p:sp>
+          <p:nvSpPr>
+            <p:cNvPr id="15" name="Freeform 14"/>
+            <p:cNvSpPr/>
             <p:nvPr/>
-          </p:nvGrpSpPr>
-          <p:grpSpPr>
+          </p:nvSpPr>
+          <p:spPr>
             <a:xfrm>
-              <a:off x="1649593" y="2412080"/>
-              <a:ext cx="4170479" cy="2633365"/>
-              <a:chOff x="-80570" y="2802029"/>
-              <a:chExt cx="4170479" cy="2633365"/>
+              <a:off x="1627405" y="2544893"/>
+              <a:ext cx="3889677" cy="2633365"/>
             </a:xfrm>
-          </p:grpSpPr>
-          <p:sp>
-            <p:nvSpPr>
-              <p:cNvPr id="15" name="Freeform 14"/>
-              <p:cNvSpPr/>
-              <p:nvPr/>
-            </p:nvSpPr>
-            <p:spPr>
-              <a:xfrm>
-                <a:off x="-80570" y="2802029"/>
-                <a:ext cx="3889677" cy="2633365"/>
-              </a:xfrm>
-              <a:custGeom>
-                <a:avLst/>
-                <a:gdLst>
-                  <a:gd name="connsiteX0" fmla="*/ 0 w 3094136"/>
-                  <a:gd name="connsiteY0" fmla="*/ 0 h 1856482"/>
-                  <a:gd name="connsiteX1" fmla="*/ 3094136 w 3094136"/>
-                  <a:gd name="connsiteY1" fmla="*/ 0 h 1856482"/>
-                  <a:gd name="connsiteX2" fmla="*/ 3094136 w 3094136"/>
-                  <a:gd name="connsiteY2" fmla="*/ 1856482 h 1856482"/>
-                  <a:gd name="connsiteX3" fmla="*/ 0 w 3094136"/>
-                  <a:gd name="connsiteY3" fmla="*/ 1856482 h 1856482"/>
-                  <a:gd name="connsiteX4" fmla="*/ 0 w 3094136"/>
-                  <a:gd name="connsiteY4" fmla="*/ 0 h 1856482"/>
-                </a:gdLst>
-                <a:ahLst/>
-                <a:cxnLst>
-                  <a:cxn ang="0">
-                    <a:pos x="connsiteX0" y="connsiteY0"/>
-                  </a:cxn>
-                  <a:cxn ang="0">
-                    <a:pos x="connsiteX1" y="connsiteY1"/>
-                  </a:cxn>
-                  <a:cxn ang="0">
-                    <a:pos x="connsiteX2" y="connsiteY2"/>
-                  </a:cxn>
-                  <a:cxn ang="0">
-                    <a:pos x="connsiteX3" y="connsiteY3"/>
-                  </a:cxn>
-                  <a:cxn ang="0">
-                    <a:pos x="connsiteX4" y="connsiteY4"/>
-                  </a:cxn>
-                </a:cxnLst>
-                <a:rect l="l" t="t" r="r" b="b"/>
-                <a:pathLst>
-                  <a:path w="3094136" h="1856482">
-                    <a:moveTo>
-                      <a:pt x="0" y="0"/>
-                    </a:moveTo>
-                    <a:lnTo>
-                      <a:pt x="3094136" y="0"/>
-                    </a:lnTo>
-                    <a:lnTo>
-                      <a:pt x="3094136" y="1856482"/>
-                    </a:lnTo>
-                    <a:lnTo>
-                      <a:pt x="0" y="1856482"/>
-                    </a:lnTo>
-                    <a:lnTo>
-                      <a:pt x="0" y="0"/>
-                    </a:lnTo>
-                    <a:close/>
-                  </a:path>
-                </a:pathLst>
-              </a:custGeom>
+            <a:custGeom>
+              <a:avLst/>
+              <a:gdLst>
+                <a:gd name="connsiteX0" fmla="*/ 0 w 3094136"/>
+                <a:gd name="connsiteY0" fmla="*/ 0 h 1856482"/>
+                <a:gd name="connsiteX1" fmla="*/ 3094136 w 3094136"/>
+                <a:gd name="connsiteY1" fmla="*/ 0 h 1856482"/>
+                <a:gd name="connsiteX2" fmla="*/ 3094136 w 3094136"/>
+                <a:gd name="connsiteY2" fmla="*/ 1856482 h 1856482"/>
+                <a:gd name="connsiteX3" fmla="*/ 0 w 3094136"/>
+                <a:gd name="connsiteY3" fmla="*/ 1856482 h 1856482"/>
+                <a:gd name="connsiteX4" fmla="*/ 0 w 3094136"/>
+                <a:gd name="connsiteY4" fmla="*/ 0 h 1856482"/>
+              </a:gdLst>
+              <a:ahLst/>
+              <a:cxnLst>
+                <a:cxn ang="0">
+                  <a:pos x="connsiteX0" y="connsiteY0"/>
+                </a:cxn>
+                <a:cxn ang="0">
+                  <a:pos x="connsiteX1" y="connsiteY1"/>
+                </a:cxn>
+                <a:cxn ang="0">
+                  <a:pos x="connsiteX2" y="connsiteY2"/>
+                </a:cxn>
+                <a:cxn ang="0">
+                  <a:pos x="connsiteX3" y="connsiteY3"/>
+                </a:cxn>
+                <a:cxn ang="0">
+                  <a:pos x="connsiteX4" y="connsiteY4"/>
+                </a:cxn>
+              </a:cxnLst>
+              <a:rect l="l" t="t" r="r" b="b"/>
+              <a:pathLst>
+                <a:path w="3094136" h="1856482">
+                  <a:moveTo>
+                    <a:pt x="0" y="0"/>
+                  </a:moveTo>
+                  <a:lnTo>
+                    <a:pt x="3094136" y="0"/>
+                  </a:lnTo>
+                  <a:lnTo>
+                    <a:pt x="3094136" y="1856482"/>
+                  </a:lnTo>
+                  <a:lnTo>
+                    <a:pt x="0" y="1856482"/>
+                  </a:lnTo>
+                  <a:lnTo>
+                    <a:pt x="0" y="0"/>
+                  </a:lnTo>
+                  <a:close/>
+                </a:path>
+              </a:pathLst>
+            </a:custGeom>
+            <a:solidFill>
+              <a:schemeClr val="accent1">
+                <a:lumMod val="40000"/>
+                <a:lumOff val="60000"/>
+              </a:schemeClr>
+            </a:solidFill>
+            <a:ln w="57150">
               <a:solidFill>
-                <a:schemeClr val="accent1">
-                  <a:lumMod val="40000"/>
-                  <a:lumOff val="60000"/>
-                </a:schemeClr>
+                <a:schemeClr val="accent1"/>
               </a:solidFill>
-              <a:ln w="57150">
-                <a:solidFill>
-                  <a:schemeClr val="accent1"/>
-                </a:solidFill>
-              </a:ln>
-            </p:spPr>
-            <p:style>
-              <a:lnRef idx="2">
-                <a:schemeClr val="lt1">
-                  <a:hueOff val="0"/>
-                  <a:satOff val="0"/>
-                  <a:lumOff val="0"/>
-                  <a:alphaOff val="0"/>
-                </a:schemeClr>
-              </a:lnRef>
-              <a:fillRef idx="1">
-                <a:schemeClr val="accent1">
-                  <a:hueOff val="0"/>
-                  <a:satOff val="0"/>
-                  <a:lumOff val="0"/>
-                  <a:alphaOff val="0"/>
-                </a:schemeClr>
-              </a:fillRef>
-              <a:effectRef idx="0">
-                <a:schemeClr val="accent1">
-                  <a:hueOff val="0"/>
-                  <a:satOff val="0"/>
-                  <a:lumOff val="0"/>
-                  <a:alphaOff val="0"/>
-                </a:schemeClr>
-              </a:effectRef>
-              <a:fontRef idx="minor">
-                <a:schemeClr val="lt1"/>
-              </a:fontRef>
-            </p:style>
-            <p:txBody>
-              <a:bodyPr spcFirstLastPara="0" vert="horz" wrap="square" lIns="247650" tIns="247650" rIns="247650" bIns="247650" numCol="1" spcCol="1270" anchor="t" anchorCtr="0">
-                <a:noAutofit/>
-              </a:bodyPr>
-              <a:lstStyle/>
-              <a:p>
-                <a:pPr lvl="0" algn="ctr" defTabSz="2889250">
-                  <a:lnSpc>
-                    <a:spcPct val="90000"/>
-                  </a:lnSpc>
-                  <a:spcBef>
-                    <a:spcPct val="0"/>
-                  </a:spcBef>
-                  <a:spcAft>
-                    <a:spcPct val="35000"/>
-                  </a:spcAft>
-                </a:pPr>
-                <a:r>
-                  <a:rPr lang="en-US" sz="3200" kern="1200" dirty="0" smtClean="0">
-                    <a:solidFill>
-                      <a:schemeClr val="tx1"/>
-                    </a:solidFill>
-                  </a:rPr>
-                  <a:t>Altera FPGA</a:t>
-                </a:r>
-                <a:endParaRPr lang="en-US" sz="3200" kern="1200" dirty="0">
+            </a:ln>
+          </p:spPr>
+          <p:style>
+            <a:lnRef idx="2">
+              <a:schemeClr val="lt1">
+                <a:hueOff val="0"/>
+                <a:satOff val="0"/>
+                <a:lumOff val="0"/>
+                <a:alphaOff val="0"/>
+              </a:schemeClr>
+            </a:lnRef>
+            <a:fillRef idx="1">
+              <a:schemeClr val="accent1">
+                <a:hueOff val="0"/>
+                <a:satOff val="0"/>
+                <a:lumOff val="0"/>
+                <a:alphaOff val="0"/>
+              </a:schemeClr>
+            </a:fillRef>
+            <a:effectRef idx="0">
+              <a:schemeClr val="accent1">
+                <a:hueOff val="0"/>
+                <a:satOff val="0"/>
+                <a:lumOff val="0"/>
+                <a:alphaOff val="0"/>
+              </a:schemeClr>
+            </a:effectRef>
+            <a:fontRef idx="minor">
+              <a:schemeClr val="lt1"/>
+            </a:fontRef>
+          </p:style>
+          <p:txBody>
+            <a:bodyPr spcFirstLastPara="0" vert="horz" wrap="square" lIns="247650" tIns="247650" rIns="247650" bIns="247650" numCol="1" spcCol="1270" anchor="ctr" anchorCtr="0">
+              <a:noAutofit/>
+            </a:bodyPr>
+            <a:lstStyle/>
+            <a:p>
+              <a:pPr lvl="0" algn="ctr" defTabSz="2889250">
+                <a:lnSpc>
+                  <a:spcPct val="90000"/>
+                </a:lnSpc>
+                <a:spcBef>
+                  <a:spcPct val="0"/>
+                </a:spcBef>
+                <a:spcAft>
+                  <a:spcPct val="35000"/>
+                </a:spcAft>
+              </a:pPr>
+              <a:r>
+                <a:rPr lang="en-US" sz="3200" kern="1200" dirty="0" smtClean="0">
                   <a:solidFill>
                     <a:schemeClr val="tx1"/>
                   </a:solidFill>
-                </a:endParaRPr>
-              </a:p>
-            </p:txBody>
-          </p:sp>
-          <p:cxnSp>
-            <p:nvCxnSpPr>
-              <p:cNvPr id="63" name="Straight Connector 62"/>
-              <p:cNvCxnSpPr/>
-              <p:nvPr/>
-            </p:nvCxnSpPr>
-            <p:spPr>
-              <a:xfrm flipH="1">
-                <a:off x="3831665" y="4271867"/>
-                <a:ext cx="258244" cy="3208"/>
-              </a:xfrm>
-              <a:prstGeom prst="line">
-                <a:avLst/>
-              </a:prstGeom>
-              <a:ln cap="rnd">
-                <a:prstDash val="sysDash"/>
-                <a:headEnd type="none"/>
-                <a:tailEnd type="triangle"/>
-              </a:ln>
-            </p:spPr>
-            <p:style>
-              <a:lnRef idx="2">
-                <a:schemeClr val="dk1"/>
-              </a:lnRef>
-              <a:fillRef idx="0">
-                <a:schemeClr val="dk1"/>
-              </a:fillRef>
-              <a:effectRef idx="1">
-                <a:schemeClr val="dk1"/>
-              </a:effectRef>
-              <a:fontRef idx="minor">
-                <a:schemeClr val="tx1"/>
-              </a:fontRef>
-            </p:style>
-          </p:cxnSp>
-        </p:grpSp>
+                </a:rPr>
+                <a:t>Altera FPGA</a:t>
+              </a:r>
+              <a:endParaRPr lang="en-US" sz="3200" kern="1200" dirty="0">
+                <a:solidFill>
+                  <a:schemeClr val="tx1"/>
+                </a:solidFill>
+              </a:endParaRPr>
+            </a:p>
+          </p:txBody>
+        </p:sp>
         <p:sp>
           <p:nvSpPr>
             <p:cNvPr id="32" name="Rounded Rectangle 31"/>
@@ -5755,15 +5362,15 @@
           </p:nvCxnSpPr>
           <p:spPr>
             <a:xfrm>
-              <a:off x="5810547" y="3884010"/>
-              <a:ext cx="368338" cy="0"/>
+              <a:off x="5539270" y="3884010"/>
+              <a:ext cx="639615" cy="0"/>
             </a:xfrm>
             <a:prstGeom prst="line">
               <a:avLst/>
             </a:prstGeom>
             <a:ln>
-              <a:headEnd type="none"/>
-              <a:tailEnd type="triangle"/>
+              <a:headEnd type="triangle" w="med" len="med"/>
+              <a:tailEnd type="triangle" w="med" len="med"/>
             </a:ln>
           </p:spPr>
           <p:style>
@@ -6420,6 +6027,11 @@
           <a:prstGeom prst="leftBrace">
             <a:avLst/>
           </a:prstGeom>
+          <a:ln>
+            <a:solidFill>
+              <a:schemeClr val="tx1"/>
+            </a:solidFill>
+          </a:ln>
         </p:spPr>
         <p:style>
           <a:lnRef idx="2">
@@ -6540,7 +6152,11 @@
             <a:avLst/>
           </a:prstGeom>
           <a:ln>
-            <a:tailEnd type="arrow"/>
+            <a:solidFill>
+              <a:schemeClr val="tx1"/>
+            </a:solidFill>
+            <a:headEnd type="none" w="med" len="med"/>
+            <a:tailEnd type="triangle" w="med" len="med"/>
           </a:ln>
         </p:spPr>
         <p:style>
@@ -6573,10 +6189,16 @@
             <a:ext cx="1803754" cy="557543"/>
           </a:xfrm>
           <a:prstGeom prst="bentConnector3">
-            <a:avLst/>
+            <a:avLst>
+              <a:gd name="adj1" fmla="val 50667"/>
+            </a:avLst>
           </a:prstGeom>
           <a:ln>
-            <a:tailEnd type="arrow"/>
+            <a:solidFill>
+              <a:schemeClr val="tx1"/>
+            </a:solidFill>
+            <a:headEnd type="none" w="med" len="med"/>
+            <a:tailEnd type="triangle" w="med" len="med"/>
           </a:ln>
         </p:spPr>
         <p:style>
@@ -6612,7 +6234,11 @@
             <a:avLst/>
           </a:prstGeom>
           <a:ln>
-            <a:tailEnd type="arrow"/>
+            <a:solidFill>
+              <a:schemeClr val="tx1"/>
+            </a:solidFill>
+            <a:headEnd type="none" w="med" len="med"/>
+            <a:tailEnd type="triangle" w="med" len="med"/>
           </a:ln>
         </p:spPr>
         <p:style>
@@ -6792,7 +6418,11 @@
             <a:avLst/>
           </a:prstGeom>
           <a:ln>
-            <a:tailEnd type="arrow"/>
+            <a:solidFill>
+              <a:schemeClr val="tx1"/>
+            </a:solidFill>
+            <a:headEnd type="none" w="med" len="med"/>
+            <a:tailEnd type="triangle" w="med" len="med"/>
           </a:ln>
         </p:spPr>
         <p:style>
@@ -6828,7 +6458,11 @@
             <a:avLst/>
           </a:prstGeom>
           <a:ln>
-            <a:tailEnd type="arrow"/>
+            <a:solidFill>
+              <a:schemeClr val="tx1"/>
+            </a:solidFill>
+            <a:headEnd type="none" w="med" len="med"/>
+            <a:tailEnd type="triangle" w="med" len="med"/>
           </a:ln>
         </p:spPr>
         <p:style>
@@ -6864,7 +6498,11 @@
             <a:avLst/>
           </a:prstGeom>
           <a:ln>
-            <a:tailEnd type="arrow"/>
+            <a:solidFill>
+              <a:schemeClr val="tx1"/>
+            </a:solidFill>
+            <a:headEnd type="none" w="med" len="med"/>
+            <a:tailEnd type="triangle" w="med" len="med"/>
           </a:ln>
         </p:spPr>
         <p:style>
@@ -6896,6 +6534,11 @@
           <a:prstGeom prst="rightBrace">
             <a:avLst/>
           </a:prstGeom>
+          <a:ln>
+            <a:solidFill>
+              <a:schemeClr val="tx1"/>
+            </a:solidFill>
+          </a:ln>
         </p:spPr>
         <p:style>
           <a:lnRef idx="2">
@@ -7810,7 +7453,11 @@
             <a:avLst/>
           </a:prstGeom>
           <a:ln>
-            <a:tailEnd type="arrow"/>
+            <a:solidFill>
+              <a:schemeClr val="tx1"/>
+            </a:solidFill>
+            <a:headEnd type="none" w="med" len="med"/>
+            <a:tailEnd type="triangle" w="med" len="med"/>
           </a:ln>
         </p:spPr>
         <p:style>
@@ -7873,7 +7520,11 @@
             <a:avLst/>
           </a:prstGeom>
           <a:ln>
-            <a:tailEnd type="arrow"/>
+            <a:solidFill>
+              <a:schemeClr val="tx1"/>
+            </a:solidFill>
+            <a:headEnd type="none" w="med" len="med"/>
+            <a:tailEnd type="triangle" w="med" len="med"/>
           </a:ln>
         </p:spPr>
         <p:style>
@@ -7936,7 +7587,11 @@
             <a:avLst/>
           </a:prstGeom>
           <a:ln>
-            <a:tailEnd type="arrow"/>
+            <a:solidFill>
+              <a:schemeClr val="tx1"/>
+            </a:solidFill>
+            <a:headEnd type="none" w="med" len="med"/>
+            <a:tailEnd type="triangle" w="med" len="med"/>
           </a:ln>
         </p:spPr>
         <p:style>
@@ -7969,7 +7624,11 @@
             <a:avLst/>
           </a:prstGeom>
           <a:ln>
-            <a:tailEnd type="arrow"/>
+            <a:solidFill>
+              <a:schemeClr val="tx1"/>
+            </a:solidFill>
+            <a:headEnd type="none" w="med" len="med"/>
+            <a:tailEnd type="triangle" w="med" len="med"/>
           </a:ln>
         </p:spPr>
         <p:style>
@@ -8069,92 +7728,70 @@
           <a:p>
             <a:pPr lvl="1"/>
             <a:r>
-              <a:rPr lang="de-DE" dirty="0" smtClean="0"/>
+              <a:rPr lang="de-DE" sz="2400" dirty="0" smtClean="0"/>
               <a:t>Supports </a:t>
             </a:r>
             <a:r>
-              <a:rPr lang="de-DE" dirty="0"/>
+              <a:rPr lang="de-DE" sz="2400" dirty="0"/>
               <a:t>multiple shared memory </a:t>
             </a:r>
             <a:r>
-              <a:rPr lang="de-DE" dirty="0" smtClean="0"/>
+              <a:rPr lang="de-DE" sz="2400" dirty="0" smtClean="0"/>
               <a:t>areas</a:t>
             </a:r>
           </a:p>
           <a:p>
             <a:pPr lvl="1"/>
             <a:r>
-              <a:rPr lang="de-DE" dirty="0" smtClean="0"/>
+              <a:rPr lang="de-DE" sz="2400" dirty="0" smtClean="0"/>
               <a:t>One </a:t>
             </a:r>
             <a:r>
-              <a:rPr lang="de-DE" dirty="0"/>
+              <a:rPr lang="de-DE" sz="2400" dirty="0"/>
               <a:t>hardware mutex per </a:t>
             </a:r>
             <a:r>
-              <a:rPr lang="de-DE" dirty="0" smtClean="0"/>
+              <a:rPr lang="de-DE" sz="2400" dirty="0" smtClean="0"/>
               <a:t>area</a:t>
             </a:r>
-            <a:endParaRPr lang="de-DE" dirty="0"/>
+            <a:endParaRPr lang="de-DE" sz="2400" dirty="0"/>
           </a:p>
           <a:p>
             <a:pPr lvl="1"/>
-            <a:endParaRPr lang="de-DE" dirty="0"/>
+            <a:r>
+              <a:rPr lang="de-DE" sz="2400" dirty="0" smtClean="0"/>
+              <a:t>Instantiate a MemController for each </a:t>
+            </a:r>
+            <a:r>
+              <a:rPr lang="de-DE" sz="2400" dirty="0" smtClean="0"/>
+              <a:t>Area</a:t>
+            </a:r>
+          </a:p>
+          <a:p>
+            <a:pPr marL="201168" lvl="1" indent="0">
+              <a:buNone/>
+            </a:pPr>
+            <a:endParaRPr lang="de-DE" sz="2400" dirty="0" smtClean="0"/>
           </a:p>
           <a:p>
             <a:pPr lvl="1"/>
             <a:r>
-              <a:rPr lang="de-DE" dirty="0" smtClean="0"/>
-              <a:t>Instantiate a MemController for each Area</a:t>
-            </a:r>
-          </a:p>
-          <a:p>
-            <a:pPr lvl="1"/>
-            <a:r>
-              <a:rPr lang="de-DE" dirty="0" smtClean="0"/>
-              <a:t>Areas defined as Structs</a:t>
-            </a:r>
+              <a:rPr lang="de-DE" sz="2400" b="1" dirty="0" smtClean="0"/>
+              <a:t>API</a:t>
+            </a:r>
+            <a:r>
+              <a:rPr lang="de-DE" sz="2400" b="1" dirty="0"/>
+              <a:t>: </a:t>
+            </a:r>
+            <a:endParaRPr lang="de-DE" sz="2400" b="1" dirty="0" smtClean="0"/>
           </a:p>
           <a:p>
             <a:pPr lvl="2"/>
             <a:r>
-              <a:rPr lang="de-DE" dirty="0" smtClean="0"/>
-              <a:t>Content</a:t>
-            </a:r>
-          </a:p>
-          <a:p>
-            <a:pPr lvl="2"/>
-            <a:r>
-              <a:rPr lang="de-DE" dirty="0" smtClean="0"/>
-              <a:t>Index</a:t>
-            </a:r>
-          </a:p>
-          <a:p>
-            <a:pPr lvl="2"/>
-            <a:r>
-              <a:rPr lang="de-DE" dirty="0" smtClean="0"/>
-              <a:t>MaxElements</a:t>
-            </a:r>
-          </a:p>
-          <a:p>
-            <a:pPr lvl="1"/>
-            <a:r>
-              <a:rPr lang="de-DE" b="1" dirty="0" smtClean="0"/>
-              <a:t>API</a:t>
-            </a:r>
-            <a:r>
-              <a:rPr lang="de-DE" b="1" dirty="0"/>
-              <a:t>: </a:t>
-            </a:r>
-            <a:endParaRPr lang="de-DE" b="1" dirty="0" smtClean="0"/>
-          </a:p>
-          <a:p>
-            <a:pPr lvl="2"/>
-            <a:r>
-              <a:rPr lang="de-DE" dirty="0" smtClean="0"/>
+              <a:rPr lang="de-DE" sz="1800" dirty="0" smtClean="0"/>
               <a:t>get(idx), getLast(), getAll(), clear(), push()</a:t>
             </a:r>
-            <a:endParaRPr lang="de-DE" dirty="0"/>
+            <a:endParaRPr lang="de-DE" sz="1800" dirty="0"/>
           </a:p>
           <a:p>
             <a:endParaRPr lang="en-US" dirty="0" smtClean="0"/>
@@ -8169,8 +7806,8 @@
         </p:nvSpPr>
         <p:spPr>
           <a:xfrm>
-            <a:off x="6498558" y="2112745"/>
-            <a:ext cx="2103120" cy="958916"/>
+            <a:off x="5989920" y="1953923"/>
+            <a:ext cx="1693779" cy="1349115"/>
           </a:xfrm>
           <a:prstGeom prst="roundRect">
             <a:avLst>
@@ -8256,8 +7893,8 @@
         </p:nvSpPr>
         <p:spPr>
           <a:xfrm>
-            <a:off x="9090758" y="2112745"/>
-            <a:ext cx="2103120" cy="958916"/>
+            <a:off x="9783741" y="1953924"/>
+            <a:ext cx="1824664" cy="1349114"/>
           </a:xfrm>
           <a:prstGeom prst="roundRect">
             <a:avLst>
@@ -8332,8 +7969,8 @@
         </p:nvSpPr>
         <p:spPr>
           <a:xfrm>
-            <a:off x="6498558" y="3447046"/>
-            <a:ext cx="983580" cy="481263"/>
+            <a:off x="8241930" y="1953920"/>
+            <a:ext cx="983580" cy="287556"/>
           </a:xfrm>
           <a:prstGeom prst="roundRect">
             <a:avLst>
@@ -9017,8 +8654,8 @@
         </p:nvSpPr>
         <p:spPr>
           <a:xfrm>
-            <a:off x="8354430" y="3447046"/>
-            <a:ext cx="983578" cy="481263"/>
+            <a:off x="8241932" y="2458036"/>
+            <a:ext cx="983578" cy="312017"/>
           </a:xfrm>
           <a:prstGeom prst="roundRect">
             <a:avLst>
@@ -9093,8 +8730,8 @@
         </p:nvSpPr>
         <p:spPr>
           <a:xfrm>
-            <a:off x="10210300" y="3447046"/>
-            <a:ext cx="983578" cy="481263"/>
+            <a:off x="8241932" y="2986613"/>
+            <a:ext cx="983578" cy="316426"/>
           </a:xfrm>
           <a:prstGeom prst="roundRect">
             <a:avLst>
@@ -9161,6 +8798,385 @@
           </a:p>
         </p:txBody>
       </p:sp>
+      <p:cxnSp>
+        <p:nvCxnSpPr>
+          <p:cNvPr id="14" name="Straight Arrow Connector 13"/>
+          <p:cNvCxnSpPr/>
+          <p:nvPr/>
+        </p:nvCxnSpPr>
+        <p:spPr>
+          <a:xfrm>
+            <a:off x="9244359" y="3133995"/>
+            <a:ext cx="539382" cy="10831"/>
+          </a:xfrm>
+          <a:prstGeom prst="straightConnector1">
+            <a:avLst/>
+          </a:prstGeom>
+          <a:ln w="19050">
+            <a:solidFill>
+              <a:schemeClr val="tx1"/>
+            </a:solidFill>
+            <a:headEnd type="triangle"/>
+            <a:tailEnd type="triangle"/>
+          </a:ln>
+        </p:spPr>
+        <p:style>
+          <a:lnRef idx="1">
+            <a:schemeClr val="accent1"/>
+          </a:lnRef>
+          <a:fillRef idx="0">
+            <a:schemeClr val="accent1"/>
+          </a:fillRef>
+          <a:effectRef idx="0">
+            <a:schemeClr val="accent1"/>
+          </a:effectRef>
+          <a:fontRef idx="minor">
+            <a:schemeClr val="tx1"/>
+          </a:fontRef>
+        </p:style>
+      </p:cxnSp>
+      <p:cxnSp>
+        <p:nvCxnSpPr>
+          <p:cNvPr id="17" name="Straight Arrow Connector 16"/>
+          <p:cNvCxnSpPr/>
+          <p:nvPr/>
+        </p:nvCxnSpPr>
+        <p:spPr>
+          <a:xfrm>
+            <a:off x="9244359" y="2615835"/>
+            <a:ext cx="539382" cy="10831"/>
+          </a:xfrm>
+          <a:prstGeom prst="straightConnector1">
+            <a:avLst/>
+          </a:prstGeom>
+          <a:ln w="19050">
+            <a:solidFill>
+              <a:schemeClr val="tx1"/>
+            </a:solidFill>
+            <a:headEnd type="triangle"/>
+            <a:tailEnd type="triangle"/>
+          </a:ln>
+        </p:spPr>
+        <p:style>
+          <a:lnRef idx="1">
+            <a:schemeClr val="accent1"/>
+          </a:lnRef>
+          <a:fillRef idx="0">
+            <a:schemeClr val="accent1"/>
+          </a:fillRef>
+          <a:effectRef idx="0">
+            <a:schemeClr val="accent1"/>
+          </a:effectRef>
+          <a:fontRef idx="minor">
+            <a:schemeClr val="tx1"/>
+          </a:fontRef>
+        </p:style>
+      </p:cxnSp>
+      <p:cxnSp>
+        <p:nvCxnSpPr>
+          <p:cNvPr id="18" name="Straight Arrow Connector 17"/>
+          <p:cNvCxnSpPr/>
+          <p:nvPr/>
+        </p:nvCxnSpPr>
+        <p:spPr>
+          <a:xfrm>
+            <a:off x="9244359" y="2082435"/>
+            <a:ext cx="539382" cy="10831"/>
+          </a:xfrm>
+          <a:prstGeom prst="straightConnector1">
+            <a:avLst/>
+          </a:prstGeom>
+          <a:ln w="19050">
+            <a:solidFill>
+              <a:schemeClr val="tx1"/>
+            </a:solidFill>
+            <a:headEnd type="triangle"/>
+            <a:tailEnd type="triangle"/>
+          </a:ln>
+        </p:spPr>
+        <p:style>
+          <a:lnRef idx="1">
+            <a:schemeClr val="accent1"/>
+          </a:lnRef>
+          <a:fillRef idx="0">
+            <a:schemeClr val="accent1"/>
+          </a:fillRef>
+          <a:effectRef idx="0">
+            <a:schemeClr val="accent1"/>
+          </a:effectRef>
+          <a:fontRef idx="minor">
+            <a:schemeClr val="tx1"/>
+          </a:fontRef>
+        </p:style>
+      </p:cxnSp>
+      <p:cxnSp>
+        <p:nvCxnSpPr>
+          <p:cNvPr id="19" name="Straight Arrow Connector 18"/>
+          <p:cNvCxnSpPr/>
+          <p:nvPr/>
+        </p:nvCxnSpPr>
+        <p:spPr>
+          <a:xfrm>
+            <a:off x="7689879" y="3133995"/>
+            <a:ext cx="539382" cy="10831"/>
+          </a:xfrm>
+          <a:prstGeom prst="straightConnector1">
+            <a:avLst/>
+          </a:prstGeom>
+          <a:ln w="19050">
+            <a:solidFill>
+              <a:schemeClr val="tx1"/>
+            </a:solidFill>
+            <a:headEnd type="triangle"/>
+            <a:tailEnd type="triangle"/>
+          </a:ln>
+        </p:spPr>
+        <p:style>
+          <a:lnRef idx="1">
+            <a:schemeClr val="accent1"/>
+          </a:lnRef>
+          <a:fillRef idx="0">
+            <a:schemeClr val="accent1"/>
+          </a:fillRef>
+          <a:effectRef idx="0">
+            <a:schemeClr val="accent1"/>
+          </a:effectRef>
+          <a:fontRef idx="minor">
+            <a:schemeClr val="tx1"/>
+          </a:fontRef>
+        </p:style>
+      </p:cxnSp>
+      <p:cxnSp>
+        <p:nvCxnSpPr>
+          <p:cNvPr id="20" name="Straight Arrow Connector 19"/>
+          <p:cNvCxnSpPr/>
+          <p:nvPr/>
+        </p:nvCxnSpPr>
+        <p:spPr>
+          <a:xfrm>
+            <a:off x="7689879" y="2615835"/>
+            <a:ext cx="539382" cy="10831"/>
+          </a:xfrm>
+          <a:prstGeom prst="straightConnector1">
+            <a:avLst/>
+          </a:prstGeom>
+          <a:ln w="19050">
+            <a:solidFill>
+              <a:schemeClr val="tx1"/>
+            </a:solidFill>
+            <a:headEnd type="triangle"/>
+            <a:tailEnd type="triangle"/>
+          </a:ln>
+        </p:spPr>
+        <p:style>
+          <a:lnRef idx="1">
+            <a:schemeClr val="accent1"/>
+          </a:lnRef>
+          <a:fillRef idx="0">
+            <a:schemeClr val="accent1"/>
+          </a:fillRef>
+          <a:effectRef idx="0">
+            <a:schemeClr val="accent1"/>
+          </a:effectRef>
+          <a:fontRef idx="minor">
+            <a:schemeClr val="tx1"/>
+          </a:fontRef>
+        </p:style>
+      </p:cxnSp>
+      <p:cxnSp>
+        <p:nvCxnSpPr>
+          <p:cNvPr id="21" name="Straight Arrow Connector 20"/>
+          <p:cNvCxnSpPr/>
+          <p:nvPr/>
+        </p:nvCxnSpPr>
+        <p:spPr>
+          <a:xfrm>
+            <a:off x="7689879" y="2082435"/>
+            <a:ext cx="539382" cy="10831"/>
+          </a:xfrm>
+          <a:prstGeom prst="straightConnector1">
+            <a:avLst/>
+          </a:prstGeom>
+          <a:ln w="19050">
+            <a:solidFill>
+              <a:schemeClr val="tx1"/>
+            </a:solidFill>
+            <a:headEnd type="triangle"/>
+            <a:tailEnd type="triangle"/>
+          </a:ln>
+        </p:spPr>
+        <p:style>
+          <a:lnRef idx="1">
+            <a:schemeClr val="accent1"/>
+          </a:lnRef>
+          <a:fillRef idx="0">
+            <a:schemeClr val="accent1"/>
+          </a:fillRef>
+          <a:effectRef idx="0">
+            <a:schemeClr val="accent1"/>
+          </a:effectRef>
+          <a:fontRef idx="minor">
+            <a:schemeClr val="tx1"/>
+          </a:fontRef>
+        </p:style>
+      </p:cxnSp>
+      <p:cxnSp>
+        <p:nvCxnSpPr>
+          <p:cNvPr id="22" name="Gewinkelte Verbindung 48"/>
+          <p:cNvCxnSpPr>
+            <a:stCxn id="5" idx="2"/>
+            <a:endCxn id="8" idx="0"/>
+          </p:cNvCxnSpPr>
+          <p:nvPr/>
+        </p:nvCxnSpPr>
+        <p:spPr>
+          <a:xfrm rot="5400000">
+            <a:off x="9319980" y="2774801"/>
+            <a:ext cx="847857" cy="1904331"/>
+          </a:xfrm>
+          <a:prstGeom prst="bentConnector3">
+            <a:avLst>
+              <a:gd name="adj1" fmla="val 50000"/>
+            </a:avLst>
+          </a:prstGeom>
+          <a:ln>
+            <a:solidFill>
+              <a:schemeClr val="tx1"/>
+            </a:solidFill>
+            <a:headEnd type="none" w="med" len="med"/>
+            <a:tailEnd type="triangle" w="med" len="med"/>
+          </a:ln>
+        </p:spPr>
+        <p:style>
+          <a:lnRef idx="2">
+            <a:schemeClr val="accent1"/>
+          </a:lnRef>
+          <a:fillRef idx="0">
+            <a:schemeClr val="accent1"/>
+          </a:fillRef>
+          <a:effectRef idx="1">
+            <a:schemeClr val="accent1"/>
+          </a:effectRef>
+          <a:fontRef idx="minor">
+            <a:schemeClr val="tx1"/>
+          </a:fontRef>
+        </p:style>
+      </p:cxnSp>
+      <p:cxnSp>
+        <p:nvCxnSpPr>
+          <p:cNvPr id="39" name="Straight Arrow Connector 38"/>
+          <p:cNvCxnSpPr>
+            <a:stCxn id="4" idx="2"/>
+          </p:cNvCxnSpPr>
+          <p:nvPr/>
+        </p:nvCxnSpPr>
+        <p:spPr>
+          <a:xfrm flipH="1">
+            <a:off x="6836809" y="3303038"/>
+            <a:ext cx="1" cy="847857"/>
+          </a:xfrm>
+          <a:prstGeom prst="straightConnector1">
+            <a:avLst/>
+          </a:prstGeom>
+          <a:ln w="19050">
+            <a:solidFill>
+              <a:schemeClr val="tx1"/>
+            </a:solidFill>
+            <a:tailEnd type="triangle"/>
+          </a:ln>
+        </p:spPr>
+        <p:style>
+          <a:lnRef idx="1">
+            <a:schemeClr val="accent1"/>
+          </a:lnRef>
+          <a:fillRef idx="0">
+            <a:schemeClr val="accent1"/>
+          </a:fillRef>
+          <a:effectRef idx="0">
+            <a:schemeClr val="accent1"/>
+          </a:effectRef>
+          <a:fontRef idx="minor">
+            <a:schemeClr val="tx1"/>
+          </a:fontRef>
+        </p:style>
+      </p:cxnSp>
+      <p:cxnSp>
+        <p:nvCxnSpPr>
+          <p:cNvPr id="41" name="Straight Arrow Connector 40"/>
+          <p:cNvCxnSpPr>
+            <a:stCxn id="5" idx="2"/>
+          </p:cNvCxnSpPr>
+          <p:nvPr/>
+        </p:nvCxnSpPr>
+        <p:spPr>
+          <a:xfrm>
+            <a:off x="10696073" y="3303038"/>
+            <a:ext cx="0" cy="847857"/>
+          </a:xfrm>
+          <a:prstGeom prst="straightConnector1">
+            <a:avLst/>
+          </a:prstGeom>
+          <a:ln w="19050">
+            <a:solidFill>
+              <a:schemeClr val="tx1"/>
+            </a:solidFill>
+            <a:tailEnd type="triangle"/>
+          </a:ln>
+        </p:spPr>
+        <p:style>
+          <a:lnRef idx="1">
+            <a:schemeClr val="accent1"/>
+          </a:lnRef>
+          <a:fillRef idx="0">
+            <a:schemeClr val="accent1"/>
+          </a:fillRef>
+          <a:effectRef idx="0">
+            <a:schemeClr val="accent1"/>
+          </a:effectRef>
+          <a:fontRef idx="minor">
+            <a:schemeClr val="tx1"/>
+          </a:fontRef>
+        </p:style>
+      </p:cxnSp>
+      <p:cxnSp>
+        <p:nvCxnSpPr>
+          <p:cNvPr id="43" name="Elbow Connector 42"/>
+          <p:cNvCxnSpPr>
+            <a:stCxn id="4" idx="2"/>
+            <a:endCxn id="8" idx="0"/>
+          </p:cNvCxnSpPr>
+          <p:nvPr/>
+        </p:nvCxnSpPr>
+        <p:spPr>
+          <a:xfrm rot="16200000" flipH="1">
+            <a:off x="7390348" y="2749500"/>
+            <a:ext cx="847857" cy="1954932"/>
+          </a:xfrm>
+          <a:prstGeom prst="bentConnector3">
+            <a:avLst/>
+          </a:prstGeom>
+          <a:ln w="19050">
+            <a:solidFill>
+              <a:schemeClr val="tx1"/>
+            </a:solidFill>
+            <a:tailEnd type="triangle"/>
+          </a:ln>
+        </p:spPr>
+        <p:style>
+          <a:lnRef idx="1">
+            <a:schemeClr val="accent1"/>
+          </a:lnRef>
+          <a:fillRef idx="0">
+            <a:schemeClr val="accent1"/>
+          </a:fillRef>
+          <a:effectRef idx="0">
+            <a:schemeClr val="accent1"/>
+          </a:effectRef>
+          <a:fontRef idx="minor">
+            <a:schemeClr val="tx1"/>
+          </a:fontRef>
+        </p:style>
+      </p:cxnSp>
     </p:spTree>
     <p:extLst>
       <p:ext uri="{BB962C8B-B14F-4D97-AF65-F5344CB8AC3E}">
@@ -9215,15 +9231,11 @@
           <a:p>
             <a:r>
               <a:rPr lang="de-DE" dirty="0" smtClean="0"/>
-              <a:t>Car </a:t>
-            </a:r>
-            <a:r>
-              <a:rPr lang="de-DE" dirty="0" err="1" smtClean="0"/>
-              <a:t>Control</a:t>
+              <a:t>Car Control </a:t>
             </a:r>
             <a:r>
               <a:rPr lang="de-DE" dirty="0" smtClean="0"/>
-              <a:t> Core (JO)</a:t>
+              <a:t>Core</a:t>
             </a:r>
             <a:endParaRPr lang="de-DE" dirty="0"/>
           </a:p>
@@ -9239,40 +9251,88 @@
             <p:ph idx="1"/>
           </p:nvPr>
         </p:nvSpPr>
-        <p:spPr/>
+        <p:spPr>
+          <a:xfrm>
+            <a:off x="1097280" y="2363894"/>
+            <a:ext cx="5334000" cy="3198706"/>
+          </a:xfrm>
+        </p:spPr>
         <p:txBody>
-          <a:bodyPr/>
+          <a:bodyPr>
+            <a:normAutofit/>
+          </a:bodyPr>
           <a:lstStyle/>
           <a:p>
             <a:pPr lvl="1"/>
             <a:r>
-              <a:rPr lang="de-DE" dirty="0" smtClean="0"/>
+              <a:rPr lang="de-DE" sz="2400" dirty="0" smtClean="0"/>
               <a:t>State machine based on Operating mode: idle, autonomous, remote control, emergency brake</a:t>
             </a:r>
           </a:p>
           <a:p>
             <a:pPr lvl="2"/>
             <a:r>
-              <a:rPr lang="de-DE" dirty="0" smtClean="0"/>
+              <a:rPr lang="de-DE" sz="1800" dirty="0" smtClean="0"/>
               <a:t>Sets car parameters (max speed)</a:t>
             </a:r>
           </a:p>
           <a:p>
             <a:pPr lvl="1"/>
             <a:r>
-              <a:rPr lang="de-DE" dirty="0" smtClean="0"/>
+              <a:rPr lang="de-DE" sz="2400" dirty="0" smtClean="0"/>
               <a:t>Calculates the velocities of the individual motors</a:t>
             </a:r>
           </a:p>
           <a:p>
             <a:pPr lvl="1"/>
             <a:r>
-              <a:rPr lang="de-DE" dirty="0" smtClean="0"/>
+              <a:rPr lang="de-DE" sz="2400" dirty="0" smtClean="0"/>
               <a:t>Modular idea: run image processing, more fancy control code.</a:t>
             </a:r>
           </a:p>
         </p:txBody>
       </p:sp>
+      <p:pic>
+        <p:nvPicPr>
+          <p:cNvPr id="1026" name="Picture 2" descr="http://blog.dayfire.com/wp-content/uploads/2014/01/snes-controller.jpg"/>
+          <p:cNvPicPr>
+            <a:picLocks noChangeAspect="1" noChangeArrowheads="1"/>
+          </p:cNvPicPr>
+          <p:nvPr/>
+        </p:nvPicPr>
+        <p:blipFill>
+          <a:blip r:embed="rId2" cstate="print">
+            <a:extLst>
+              <a:ext uri="{28A0092B-C50C-407E-A947-70E740481C1C}">
+                <a14:useLocalDpi xmlns:a14="http://schemas.microsoft.com/office/drawing/2010/main" val="0"/>
+              </a:ext>
+            </a:extLst>
+          </a:blip>
+          <a:srcRect/>
+          <a:stretch>
+            <a:fillRect/>
+          </a:stretch>
+        </p:blipFill>
+        <p:spPr bwMode="auto">
+          <a:xfrm>
+            <a:off x="6431280" y="2363894"/>
+            <a:ext cx="4751365" cy="2530687"/>
+          </a:xfrm>
+          <a:prstGeom prst="rect">
+            <a:avLst/>
+          </a:prstGeom>
+          <a:noFill/>
+          <a:extLst>
+            <a:ext uri="{909E8E84-426E-40DD-AFC4-6F175D3DCCD1}">
+              <a14:hiddenFill xmlns:a14="http://schemas.microsoft.com/office/drawing/2010/main">
+                <a:solidFill>
+                  <a:srgbClr val="FFFFFF"/>
+                </a:solidFill>
+              </a14:hiddenFill>
+            </a:ext>
+          </a:extLst>
+        </p:spPr>
+      </p:pic>
     </p:spTree>
     <p:extLst>
       <p:ext uri="{BB962C8B-B14F-4D97-AF65-F5344CB8AC3E}">
@@ -9327,11 +9387,7 @@
           <a:p>
             <a:r>
               <a:rPr lang="de-DE" dirty="0" smtClean="0"/>
-              <a:t>C2X </a:t>
-            </a:r>
-            <a:r>
-              <a:rPr lang="de-DE" dirty="0" smtClean="0"/>
-              <a:t>protocol: the packets</a:t>
+              <a:t>C2X protocol: the packets</a:t>
             </a:r>
             <a:endParaRPr lang="de-DE" dirty="0"/>
           </a:p>
@@ -10306,11 +10362,7 @@
           <a:p>
             <a:r>
               <a:rPr lang="de-DE" dirty="0" smtClean="0"/>
-              <a:t>C2X </a:t>
-            </a:r>
-            <a:r>
-              <a:rPr lang="de-DE" dirty="0" smtClean="0"/>
-              <a:t>protocol: what‘s supported</a:t>
+              <a:t>C2X protocol: what‘s supported</a:t>
             </a:r>
             <a:endParaRPr lang="de-DE" dirty="0"/>
           </a:p>
@@ -10361,11 +10413,7 @@
             <a:pPr lvl="1"/>
             <a:r>
               <a:rPr lang="de-DE" dirty="0" smtClean="0"/>
-              <a:t>0x08 - </a:t>
-            </a:r>
-            <a:r>
-              <a:rPr lang="de-DE" dirty="0" smtClean="0"/>
-              <a:t>GoalPose</a:t>
+              <a:t>0x08 - GoalPose</a:t>
             </a:r>
           </a:p>
           <a:p>
@@ -10928,11 +10976,7 @@
           <a:p>
             <a:r>
               <a:rPr lang="de-DE" dirty="0" smtClean="0"/>
-              <a:t>C2X </a:t>
-            </a:r>
-            <a:r>
-              <a:rPr lang="de-DE" dirty="0" smtClean="0"/>
-              <a:t>protocol: what‘s supported</a:t>
+              <a:t>C2X protocol: what‘s supported</a:t>
             </a:r>
             <a:endParaRPr lang="de-DE" dirty="0"/>
           </a:p>
@@ -10983,11 +11027,7 @@
             <a:pPr lvl="1"/>
             <a:r>
               <a:rPr lang="de-DE" dirty="0" smtClean="0"/>
-              <a:t>0x08 - </a:t>
-            </a:r>
-            <a:r>
-              <a:rPr lang="de-DE" dirty="0" smtClean="0"/>
-              <a:t>GoalPose</a:t>
+              <a:t>0x08 - GoalPose</a:t>
             </a:r>
           </a:p>
           <a:p>
@@ -11987,15 +12027,7 @@
           <a:p>
             <a:r>
               <a:rPr lang="en-US" dirty="0" smtClean="0"/>
-              <a:t>Main Working Steps so far (</a:t>
-            </a:r>
-            <a:r>
-              <a:rPr lang="en-US" dirty="0" err="1" smtClean="0"/>
-              <a:t>hagen</a:t>
-            </a:r>
-            <a:r>
-              <a:rPr lang="en-US" dirty="0" smtClean="0"/>
-              <a:t>)</a:t>
+              <a:t>Pre-midterm</a:t>
             </a:r>
             <a:endParaRPr lang="en-US" dirty="0"/>
           </a:p>
@@ -12171,31 +12203,7 @@
           <a:p>
             <a:r>
               <a:rPr lang="de-DE" dirty="0" smtClean="0"/>
-              <a:t>Work </a:t>
-            </a:r>
-            <a:r>
-              <a:rPr lang="de-DE" dirty="0" err="1" smtClean="0"/>
-              <a:t>since</a:t>
-            </a:r>
-            <a:r>
-              <a:rPr lang="de-DE" dirty="0" smtClean="0"/>
-              <a:t> </a:t>
-            </a:r>
-            <a:r>
-              <a:rPr lang="de-DE" dirty="0" err="1" smtClean="0"/>
-              <a:t>midterm</a:t>
-            </a:r>
-            <a:r>
-              <a:rPr lang="de-DE" dirty="0" smtClean="0"/>
-              <a:t> (</a:t>
-            </a:r>
-            <a:r>
-              <a:rPr lang="de-DE" dirty="0" err="1" smtClean="0"/>
-              <a:t>hagen</a:t>
-            </a:r>
-            <a:r>
-              <a:rPr lang="de-DE" dirty="0" smtClean="0"/>
-              <a:t>)</a:t>
+              <a:t>Post-midterm</a:t>
             </a:r>
             <a:endParaRPr lang="de-DE" dirty="0"/>
           </a:p>
@@ -12211,15 +12219,136 @@
             <p:ph idx="1"/>
           </p:nvPr>
         </p:nvSpPr>
-        <p:spPr/>
+        <p:spPr>
+          <a:xfrm>
+            <a:off x="1097280" y="1845734"/>
+            <a:ext cx="5638800" cy="4341706"/>
+          </a:xfrm>
+        </p:spPr>
         <p:txBody>
-          <a:bodyPr/>
+          <a:bodyPr>
+            <a:noAutofit/>
+          </a:bodyPr>
           <a:lstStyle/>
           <a:p>
-            <a:endParaRPr lang="de-DE"/>
+            <a:pPr lvl="1"/>
+            <a:r>
+              <a:rPr lang="de-DE" sz="2800" dirty="0" smtClean="0"/>
+              <a:t>Hardware (THE BIG ONE)</a:t>
+            </a:r>
+            <a:endParaRPr lang="de-DE" sz="2800" dirty="0"/>
+          </a:p>
+          <a:p>
+            <a:pPr lvl="3"/>
+            <a:r>
+              <a:rPr lang="de-DE" sz="2400" dirty="0" smtClean="0"/>
+              <a:t>Ethernet controller</a:t>
+            </a:r>
+          </a:p>
+          <a:p>
+            <a:pPr lvl="3"/>
+            <a:r>
+              <a:rPr lang="de-DE" sz="2400" dirty="0" smtClean="0"/>
+              <a:t>Memory problems</a:t>
+            </a:r>
+          </a:p>
+          <a:p>
+            <a:pPr lvl="3"/>
+            <a:r>
+              <a:rPr lang="de-DE" sz="2400" dirty="0" smtClean="0"/>
+              <a:t>Timing problems</a:t>
+            </a:r>
+          </a:p>
+          <a:p>
+            <a:pPr lvl="3"/>
+            <a:r>
+              <a:rPr lang="de-DE" sz="2400" dirty="0" smtClean="0"/>
+              <a:t>.... problems</a:t>
+            </a:r>
+          </a:p>
+          <a:p>
+            <a:pPr lvl="1"/>
+            <a:r>
+              <a:rPr lang="de-DE" sz="2800" dirty="0" smtClean="0"/>
+              <a:t>We also implemented a lot of software</a:t>
+            </a:r>
+          </a:p>
+          <a:p>
+            <a:pPr lvl="3"/>
+            <a:r>
+              <a:rPr lang="de-DE" sz="2400" dirty="0" smtClean="0"/>
+              <a:t>Telnet server</a:t>
+            </a:r>
+          </a:p>
+          <a:p>
+            <a:pPr lvl="3"/>
+            <a:r>
+              <a:rPr lang="de-DE" sz="2400" dirty="0" smtClean="0"/>
+              <a:t>Message handler</a:t>
+            </a:r>
+          </a:p>
+          <a:p>
+            <a:pPr lvl="3"/>
+            <a:r>
+              <a:rPr lang="de-DE" sz="2400" dirty="0" smtClean="0"/>
+              <a:t>Shared Memory controller</a:t>
+            </a:r>
+          </a:p>
+          <a:p>
+            <a:pPr lvl="3"/>
+            <a:r>
+              <a:rPr lang="de-DE" sz="2400" dirty="0" smtClean="0"/>
+              <a:t>Testing GUI</a:t>
+            </a:r>
+            <a:endParaRPr lang="de-DE" sz="2400" dirty="0"/>
+          </a:p>
+          <a:p>
+            <a:pPr lvl="1"/>
+            <a:endParaRPr lang="de-DE" sz="2800" dirty="0" smtClean="0"/>
           </a:p>
         </p:txBody>
       </p:sp>
+      <p:pic>
+        <p:nvPicPr>
+          <p:cNvPr id="2050" name="Picture 2" descr="http://www.pcmech.com/wp-content/uploads/2007/12/hardware.jpg"/>
+          <p:cNvPicPr>
+            <a:picLocks noChangeAspect="1" noChangeArrowheads="1"/>
+          </p:cNvPicPr>
+          <p:nvPr/>
+        </p:nvPicPr>
+        <p:blipFill>
+          <a:blip r:embed="rId2">
+            <a:extLst>
+              <a:ext uri="{28A0092B-C50C-407E-A947-70E740481C1C}">
+                <a14:useLocalDpi xmlns:a14="http://schemas.microsoft.com/office/drawing/2010/main" val="0"/>
+              </a:ext>
+            </a:extLst>
+          </a:blip>
+          <a:srcRect/>
+          <a:stretch>
+            <a:fillRect/>
+          </a:stretch>
+        </p:blipFill>
+        <p:spPr bwMode="auto">
+          <a:xfrm>
+            <a:off x="7165974" y="1845734"/>
+            <a:ext cx="3349625" cy="4170285"/>
+          </a:xfrm>
+          <a:prstGeom prst="rect">
+            <a:avLst/>
+          </a:prstGeom>
+          <a:noFill/>
+          <a:extLst>
+            <a:ext uri="{909E8E84-426E-40DD-AFC4-6F175D3DCCD1}">
+              <a14:hiddenFill xmlns:a14="http://schemas.microsoft.com/office/drawing/2010/main">
+                <a:solidFill>
+                  <a:srgbClr val="FFFFFF"/>
+                </a:solidFill>
+              </a14:hiddenFill>
+            </a:ext>
+          </a:extLst>
+        </p:spPr>
+      </p:pic>
     </p:spTree>
     <p:extLst>
       <p:ext uri="{BB962C8B-B14F-4D97-AF65-F5344CB8AC3E}">
@@ -12426,7 +12555,7 @@
           <a:noFill/>
           <a:extLst>
             <a:ext uri="{909E8E84-426E-40dd-AFC4-6F175D3DCCD1}">
-              <a14:hiddenFill xmlns:a14="http://schemas.microsoft.com/office/drawing/2010/main" xmlns="">
+              <a14:hiddenFill xmlns="" xmlns:a14="http://schemas.microsoft.com/office/drawing/2010/main">
                 <a:solidFill>
                   <a:srgbClr val="FFFFFF"/>
                 </a:solidFill>
@@ -13728,7 +13857,7 @@
             </a:r>
             <a:r>
               <a:rPr lang="de-DE" dirty="0" err="1" smtClean="0"/>
-              <a:t>Toplevel</a:t>
+              <a:t>Hierarchy</a:t>
             </a:r>
             <a:r>
               <a:rPr lang="de-DE" dirty="0" smtClean="0"/>
@@ -13740,34 +13869,310 @@
       </p:sp>
       <p:sp>
         <p:nvSpPr>
-          <p:cNvPr id="3" name="Inhaltsplatzhalter 2"/>
-          <p:cNvSpPr>
-            <a:spLocks noGrp="1"/>
-          </p:cNvSpPr>
-          <p:nvPr>
-            <p:ph idx="1"/>
-          </p:nvPr>
-        </p:nvSpPr>
-        <p:spPr/>
+          <p:cNvPr id="5" name="Abgerundetes Rechteck 4"/>
+          <p:cNvSpPr/>
+          <p:nvPr/>
+        </p:nvSpPr>
+        <p:spPr>
+          <a:xfrm>
+            <a:off x="8682681" y="4604950"/>
+            <a:ext cx="914400" cy="914400"/>
+          </a:xfrm>
+          <a:prstGeom prst="roundRect">
+            <a:avLst/>
+          </a:prstGeom>
+        </p:spPr>
+        <p:style>
+          <a:lnRef idx="2">
+            <a:schemeClr val="accent3">
+              <a:shade val="50000"/>
+            </a:schemeClr>
+          </a:lnRef>
+          <a:fillRef idx="1">
+            <a:schemeClr val="accent3"/>
+          </a:fillRef>
+          <a:effectRef idx="0">
+            <a:schemeClr val="accent3"/>
+          </a:effectRef>
+          <a:fontRef idx="minor">
+            <a:schemeClr val="lt1"/>
+          </a:fontRef>
+        </p:style>
         <p:txBody>
-          <a:bodyPr/>
+          <a:bodyPr rtlCol="0" anchor="ctr"/>
           <a:lstStyle/>
           <a:p>
+            <a:pPr algn="ctr"/>
             <a:r>
               <a:rPr lang="de-DE" dirty="0" smtClean="0"/>
-              <a:t>„</a:t>
-            </a:r>
+              <a:t>QSYS</a:t>
+            </a:r>
+          </a:p>
+          <a:p>
+            <a:pPr algn="ctr"/>
             <a:r>
               <a:rPr lang="de-DE" dirty="0" err="1" smtClean="0"/>
-              <a:t>boring</a:t>
-            </a:r>
+              <a:t>entity</a:t>
+            </a:r>
+            <a:endParaRPr lang="de-DE" dirty="0"/>
+          </a:p>
+        </p:txBody>
+      </p:sp>
+      <p:sp>
+        <p:nvSpPr>
+          <p:cNvPr id="6" name="Abgerundetes Rechteck 5"/>
+          <p:cNvSpPr/>
+          <p:nvPr/>
+        </p:nvSpPr>
+        <p:spPr>
+          <a:xfrm>
+            <a:off x="5420493" y="4604950"/>
+            <a:ext cx="914400" cy="914400"/>
+          </a:xfrm>
+          <a:prstGeom prst="roundRect">
+            <a:avLst/>
+          </a:prstGeom>
+        </p:spPr>
+        <p:style>
+          <a:lnRef idx="2">
+            <a:schemeClr val="accent6">
+              <a:shade val="50000"/>
+            </a:schemeClr>
+          </a:lnRef>
+          <a:fillRef idx="1">
+            <a:schemeClr val="accent6"/>
+          </a:fillRef>
+          <a:effectRef idx="0">
+            <a:schemeClr val="accent6"/>
+          </a:effectRef>
+          <a:fontRef idx="minor">
+            <a:schemeClr val="lt1"/>
+          </a:fontRef>
+        </p:style>
+        <p:txBody>
+          <a:bodyPr rtlCol="0" anchor="ctr"/>
+          <a:lstStyle/>
+          <a:p>
+            <a:pPr algn="ctr"/>
             <a:r>
               <a:rPr lang="de-DE" dirty="0" smtClean="0"/>
-              <a:t>“ </a:t>
-            </a:r>
+              <a:t>Net</a:t>
+            </a:r>
+          </a:p>
+          <a:p>
+            <a:pPr algn="ctr"/>
+            <a:r>
+              <a:rPr lang="de-DE" dirty="0" smtClean="0"/>
+              <a:t>PLL</a:t>
+            </a:r>
+            <a:endParaRPr lang="de-DE" dirty="0"/>
+          </a:p>
+        </p:txBody>
+      </p:sp>
+      <p:sp>
+        <p:nvSpPr>
+          <p:cNvPr id="7" name="Abgerundetes Rechteck 6"/>
+          <p:cNvSpPr/>
+          <p:nvPr/>
+        </p:nvSpPr>
+        <p:spPr>
+          <a:xfrm>
+            <a:off x="7051587" y="4604950"/>
+            <a:ext cx="914400" cy="914400"/>
+          </a:xfrm>
+          <a:prstGeom prst="roundRect">
+            <a:avLst/>
+          </a:prstGeom>
+          <a:solidFill>
+            <a:schemeClr val="bg2">
+              <a:lumMod val="50000"/>
+            </a:schemeClr>
+          </a:solidFill>
+          <a:ln>
+            <a:solidFill>
+              <a:schemeClr val="bg2">
+                <a:lumMod val="25000"/>
+              </a:schemeClr>
+            </a:solidFill>
+          </a:ln>
+        </p:spPr>
+        <p:style>
+          <a:lnRef idx="2">
+            <a:schemeClr val="accent1">
+              <a:shade val="50000"/>
+            </a:schemeClr>
+          </a:lnRef>
+          <a:fillRef idx="1001">
+            <a:schemeClr val="lt2"/>
+          </a:fillRef>
+          <a:effectRef idx="0">
+            <a:schemeClr val="accent1"/>
+          </a:effectRef>
+          <a:fontRef idx="minor">
+            <a:schemeClr val="lt1"/>
+          </a:fontRef>
+        </p:style>
+        <p:txBody>
+          <a:bodyPr rtlCol="0" anchor="ctr"/>
+          <a:lstStyle/>
+          <a:p>
+            <a:pPr algn="ctr"/>
+            <a:r>
+              <a:rPr lang="de-DE" dirty="0" smtClean="0"/>
+              <a:t>RAM</a:t>
+            </a:r>
+          </a:p>
+          <a:p>
+            <a:pPr algn="ctr"/>
+            <a:r>
+              <a:rPr lang="de-DE" dirty="0" smtClean="0"/>
+              <a:t>PLL</a:t>
+            </a:r>
+            <a:endParaRPr lang="de-DE" dirty="0"/>
+          </a:p>
+        </p:txBody>
+      </p:sp>
+      <p:sp>
+        <p:nvSpPr>
+          <p:cNvPr id="8" name="Abgerundetes Rechteck 7"/>
+          <p:cNvSpPr/>
+          <p:nvPr/>
+        </p:nvSpPr>
+        <p:spPr>
+          <a:xfrm>
+            <a:off x="3789399" y="4604950"/>
+            <a:ext cx="914400" cy="914400"/>
+          </a:xfrm>
+          <a:prstGeom prst="roundRect">
+            <a:avLst/>
+          </a:prstGeom>
+        </p:spPr>
+        <p:style>
+          <a:lnRef idx="2">
+            <a:schemeClr val="accent6">
+              <a:shade val="50000"/>
+            </a:schemeClr>
+          </a:lnRef>
+          <a:fillRef idx="1">
+            <a:schemeClr val="accent6"/>
+          </a:fillRef>
+          <a:effectRef idx="0">
+            <a:schemeClr val="accent6"/>
+          </a:effectRef>
+          <a:fontRef idx="minor">
+            <a:schemeClr val="lt1"/>
+          </a:fontRef>
+        </p:style>
+        <p:txBody>
+          <a:bodyPr rtlCol="0" anchor="ctr"/>
+          <a:lstStyle/>
+          <a:p>
+            <a:pPr algn="ctr"/>
+            <a:r>
+              <a:rPr lang="de-DE" dirty="0" smtClean="0"/>
+              <a:t>Net</a:t>
+            </a:r>
+          </a:p>
+          <a:p>
+            <a:pPr algn="ctr"/>
+            <a:r>
+              <a:rPr lang="de-DE" dirty="0" smtClean="0"/>
+              <a:t>DDIO</a:t>
+            </a:r>
+            <a:endParaRPr lang="de-DE" dirty="0"/>
+          </a:p>
+        </p:txBody>
+      </p:sp>
+      <p:sp>
+        <p:nvSpPr>
+          <p:cNvPr id="9" name="Abgerundetes Rechteck 8"/>
+          <p:cNvSpPr/>
+          <p:nvPr/>
+        </p:nvSpPr>
+        <p:spPr>
+          <a:xfrm>
+            <a:off x="2158305" y="4604950"/>
+            <a:ext cx="914400" cy="914400"/>
+          </a:xfrm>
+          <a:prstGeom prst="roundRect">
+            <a:avLst/>
+          </a:prstGeom>
+        </p:spPr>
+        <p:style>
+          <a:lnRef idx="2">
+            <a:schemeClr val="accent2">
+              <a:shade val="50000"/>
+            </a:schemeClr>
+          </a:lnRef>
+          <a:fillRef idx="1">
+            <a:schemeClr val="accent2"/>
+          </a:fillRef>
+          <a:effectRef idx="0">
+            <a:schemeClr val="accent2"/>
+          </a:effectRef>
+          <a:fontRef idx="minor">
+            <a:schemeClr val="lt1"/>
+          </a:fontRef>
+        </p:style>
+        <p:txBody>
+          <a:bodyPr rtlCol="0" anchor="ctr"/>
+          <a:lstStyle/>
+          <a:p>
+            <a:pPr algn="ctr"/>
+            <a:r>
+              <a:rPr lang="de-DE" dirty="0" smtClean="0"/>
+              <a:t>IO Pin</a:t>
+            </a:r>
+          </a:p>
+          <a:p>
+            <a:pPr algn="ctr"/>
+            <a:r>
+              <a:rPr lang="de-DE" dirty="0" smtClean="0"/>
+              <a:t>Planer</a:t>
+            </a:r>
+            <a:endParaRPr lang="de-DE" dirty="0"/>
+          </a:p>
+        </p:txBody>
+      </p:sp>
+      <p:sp>
+        <p:nvSpPr>
+          <p:cNvPr id="10" name="Abgerundetes Rechteck 9"/>
+          <p:cNvSpPr/>
+          <p:nvPr/>
+        </p:nvSpPr>
+        <p:spPr>
+          <a:xfrm>
+            <a:off x="3072706" y="2454872"/>
+            <a:ext cx="5609976" cy="650790"/>
+          </a:xfrm>
+          <a:prstGeom prst="roundRect">
+            <a:avLst/>
+          </a:prstGeom>
+        </p:spPr>
+        <p:style>
+          <a:lnRef idx="2">
+            <a:schemeClr val="accent1">
+              <a:shade val="50000"/>
+            </a:schemeClr>
+          </a:lnRef>
+          <a:fillRef idx="1">
+            <a:schemeClr val="accent1"/>
+          </a:fillRef>
+          <a:effectRef idx="0">
+            <a:schemeClr val="accent1"/>
+          </a:effectRef>
+          <a:fontRef idx="minor">
+            <a:schemeClr val="lt1"/>
+          </a:fontRef>
+        </p:style>
+        <p:txBody>
+          <a:bodyPr rtlCol="0" anchor="ctr"/>
+          <a:lstStyle/>
+          <a:p>
+            <a:pPr algn="ctr"/>
             <a:r>
               <a:rPr lang="de-DE" dirty="0" err="1" smtClean="0"/>
-              <a:t>verilog</a:t>
+              <a:t>Toplevel</a:t>
             </a:r>
             <a:r>
               <a:rPr lang="de-DE" dirty="0" smtClean="0"/>
@@ -13775,20 +14180,202 @@
             </a:r>
             <a:r>
               <a:rPr lang="de-DE" dirty="0" err="1" smtClean="0"/>
-              <a:t>code</a:t>
-            </a:r>
-            <a:r>
-              <a:rPr lang="de-DE" dirty="0" smtClean="0"/>
-              <a:t> </a:t>
+              <a:t>file</a:t>
             </a:r>
             <a:endParaRPr lang="de-DE" dirty="0"/>
           </a:p>
         </p:txBody>
       </p:sp>
+      <p:cxnSp>
+        <p:nvCxnSpPr>
+          <p:cNvPr id="12" name="Gerader Verbinder 11"/>
+          <p:cNvCxnSpPr>
+            <a:stCxn id="9" idx="0"/>
+          </p:cNvCxnSpPr>
+          <p:nvPr/>
+        </p:nvCxnSpPr>
+        <p:spPr>
+          <a:xfrm flipV="1">
+            <a:off x="2615505" y="3105662"/>
+            <a:ext cx="1107998" cy="1499288"/>
+          </a:xfrm>
+          <a:prstGeom prst="line">
+            <a:avLst/>
+          </a:prstGeom>
+          <a:ln w="38100">
+            <a:solidFill>
+              <a:schemeClr val="tx1"/>
+            </a:solidFill>
+          </a:ln>
+        </p:spPr>
+        <p:style>
+          <a:lnRef idx="1">
+            <a:schemeClr val="accent1"/>
+          </a:lnRef>
+          <a:fillRef idx="0">
+            <a:schemeClr val="accent1"/>
+          </a:fillRef>
+          <a:effectRef idx="0">
+            <a:schemeClr val="accent1"/>
+          </a:effectRef>
+          <a:fontRef idx="minor">
+            <a:schemeClr val="tx1"/>
+          </a:fontRef>
+        </p:style>
+      </p:cxnSp>
+      <p:cxnSp>
+        <p:nvCxnSpPr>
+          <p:cNvPr id="15" name="Gerader Verbinder 14"/>
+          <p:cNvCxnSpPr>
+            <a:stCxn id="8" idx="0"/>
+          </p:cNvCxnSpPr>
+          <p:nvPr/>
+        </p:nvCxnSpPr>
+        <p:spPr>
+          <a:xfrm flipV="1">
+            <a:off x="4246599" y="3105662"/>
+            <a:ext cx="523096" cy="1499288"/>
+          </a:xfrm>
+          <a:prstGeom prst="line">
+            <a:avLst/>
+          </a:prstGeom>
+          <a:ln w="38100">
+            <a:solidFill>
+              <a:schemeClr val="tx1"/>
+            </a:solidFill>
+          </a:ln>
+        </p:spPr>
+        <p:style>
+          <a:lnRef idx="1">
+            <a:schemeClr val="accent1"/>
+          </a:lnRef>
+          <a:fillRef idx="0">
+            <a:schemeClr val="accent1"/>
+          </a:fillRef>
+          <a:effectRef idx="0">
+            <a:schemeClr val="accent1"/>
+          </a:effectRef>
+          <a:fontRef idx="minor">
+            <a:schemeClr val="tx1"/>
+          </a:fontRef>
+        </p:style>
+      </p:cxnSp>
+      <p:cxnSp>
+        <p:nvCxnSpPr>
+          <p:cNvPr id="18" name="Gerader Verbinder 17"/>
+          <p:cNvCxnSpPr>
+            <a:stCxn id="6" idx="0"/>
+            <a:endCxn id="10" idx="2"/>
+          </p:cNvCxnSpPr>
+          <p:nvPr/>
+        </p:nvCxnSpPr>
+        <p:spPr>
+          <a:xfrm flipV="1">
+            <a:off x="5877693" y="3105662"/>
+            <a:ext cx="1" cy="1499288"/>
+          </a:xfrm>
+          <a:prstGeom prst="line">
+            <a:avLst/>
+          </a:prstGeom>
+          <a:ln w="38100">
+            <a:solidFill>
+              <a:schemeClr val="tx1"/>
+            </a:solidFill>
+          </a:ln>
+        </p:spPr>
+        <p:style>
+          <a:lnRef idx="1">
+            <a:schemeClr val="accent1"/>
+          </a:lnRef>
+          <a:fillRef idx="0">
+            <a:schemeClr val="accent1"/>
+          </a:fillRef>
+          <a:effectRef idx="0">
+            <a:schemeClr val="accent1"/>
+          </a:effectRef>
+          <a:fontRef idx="minor">
+            <a:schemeClr val="tx1"/>
+          </a:fontRef>
+        </p:style>
+      </p:cxnSp>
+      <p:cxnSp>
+        <p:nvCxnSpPr>
+          <p:cNvPr id="21" name="Gerader Verbinder 20"/>
+          <p:cNvCxnSpPr>
+            <a:stCxn id="7" idx="0"/>
+          </p:cNvCxnSpPr>
+          <p:nvPr/>
+        </p:nvCxnSpPr>
+        <p:spPr>
+          <a:xfrm flipH="1" flipV="1">
+            <a:off x="7051587" y="3105662"/>
+            <a:ext cx="457200" cy="1499288"/>
+          </a:xfrm>
+          <a:prstGeom prst="line">
+            <a:avLst/>
+          </a:prstGeom>
+          <a:ln w="38100">
+            <a:solidFill>
+              <a:schemeClr val="tx1"/>
+            </a:solidFill>
+          </a:ln>
+        </p:spPr>
+        <p:style>
+          <a:lnRef idx="1">
+            <a:schemeClr val="accent1"/>
+          </a:lnRef>
+          <a:fillRef idx="0">
+            <a:schemeClr val="accent1"/>
+          </a:fillRef>
+          <a:effectRef idx="0">
+            <a:schemeClr val="accent1"/>
+          </a:effectRef>
+          <a:fontRef idx="minor">
+            <a:schemeClr val="tx1"/>
+          </a:fontRef>
+        </p:style>
+      </p:cxnSp>
+      <p:cxnSp>
+        <p:nvCxnSpPr>
+          <p:cNvPr id="24" name="Gerader Verbinder 23"/>
+          <p:cNvCxnSpPr>
+            <a:stCxn id="5" idx="0"/>
+          </p:cNvCxnSpPr>
+          <p:nvPr/>
+        </p:nvCxnSpPr>
+        <p:spPr>
+          <a:xfrm flipH="1" flipV="1">
+            <a:off x="8225481" y="3105662"/>
+            <a:ext cx="914400" cy="1499288"/>
+          </a:xfrm>
+          <a:prstGeom prst="line">
+            <a:avLst/>
+          </a:prstGeom>
+          <a:ln w="38100">
+            <a:solidFill>
+              <a:schemeClr val="tx1"/>
+            </a:solidFill>
+          </a:ln>
+        </p:spPr>
+        <p:style>
+          <a:lnRef idx="1">
+            <a:schemeClr val="accent1"/>
+          </a:lnRef>
+          <a:fillRef idx="0">
+            <a:schemeClr val="accent1"/>
+          </a:fillRef>
+          <a:effectRef idx="0">
+            <a:schemeClr val="accent1"/>
+          </a:effectRef>
+          <a:fontRef idx="minor">
+            <a:schemeClr val="tx1"/>
+          </a:fontRef>
+        </p:style>
+      </p:cxnSp>
     </p:spTree>
     <p:extLst>
       <p:ext uri="{BB962C8B-B14F-4D97-AF65-F5344CB8AC3E}">
-        <p14:creationId xmlns:p14="http://schemas.microsoft.com/office/powerpoint/2010/main" val="3071582456"/>
+        <p14:creationId xmlns:p14="http://schemas.microsoft.com/office/powerpoint/2010/main" val="3805227011"/>
       </p:ext>
     </p:extLst>
   </p:cSld>
@@ -13839,15 +14426,7 @@
           <a:p>
             <a:r>
               <a:rPr lang="de-DE" dirty="0" smtClean="0"/>
-              <a:t>Hardware Setup (FPGA - </a:t>
-            </a:r>
-            <a:r>
-              <a:rPr lang="de-DE" dirty="0" err="1" smtClean="0"/>
-              <a:t>Hierarchy</a:t>
-            </a:r>
-            <a:r>
-              <a:rPr lang="de-DE" dirty="0" smtClean="0"/>
-              <a:t>)</a:t>
+              <a:t>Hardware Setup (Problems)</a:t>
             </a:r>
             <a:endParaRPr lang="de-DE" dirty="0"/>
           </a:p>
@@ -13855,513 +14434,356 @@
       </p:sp>
       <p:sp>
         <p:nvSpPr>
-          <p:cNvPr id="5" name="Abgerundetes Rechteck 4"/>
-          <p:cNvSpPr/>
+          <p:cNvPr id="5" name="Content Placeholder 4"/>
+          <p:cNvSpPr txBox="1">
+            <a:spLocks/>
+          </p:cNvSpPr>
           <p:nvPr/>
         </p:nvSpPr>
         <p:spPr>
           <a:xfrm>
-            <a:off x="8682681" y="4604950"/>
-            <a:ext cx="914400" cy="914400"/>
-          </a:xfrm>
-          <a:prstGeom prst="roundRect">
+            <a:off x="1097280" y="1845734"/>
+            <a:ext cx="9982612" cy="2695786"/>
+          </a:xfrm>
+          <a:prstGeom prst="rect">
             <a:avLst/>
           </a:prstGeom>
         </p:spPr>
-        <p:style>
-          <a:lnRef idx="2">
-            <a:schemeClr val="accent3">
-              <a:shade val="50000"/>
-            </a:schemeClr>
-          </a:lnRef>
-          <a:fillRef idx="1">
-            <a:schemeClr val="accent3"/>
-          </a:fillRef>
-          <a:effectRef idx="0">
-            <a:schemeClr val="accent3"/>
-          </a:effectRef>
-          <a:fontRef idx="minor">
-            <a:schemeClr val="lt1"/>
-          </a:fontRef>
-        </p:style>
         <p:txBody>
-          <a:bodyPr rtlCol="0" anchor="ctr"/>
-          <a:lstStyle/>
-          <a:p>
-            <a:pPr algn="ctr"/>
-            <a:r>
-              <a:rPr lang="de-DE" dirty="0" smtClean="0"/>
-              <a:t>QSYS</a:t>
-            </a:r>
-          </a:p>
-          <a:p>
-            <a:pPr algn="ctr"/>
-            <a:r>
-              <a:rPr lang="de-DE" dirty="0" err="1" smtClean="0"/>
-              <a:t>entity</a:t>
-            </a:r>
-            <a:endParaRPr lang="de-DE" dirty="0"/>
+          <a:bodyPr>
+            <a:noAutofit/>
+          </a:bodyPr>
+          <a:lstStyle>
+            <a:lvl1pPr marL="91440" indent="-91440" algn="l" defTabSz="914400" rtl="0" eaLnBrk="1" latinLnBrk="0" hangingPunct="1">
+              <a:lnSpc>
+                <a:spcPct val="90000"/>
+              </a:lnSpc>
+              <a:spcBef>
+                <a:spcPts val="1200"/>
+              </a:spcBef>
+              <a:spcAft>
+                <a:spcPts val="200"/>
+              </a:spcAft>
+              <a:buClr>
+                <a:schemeClr val="accent1"/>
+              </a:buClr>
+              <a:buSzPct val="100000"/>
+              <a:buFont typeface="Calibri" panose="020F0502020204030204" pitchFamily="34" charset="0"/>
+              <a:buChar char=" "/>
+              <a:defRPr sz="2000" kern="1200">
+                <a:solidFill>
+                  <a:schemeClr val="tx1">
+                    <a:lumMod val="75000"/>
+                    <a:lumOff val="25000"/>
+                  </a:schemeClr>
+                </a:solidFill>
+                <a:latin typeface="+mn-lt"/>
+                <a:ea typeface="+mn-ea"/>
+                <a:cs typeface="+mn-cs"/>
+              </a:defRPr>
+            </a:lvl1pPr>
+            <a:lvl2pPr marL="384048" indent="-182880" algn="l" defTabSz="914400" rtl="0" eaLnBrk="1" latinLnBrk="0" hangingPunct="1">
+              <a:lnSpc>
+                <a:spcPct val="90000"/>
+              </a:lnSpc>
+              <a:spcBef>
+                <a:spcPts val="200"/>
+              </a:spcBef>
+              <a:spcAft>
+                <a:spcPts val="400"/>
+              </a:spcAft>
+              <a:buClr>
+                <a:schemeClr val="accent1"/>
+              </a:buClr>
+              <a:buFont typeface="Calibri" pitchFamily="34" charset="0"/>
+              <a:buChar char="◦"/>
+              <a:defRPr sz="1800" kern="1200">
+                <a:solidFill>
+                  <a:schemeClr val="tx1">
+                    <a:lumMod val="75000"/>
+                    <a:lumOff val="25000"/>
+                  </a:schemeClr>
+                </a:solidFill>
+                <a:latin typeface="+mn-lt"/>
+                <a:ea typeface="+mn-ea"/>
+                <a:cs typeface="+mn-cs"/>
+              </a:defRPr>
+            </a:lvl2pPr>
+            <a:lvl3pPr marL="566928" indent="-182880" algn="l" defTabSz="914400" rtl="0" eaLnBrk="1" latinLnBrk="0" hangingPunct="1">
+              <a:lnSpc>
+                <a:spcPct val="90000"/>
+              </a:lnSpc>
+              <a:spcBef>
+                <a:spcPts val="200"/>
+              </a:spcBef>
+              <a:spcAft>
+                <a:spcPts val="400"/>
+              </a:spcAft>
+              <a:buClr>
+                <a:schemeClr val="accent1"/>
+              </a:buClr>
+              <a:buFont typeface="Calibri" pitchFamily="34" charset="0"/>
+              <a:buChar char="◦"/>
+              <a:defRPr sz="1400" kern="1200">
+                <a:solidFill>
+                  <a:schemeClr val="tx1">
+                    <a:lumMod val="75000"/>
+                    <a:lumOff val="25000"/>
+                  </a:schemeClr>
+                </a:solidFill>
+                <a:latin typeface="+mn-lt"/>
+                <a:ea typeface="+mn-ea"/>
+                <a:cs typeface="+mn-cs"/>
+              </a:defRPr>
+            </a:lvl3pPr>
+            <a:lvl4pPr marL="749808" indent="-182880" algn="l" defTabSz="914400" rtl="0" eaLnBrk="1" latinLnBrk="0" hangingPunct="1">
+              <a:lnSpc>
+                <a:spcPct val="90000"/>
+              </a:lnSpc>
+              <a:spcBef>
+                <a:spcPts val="200"/>
+              </a:spcBef>
+              <a:spcAft>
+                <a:spcPts val="400"/>
+              </a:spcAft>
+              <a:buClr>
+                <a:schemeClr val="accent1"/>
+              </a:buClr>
+              <a:buFont typeface="Calibri" pitchFamily="34" charset="0"/>
+              <a:buChar char="◦"/>
+              <a:defRPr sz="1400" kern="1200">
+                <a:solidFill>
+                  <a:schemeClr val="tx1">
+                    <a:lumMod val="75000"/>
+                    <a:lumOff val="25000"/>
+                  </a:schemeClr>
+                </a:solidFill>
+                <a:latin typeface="+mn-lt"/>
+                <a:ea typeface="+mn-ea"/>
+                <a:cs typeface="+mn-cs"/>
+              </a:defRPr>
+            </a:lvl4pPr>
+            <a:lvl5pPr marL="932688" indent="-182880" algn="l" defTabSz="914400" rtl="0" eaLnBrk="1" latinLnBrk="0" hangingPunct="1">
+              <a:lnSpc>
+                <a:spcPct val="90000"/>
+              </a:lnSpc>
+              <a:spcBef>
+                <a:spcPts val="200"/>
+              </a:spcBef>
+              <a:spcAft>
+                <a:spcPts val="400"/>
+              </a:spcAft>
+              <a:buClr>
+                <a:schemeClr val="accent1"/>
+              </a:buClr>
+              <a:buFont typeface="Calibri" pitchFamily="34" charset="0"/>
+              <a:buChar char="◦"/>
+              <a:defRPr sz="1400" kern="1200">
+                <a:solidFill>
+                  <a:schemeClr val="tx1">
+                    <a:lumMod val="75000"/>
+                    <a:lumOff val="25000"/>
+                  </a:schemeClr>
+                </a:solidFill>
+                <a:latin typeface="+mn-lt"/>
+                <a:ea typeface="+mn-ea"/>
+                <a:cs typeface="+mn-cs"/>
+              </a:defRPr>
+            </a:lvl5pPr>
+            <a:lvl6pPr marL="1100000" indent="-228600" algn="l" defTabSz="914400" rtl="0" eaLnBrk="1" latinLnBrk="0" hangingPunct="1">
+              <a:lnSpc>
+                <a:spcPct val="90000"/>
+              </a:lnSpc>
+              <a:spcBef>
+                <a:spcPts val="200"/>
+              </a:spcBef>
+              <a:spcAft>
+                <a:spcPts val="400"/>
+              </a:spcAft>
+              <a:buClr>
+                <a:schemeClr val="accent1"/>
+              </a:buClr>
+              <a:buFont typeface="Calibri" pitchFamily="34" charset="0"/>
+              <a:buChar char="◦"/>
+              <a:defRPr sz="1400" kern="1200">
+                <a:solidFill>
+                  <a:schemeClr val="tx1">
+                    <a:lumMod val="75000"/>
+                    <a:lumOff val="25000"/>
+                  </a:schemeClr>
+                </a:solidFill>
+                <a:latin typeface="+mn-lt"/>
+                <a:ea typeface="+mn-ea"/>
+                <a:cs typeface="+mn-cs"/>
+              </a:defRPr>
+            </a:lvl6pPr>
+            <a:lvl7pPr marL="1300000" indent="-228600" algn="l" defTabSz="914400" rtl="0" eaLnBrk="1" latinLnBrk="0" hangingPunct="1">
+              <a:lnSpc>
+                <a:spcPct val="90000"/>
+              </a:lnSpc>
+              <a:spcBef>
+                <a:spcPts val="200"/>
+              </a:spcBef>
+              <a:spcAft>
+                <a:spcPts val="400"/>
+              </a:spcAft>
+              <a:buClr>
+                <a:schemeClr val="accent1"/>
+              </a:buClr>
+              <a:buFont typeface="Calibri" pitchFamily="34" charset="0"/>
+              <a:buChar char="◦"/>
+              <a:defRPr sz="1400" kern="1200">
+                <a:solidFill>
+                  <a:schemeClr val="tx1">
+                    <a:lumMod val="75000"/>
+                    <a:lumOff val="25000"/>
+                  </a:schemeClr>
+                </a:solidFill>
+                <a:latin typeface="+mn-lt"/>
+                <a:ea typeface="+mn-ea"/>
+                <a:cs typeface="+mn-cs"/>
+              </a:defRPr>
+            </a:lvl7pPr>
+            <a:lvl8pPr marL="1500000" indent="-228600" algn="l" defTabSz="914400" rtl="0" eaLnBrk="1" latinLnBrk="0" hangingPunct="1">
+              <a:lnSpc>
+                <a:spcPct val="90000"/>
+              </a:lnSpc>
+              <a:spcBef>
+                <a:spcPts val="200"/>
+              </a:spcBef>
+              <a:spcAft>
+                <a:spcPts val="400"/>
+              </a:spcAft>
+              <a:buClr>
+                <a:schemeClr val="accent1"/>
+              </a:buClr>
+              <a:buFont typeface="Calibri" pitchFamily="34" charset="0"/>
+              <a:buChar char="◦"/>
+              <a:defRPr sz="1400" kern="1200">
+                <a:solidFill>
+                  <a:schemeClr val="tx1">
+                    <a:lumMod val="75000"/>
+                    <a:lumOff val="25000"/>
+                  </a:schemeClr>
+                </a:solidFill>
+                <a:latin typeface="+mn-lt"/>
+                <a:ea typeface="+mn-ea"/>
+                <a:cs typeface="+mn-cs"/>
+              </a:defRPr>
+            </a:lvl8pPr>
+            <a:lvl9pPr marL="1700000" indent="-228600" algn="l" defTabSz="914400" rtl="0" eaLnBrk="1" latinLnBrk="0" hangingPunct="1">
+              <a:lnSpc>
+                <a:spcPct val="90000"/>
+              </a:lnSpc>
+              <a:spcBef>
+                <a:spcPts val="200"/>
+              </a:spcBef>
+              <a:spcAft>
+                <a:spcPts val="400"/>
+              </a:spcAft>
+              <a:buClr>
+                <a:schemeClr val="accent1"/>
+              </a:buClr>
+              <a:buFont typeface="Calibri" pitchFamily="34" charset="0"/>
+              <a:buChar char="◦"/>
+              <a:defRPr sz="1400" kern="1200">
+                <a:solidFill>
+                  <a:schemeClr val="tx1">
+                    <a:lumMod val="75000"/>
+                    <a:lumOff val="25000"/>
+                  </a:schemeClr>
+                </a:solidFill>
+                <a:latin typeface="+mn-lt"/>
+                <a:ea typeface="+mn-ea"/>
+                <a:cs typeface="+mn-cs"/>
+              </a:defRPr>
+            </a:lvl9pPr>
+          </a:lstStyle>
+          <a:p>
+            <a:pPr>
+              <a:buFont typeface="Wingdings" panose="05000000000000000000" pitchFamily="2" charset="2"/>
+              <a:buChar char="§"/>
+            </a:pPr>
+            <a:r>
+              <a:rPr lang="en-US" sz="2400" dirty="0" smtClean="0"/>
+              <a:t>Partially bad tutorials (copy paste </a:t>
+            </a:r>
+            <a:r>
+              <a:rPr lang="en-US" sz="2400" dirty="0" smtClean="0">
+                <a:sym typeface="Wingdings" panose="05000000000000000000" pitchFamily="2" charset="2"/>
+              </a:rPr>
+              <a:t> “It works</a:t>
+            </a:r>
+            <a:r>
+              <a:rPr lang="en-US" sz="2400" dirty="0" smtClean="0">
+                <a:sym typeface="Wingdings" panose="05000000000000000000" pitchFamily="2" charset="2"/>
+              </a:rPr>
+              <a:t>”)</a:t>
+            </a:r>
+            <a:endParaRPr lang="en-US" sz="2400" dirty="0" smtClean="0"/>
+          </a:p>
+          <a:p>
+            <a:pPr>
+              <a:buFont typeface="Wingdings" panose="05000000000000000000" pitchFamily="2" charset="2"/>
+              <a:buChar char="§"/>
+            </a:pPr>
+            <a:r>
+              <a:rPr lang="en-US" sz="2400" dirty="0" smtClean="0"/>
+              <a:t>Combine different </a:t>
+            </a:r>
+            <a:r>
+              <a:rPr lang="en-US" sz="2400" dirty="0" smtClean="0"/>
+              <a:t>tutorials</a:t>
+            </a:r>
+            <a:endParaRPr lang="en-US" sz="2400" dirty="0"/>
+          </a:p>
+          <a:p>
+            <a:pPr>
+              <a:buFont typeface="Wingdings" panose="05000000000000000000" pitchFamily="2" charset="2"/>
+              <a:buChar char="§"/>
+            </a:pPr>
+            <a:r>
+              <a:rPr lang="en-US" sz="2400" dirty="0" smtClean="0"/>
+              <a:t>No/very few Verilog/VHDL </a:t>
+            </a:r>
+            <a:r>
+              <a:rPr lang="en-US" sz="2400" dirty="0" smtClean="0"/>
+              <a:t>skills</a:t>
+            </a:r>
+            <a:endParaRPr lang="en-US" sz="2400" dirty="0"/>
+          </a:p>
+          <a:p>
+            <a:pPr>
+              <a:buFont typeface="Wingdings" panose="05000000000000000000" pitchFamily="2" charset="2"/>
+              <a:buChar char="§"/>
+            </a:pPr>
+            <a:r>
+              <a:rPr lang="en-US" sz="2400" dirty="0"/>
+              <a:t>Broken </a:t>
+            </a:r>
+            <a:r>
+              <a:rPr lang="en-US" sz="2400" dirty="0" smtClean="0"/>
+              <a:t>Board</a:t>
+            </a:r>
+            <a:endParaRPr lang="en-US" sz="2400" dirty="0"/>
+          </a:p>
+          <a:p>
+            <a:pPr>
+              <a:buFont typeface="Wingdings" panose="05000000000000000000" pitchFamily="2" charset="2"/>
+              <a:buChar char="§"/>
+            </a:pPr>
+            <a:r>
+              <a:rPr lang="en-US" sz="2400" dirty="0" smtClean="0"/>
+              <a:t>Never sure, where the error comes from (HW, SW, Eclipse, …)!</a:t>
+            </a:r>
+            <a:endParaRPr lang="en-US" sz="2400" dirty="0"/>
           </a:p>
         </p:txBody>
       </p:sp>
-      <p:sp>
-        <p:nvSpPr>
-          <p:cNvPr id="6" name="Abgerundetes Rechteck 5"/>
-          <p:cNvSpPr/>
-          <p:nvPr/>
-        </p:nvSpPr>
-        <p:spPr>
-          <a:xfrm>
-            <a:off x="5420493" y="4604950"/>
-            <a:ext cx="914400" cy="914400"/>
-          </a:xfrm>
-          <a:prstGeom prst="roundRect">
-            <a:avLst/>
-          </a:prstGeom>
-        </p:spPr>
-        <p:style>
-          <a:lnRef idx="2">
-            <a:schemeClr val="accent6">
-              <a:shade val="50000"/>
-            </a:schemeClr>
-          </a:lnRef>
-          <a:fillRef idx="1">
-            <a:schemeClr val="accent6"/>
-          </a:fillRef>
-          <a:effectRef idx="0">
-            <a:schemeClr val="accent6"/>
-          </a:effectRef>
-          <a:fontRef idx="minor">
-            <a:schemeClr val="lt1"/>
-          </a:fontRef>
-        </p:style>
-        <p:txBody>
-          <a:bodyPr rtlCol="0" anchor="ctr"/>
-          <a:lstStyle/>
-          <a:p>
-            <a:pPr algn="ctr"/>
-            <a:r>
-              <a:rPr lang="de-DE" dirty="0" smtClean="0"/>
-              <a:t>Net</a:t>
-            </a:r>
-          </a:p>
-          <a:p>
-            <a:pPr algn="ctr"/>
-            <a:r>
-              <a:rPr lang="de-DE" dirty="0" smtClean="0"/>
-              <a:t>PLL</a:t>
-            </a:r>
-            <a:endParaRPr lang="de-DE" dirty="0"/>
-          </a:p>
-        </p:txBody>
-      </p:sp>
-      <p:sp>
-        <p:nvSpPr>
-          <p:cNvPr id="7" name="Abgerundetes Rechteck 6"/>
-          <p:cNvSpPr/>
-          <p:nvPr/>
-        </p:nvSpPr>
-        <p:spPr>
-          <a:xfrm>
-            <a:off x="7051587" y="4604950"/>
-            <a:ext cx="914400" cy="914400"/>
-          </a:xfrm>
-          <a:prstGeom prst="roundRect">
-            <a:avLst/>
-          </a:prstGeom>
-          <a:solidFill>
-            <a:schemeClr val="bg2">
-              <a:lumMod val="50000"/>
-            </a:schemeClr>
-          </a:solidFill>
-          <a:ln>
-            <a:solidFill>
-              <a:schemeClr val="bg2">
-                <a:lumMod val="25000"/>
-              </a:schemeClr>
-            </a:solidFill>
-          </a:ln>
-        </p:spPr>
-        <p:style>
-          <a:lnRef idx="2">
-            <a:schemeClr val="accent1">
-              <a:shade val="50000"/>
-            </a:schemeClr>
-          </a:lnRef>
-          <a:fillRef idx="1001">
-            <a:schemeClr val="lt2"/>
-          </a:fillRef>
-          <a:effectRef idx="0">
-            <a:schemeClr val="accent1"/>
-          </a:effectRef>
-          <a:fontRef idx="minor">
-            <a:schemeClr val="lt1"/>
-          </a:fontRef>
-        </p:style>
-        <p:txBody>
-          <a:bodyPr rtlCol="0" anchor="ctr"/>
-          <a:lstStyle/>
-          <a:p>
-            <a:pPr algn="ctr"/>
-            <a:r>
-              <a:rPr lang="de-DE" dirty="0" smtClean="0"/>
-              <a:t>RAM</a:t>
-            </a:r>
-          </a:p>
-          <a:p>
-            <a:pPr algn="ctr"/>
-            <a:r>
-              <a:rPr lang="de-DE" dirty="0" smtClean="0"/>
-              <a:t>PLL</a:t>
-            </a:r>
-            <a:endParaRPr lang="de-DE" dirty="0"/>
-          </a:p>
-        </p:txBody>
-      </p:sp>
-      <p:sp>
-        <p:nvSpPr>
-          <p:cNvPr id="8" name="Abgerundetes Rechteck 7"/>
-          <p:cNvSpPr/>
-          <p:nvPr/>
-        </p:nvSpPr>
-        <p:spPr>
-          <a:xfrm>
-            <a:off x="3789399" y="4604950"/>
-            <a:ext cx="914400" cy="914400"/>
-          </a:xfrm>
-          <a:prstGeom prst="roundRect">
-            <a:avLst/>
-          </a:prstGeom>
-        </p:spPr>
-        <p:style>
-          <a:lnRef idx="2">
-            <a:schemeClr val="accent6">
-              <a:shade val="50000"/>
-            </a:schemeClr>
-          </a:lnRef>
-          <a:fillRef idx="1">
-            <a:schemeClr val="accent6"/>
-          </a:fillRef>
-          <a:effectRef idx="0">
-            <a:schemeClr val="accent6"/>
-          </a:effectRef>
-          <a:fontRef idx="minor">
-            <a:schemeClr val="lt1"/>
-          </a:fontRef>
-        </p:style>
-        <p:txBody>
-          <a:bodyPr rtlCol="0" anchor="ctr"/>
-          <a:lstStyle/>
-          <a:p>
-            <a:pPr algn="ctr"/>
-            <a:r>
-              <a:rPr lang="de-DE" dirty="0" smtClean="0"/>
-              <a:t>Net</a:t>
-            </a:r>
-          </a:p>
-          <a:p>
-            <a:pPr algn="ctr"/>
-            <a:r>
-              <a:rPr lang="de-DE" dirty="0" smtClean="0"/>
-              <a:t>DDIO</a:t>
-            </a:r>
-            <a:endParaRPr lang="de-DE" dirty="0"/>
-          </a:p>
-        </p:txBody>
-      </p:sp>
-      <p:sp>
-        <p:nvSpPr>
-          <p:cNvPr id="9" name="Abgerundetes Rechteck 8"/>
-          <p:cNvSpPr/>
-          <p:nvPr/>
-        </p:nvSpPr>
-        <p:spPr>
-          <a:xfrm>
-            <a:off x="2158305" y="4604950"/>
-            <a:ext cx="914400" cy="914400"/>
-          </a:xfrm>
-          <a:prstGeom prst="roundRect">
-            <a:avLst/>
-          </a:prstGeom>
-        </p:spPr>
-        <p:style>
-          <a:lnRef idx="2">
-            <a:schemeClr val="accent2">
-              <a:shade val="50000"/>
-            </a:schemeClr>
-          </a:lnRef>
-          <a:fillRef idx="1">
-            <a:schemeClr val="accent2"/>
-          </a:fillRef>
-          <a:effectRef idx="0">
-            <a:schemeClr val="accent2"/>
-          </a:effectRef>
-          <a:fontRef idx="minor">
-            <a:schemeClr val="lt1"/>
-          </a:fontRef>
-        </p:style>
-        <p:txBody>
-          <a:bodyPr rtlCol="0" anchor="ctr"/>
-          <a:lstStyle/>
-          <a:p>
-            <a:pPr algn="ctr"/>
-            <a:r>
-              <a:rPr lang="de-DE" dirty="0" smtClean="0"/>
-              <a:t>IO Pin</a:t>
-            </a:r>
-          </a:p>
-          <a:p>
-            <a:pPr algn="ctr"/>
-            <a:r>
-              <a:rPr lang="de-DE" dirty="0" smtClean="0"/>
-              <a:t>Planer</a:t>
-            </a:r>
-            <a:endParaRPr lang="de-DE" dirty="0"/>
-          </a:p>
-        </p:txBody>
-      </p:sp>
-      <p:sp>
-        <p:nvSpPr>
-          <p:cNvPr id="10" name="Abgerundetes Rechteck 9"/>
-          <p:cNvSpPr/>
-          <p:nvPr/>
-        </p:nvSpPr>
-        <p:spPr>
-          <a:xfrm>
-            <a:off x="3072706" y="2454872"/>
-            <a:ext cx="5609976" cy="650790"/>
-          </a:xfrm>
-          <a:prstGeom prst="roundRect">
-            <a:avLst/>
-          </a:prstGeom>
-        </p:spPr>
-        <p:style>
-          <a:lnRef idx="2">
-            <a:schemeClr val="accent1">
-              <a:shade val="50000"/>
-            </a:schemeClr>
-          </a:lnRef>
-          <a:fillRef idx="1">
-            <a:schemeClr val="accent1"/>
-          </a:fillRef>
-          <a:effectRef idx="0">
-            <a:schemeClr val="accent1"/>
-          </a:effectRef>
-          <a:fontRef idx="minor">
-            <a:schemeClr val="lt1"/>
-          </a:fontRef>
-        </p:style>
-        <p:txBody>
-          <a:bodyPr rtlCol="0" anchor="ctr"/>
-          <a:lstStyle/>
-          <a:p>
-            <a:pPr algn="ctr"/>
-            <a:r>
-              <a:rPr lang="de-DE" dirty="0" err="1" smtClean="0"/>
-              <a:t>Toplevel</a:t>
-            </a:r>
-            <a:r>
-              <a:rPr lang="de-DE" dirty="0" smtClean="0"/>
-              <a:t> </a:t>
-            </a:r>
-            <a:r>
-              <a:rPr lang="de-DE" dirty="0" err="1" smtClean="0"/>
-              <a:t>file</a:t>
-            </a:r>
-            <a:endParaRPr lang="de-DE" dirty="0"/>
-          </a:p>
-        </p:txBody>
-      </p:sp>
-      <p:cxnSp>
-        <p:nvCxnSpPr>
-          <p:cNvPr id="12" name="Gerader Verbinder 11"/>
-          <p:cNvCxnSpPr>
-            <a:stCxn id="9" idx="0"/>
-          </p:cNvCxnSpPr>
-          <p:nvPr/>
-        </p:nvCxnSpPr>
-        <p:spPr>
-          <a:xfrm flipV="1">
-            <a:off x="2615505" y="3105662"/>
-            <a:ext cx="1107998" cy="1499288"/>
-          </a:xfrm>
-          <a:prstGeom prst="line">
-            <a:avLst/>
-          </a:prstGeom>
-          <a:ln w="38100">
-            <a:solidFill>
-              <a:schemeClr val="tx1"/>
-            </a:solidFill>
-          </a:ln>
-        </p:spPr>
-        <p:style>
-          <a:lnRef idx="1">
-            <a:schemeClr val="accent1"/>
-          </a:lnRef>
-          <a:fillRef idx="0">
-            <a:schemeClr val="accent1"/>
-          </a:fillRef>
-          <a:effectRef idx="0">
-            <a:schemeClr val="accent1"/>
-          </a:effectRef>
-          <a:fontRef idx="minor">
-            <a:schemeClr val="tx1"/>
-          </a:fontRef>
-        </p:style>
-      </p:cxnSp>
-      <p:cxnSp>
-        <p:nvCxnSpPr>
-          <p:cNvPr id="15" name="Gerader Verbinder 14"/>
-          <p:cNvCxnSpPr>
-            <a:stCxn id="8" idx="0"/>
-          </p:cNvCxnSpPr>
-          <p:nvPr/>
-        </p:nvCxnSpPr>
-        <p:spPr>
-          <a:xfrm flipV="1">
-            <a:off x="4246599" y="3105662"/>
-            <a:ext cx="523096" cy="1499288"/>
-          </a:xfrm>
-          <a:prstGeom prst="line">
-            <a:avLst/>
-          </a:prstGeom>
-          <a:ln w="38100">
-            <a:solidFill>
-              <a:schemeClr val="tx1"/>
-            </a:solidFill>
-          </a:ln>
-        </p:spPr>
-        <p:style>
-          <a:lnRef idx="1">
-            <a:schemeClr val="accent1"/>
-          </a:lnRef>
-          <a:fillRef idx="0">
-            <a:schemeClr val="accent1"/>
-          </a:fillRef>
-          <a:effectRef idx="0">
-            <a:schemeClr val="accent1"/>
-          </a:effectRef>
-          <a:fontRef idx="minor">
-            <a:schemeClr val="tx1"/>
-          </a:fontRef>
-        </p:style>
-      </p:cxnSp>
-      <p:cxnSp>
-        <p:nvCxnSpPr>
-          <p:cNvPr id="18" name="Gerader Verbinder 17"/>
-          <p:cNvCxnSpPr>
-            <a:stCxn id="6" idx="0"/>
-            <a:endCxn id="10" idx="2"/>
-          </p:cNvCxnSpPr>
-          <p:nvPr/>
-        </p:nvCxnSpPr>
-        <p:spPr>
-          <a:xfrm flipV="1">
-            <a:off x="5877693" y="3105662"/>
-            <a:ext cx="1" cy="1499288"/>
-          </a:xfrm>
-          <a:prstGeom prst="line">
-            <a:avLst/>
-          </a:prstGeom>
-          <a:ln w="38100">
-            <a:solidFill>
-              <a:schemeClr val="tx1"/>
-            </a:solidFill>
-          </a:ln>
-        </p:spPr>
-        <p:style>
-          <a:lnRef idx="1">
-            <a:schemeClr val="accent1"/>
-          </a:lnRef>
-          <a:fillRef idx="0">
-            <a:schemeClr val="accent1"/>
-          </a:fillRef>
-          <a:effectRef idx="0">
-            <a:schemeClr val="accent1"/>
-          </a:effectRef>
-          <a:fontRef idx="minor">
-            <a:schemeClr val="tx1"/>
-          </a:fontRef>
-        </p:style>
-      </p:cxnSp>
-      <p:cxnSp>
-        <p:nvCxnSpPr>
-          <p:cNvPr id="21" name="Gerader Verbinder 20"/>
-          <p:cNvCxnSpPr>
-            <a:stCxn id="7" idx="0"/>
-          </p:cNvCxnSpPr>
-          <p:nvPr/>
-        </p:nvCxnSpPr>
-        <p:spPr>
-          <a:xfrm flipH="1" flipV="1">
-            <a:off x="7051587" y="3105662"/>
-            <a:ext cx="457200" cy="1499288"/>
-          </a:xfrm>
-          <a:prstGeom prst="line">
-            <a:avLst/>
-          </a:prstGeom>
-          <a:ln w="38100">
-            <a:solidFill>
-              <a:schemeClr val="tx1"/>
-            </a:solidFill>
-          </a:ln>
-        </p:spPr>
-        <p:style>
-          <a:lnRef idx="1">
-            <a:schemeClr val="accent1"/>
-          </a:lnRef>
-          <a:fillRef idx="0">
-            <a:schemeClr val="accent1"/>
-          </a:fillRef>
-          <a:effectRef idx="0">
-            <a:schemeClr val="accent1"/>
-          </a:effectRef>
-          <a:fontRef idx="minor">
-            <a:schemeClr val="tx1"/>
-          </a:fontRef>
-        </p:style>
-      </p:cxnSp>
-      <p:cxnSp>
-        <p:nvCxnSpPr>
-          <p:cNvPr id="24" name="Gerader Verbinder 23"/>
-          <p:cNvCxnSpPr>
-            <a:stCxn id="5" idx="0"/>
-          </p:cNvCxnSpPr>
-          <p:nvPr/>
-        </p:nvCxnSpPr>
-        <p:spPr>
-          <a:xfrm flipH="1" flipV="1">
-            <a:off x="8225481" y="3105662"/>
-            <a:ext cx="914400" cy="1499288"/>
-          </a:xfrm>
-          <a:prstGeom prst="line">
-            <a:avLst/>
-          </a:prstGeom>
-          <a:ln w="38100">
-            <a:solidFill>
-              <a:schemeClr val="tx1"/>
-            </a:solidFill>
-          </a:ln>
-        </p:spPr>
-        <p:style>
-          <a:lnRef idx="1">
-            <a:schemeClr val="accent1"/>
-          </a:lnRef>
-          <a:fillRef idx="0">
-            <a:schemeClr val="accent1"/>
-          </a:fillRef>
-          <a:effectRef idx="0">
-            <a:schemeClr val="accent1"/>
-          </a:effectRef>
-          <a:fontRef idx="minor">
-            <a:schemeClr val="tx1"/>
-          </a:fontRef>
-        </p:style>
-      </p:cxnSp>
     </p:spTree>
     <p:extLst>
       <p:ext uri="{BB962C8B-B14F-4D97-AF65-F5344CB8AC3E}">
-        <p14:creationId xmlns:p14="http://schemas.microsoft.com/office/powerpoint/2010/main" val="3805227011"/>
+        <p14:creationId xmlns:p14="http://schemas.microsoft.com/office/powerpoint/2010/main" val="176701147"/>
       </p:ext>
     </p:extLst>
   </p:cSld>

</xml_diff>